<commit_message>
change nist data leakage
</commit_message>
<xml_diff>
--- a/Basic_Computer_Skills_for_Forensics/5_Introduction_to_digital_forensics.pptx
+++ b/Basic_Computer_Skills_for_Forensics/5_Introduction_to_digital_forensics.pptx
@@ -5,7 +5,7 @@
     <p:sldMasterId id="2147483648" r:id="rId1"/>
   </p:sldMasterIdLst>
   <p:notesMasterIdLst>
-    <p:notesMasterId r:id="rId33"/>
+    <p:notesMasterId r:id="rId34"/>
   </p:notesMasterIdLst>
   <p:sldIdLst>
     <p:sldId id="256" r:id="rId2"/>
@@ -38,7 +38,8 @@
     <p:sldId id="382" r:id="rId29"/>
     <p:sldId id="383" r:id="rId30"/>
     <p:sldId id="384" r:id="rId31"/>
-    <p:sldId id="385" r:id="rId32"/>
+    <p:sldId id="387" r:id="rId32"/>
+    <p:sldId id="385" r:id="rId33"/>
   </p:sldIdLst>
   <p:sldSz cx="12192000" cy="6858000"/>
   <p:notesSz cx="6858000" cy="9144000"/>
@@ -158,7 +159,7 @@
   <pc:docChgLst>
     <pc:chgData name="Weifeng Xu" userId="e7aed605-a3dd-4d5a-a692-a87037af107b" providerId="ADAL" clId="{8442418D-DE68-4B3B-96F3-F4D7267D1273}"/>
     <pc:docChg chg="undo custSel addSld delSld modSld">
-      <pc:chgData name="Weifeng Xu" userId="e7aed605-a3dd-4d5a-a692-a87037af107b" providerId="ADAL" clId="{8442418D-DE68-4B3B-96F3-F4D7267D1273}" dt="2021-08-11T03:37:04.816" v="429" actId="1076"/>
+      <pc:chgData name="Weifeng Xu" userId="e7aed605-a3dd-4d5a-a692-a87037af107b" providerId="ADAL" clId="{8442418D-DE68-4B3B-96F3-F4D7267D1273}" dt="2021-09-09T23:15:55.663" v="474" actId="22"/>
       <pc:docMkLst>
         <pc:docMk/>
       </pc:docMkLst>
@@ -468,7 +469,7 @@
         </pc:sldMkLst>
       </pc:sldChg>
       <pc:sldChg chg="addSp delSp modSp new mod modClrScheme chgLayout">
-        <pc:chgData name="Weifeng Xu" userId="e7aed605-a3dd-4d5a-a692-a87037af107b" providerId="ADAL" clId="{8442418D-DE68-4B3B-96F3-F4D7267D1273}" dt="2021-08-11T03:06:27.729" v="200"/>
+        <pc:chgData name="Weifeng Xu" userId="e7aed605-a3dd-4d5a-a692-a87037af107b" providerId="ADAL" clId="{8442418D-DE68-4B3B-96F3-F4D7267D1273}" dt="2021-09-09T22:55:52.463" v="452" actId="20577"/>
         <pc:sldMkLst>
           <pc:docMk/>
           <pc:sldMk cId="2942198537" sldId="364"/>
@@ -498,7 +499,7 @@
           </ac:spMkLst>
         </pc:spChg>
         <pc:spChg chg="add mod ord">
-          <ac:chgData name="Weifeng Xu" userId="e7aed605-a3dd-4d5a-a692-a87037af107b" providerId="ADAL" clId="{8442418D-DE68-4B3B-96F3-F4D7267D1273}" dt="2021-08-11T03:06:27.729" v="200"/>
+          <ac:chgData name="Weifeng Xu" userId="e7aed605-a3dd-4d5a-a692-a87037af107b" providerId="ADAL" clId="{8442418D-DE68-4B3B-96F3-F4D7267D1273}" dt="2021-09-09T22:55:52.463" v="452" actId="20577"/>
           <ac:spMkLst>
             <pc:docMk/>
             <pc:sldMk cId="2942198537" sldId="364"/>
@@ -1086,6 +1087,29 @@
             <pc:docMk/>
             <pc:sldMk cId="3368594426" sldId="386"/>
             <ac:picMk id="7" creationId="{FF93CEF9-F00C-4169-9A97-BD6D48704780}"/>
+          </ac:picMkLst>
+        </pc:picChg>
+      </pc:sldChg>
+      <pc:sldChg chg="addSp modSp new mod">
+        <pc:chgData name="Weifeng Xu" userId="e7aed605-a3dd-4d5a-a692-a87037af107b" providerId="ADAL" clId="{8442418D-DE68-4B3B-96F3-F4D7267D1273}" dt="2021-09-09T23:15:55.663" v="474" actId="22"/>
+        <pc:sldMkLst>
+          <pc:docMk/>
+          <pc:sldMk cId="890370378" sldId="387"/>
+        </pc:sldMkLst>
+        <pc:spChg chg="mod">
+          <ac:chgData name="Weifeng Xu" userId="e7aed605-a3dd-4d5a-a692-a87037af107b" providerId="ADAL" clId="{8442418D-DE68-4B3B-96F3-F4D7267D1273}" dt="2021-09-09T23:14:41.354" v="473" actId="207"/>
+          <ac:spMkLst>
+            <pc:docMk/>
+            <pc:sldMk cId="890370378" sldId="387"/>
+            <ac:spMk id="2" creationId="{A99E8701-048F-4E27-8CCF-0DBDE11C8FFD}"/>
+          </ac:spMkLst>
+        </pc:spChg>
+        <pc:picChg chg="add">
+          <ac:chgData name="Weifeng Xu" userId="e7aed605-a3dd-4d5a-a692-a87037af107b" providerId="ADAL" clId="{8442418D-DE68-4B3B-96F3-F4D7267D1273}" dt="2021-09-09T23:15:55.663" v="474" actId="22"/>
+          <ac:picMkLst>
+            <pc:docMk/>
+            <pc:sldMk cId="890370378" sldId="387"/>
+            <ac:picMk id="4" creationId="{F4375ED0-2554-4517-9C07-7FA85795281F}"/>
           </ac:picMkLst>
         </pc:picChg>
       </pc:sldChg>
@@ -7678,7 +7702,7 @@
           <a:p>
             <a:fld id="{B9658D5F-65FB-4E17-9D5B-8CF1DE5A98DF}" type="datetimeFigureOut">
               <a:rPr lang="en-US" smtClean="0"/>
-              <a:t>8/10/2021</a:t>
+              <a:t>9/9/2021</a:t>
             </a:fld>
             <a:endParaRPr lang="en-US"/>
           </a:p>
@@ -8074,7 +8098,7 @@
           <a:p>
             <a:fld id="{4263717A-E3C1-4BED-ABE0-B7069385E023}" type="datetimeFigureOut">
               <a:rPr lang="en-US" smtClean="0"/>
-              <a:t>8/10/2021</a:t>
+              <a:t>9/9/2021</a:t>
             </a:fld>
             <a:endParaRPr lang="en-US"/>
           </a:p>
@@ -8247,7 +8271,7 @@
           <a:p>
             <a:fld id="{4263717A-E3C1-4BED-ABE0-B7069385E023}" type="datetimeFigureOut">
               <a:rPr lang="en-US" smtClean="0"/>
-              <a:t>8/10/2021</a:t>
+              <a:t>9/9/2021</a:t>
             </a:fld>
             <a:endParaRPr lang="en-US"/>
           </a:p>
@@ -8425,7 +8449,7 @@
           <a:p>
             <a:fld id="{4263717A-E3C1-4BED-ABE0-B7069385E023}" type="datetimeFigureOut">
               <a:rPr lang="en-US" smtClean="0"/>
-              <a:t>8/10/2021</a:t>
+              <a:t>9/9/2021</a:t>
             </a:fld>
             <a:endParaRPr lang="en-US"/>
           </a:p>
@@ -8593,7 +8617,7 @@
           <a:p>
             <a:fld id="{4263717A-E3C1-4BED-ABE0-B7069385E023}" type="datetimeFigureOut">
               <a:rPr lang="en-US" smtClean="0"/>
-              <a:t>8/10/2021</a:t>
+              <a:t>9/9/2021</a:t>
             </a:fld>
             <a:endParaRPr lang="en-US"/>
           </a:p>
@@ -8838,7 +8862,7 @@
           <a:p>
             <a:fld id="{4263717A-E3C1-4BED-ABE0-B7069385E023}" type="datetimeFigureOut">
               <a:rPr lang="en-US" smtClean="0"/>
-              <a:t>8/10/2021</a:t>
+              <a:t>9/9/2021</a:t>
             </a:fld>
             <a:endParaRPr lang="en-US"/>
           </a:p>
@@ -9067,7 +9091,7 @@
           <a:p>
             <a:fld id="{4263717A-E3C1-4BED-ABE0-B7069385E023}" type="datetimeFigureOut">
               <a:rPr lang="en-US" smtClean="0"/>
-              <a:t>8/10/2021</a:t>
+              <a:t>9/9/2021</a:t>
             </a:fld>
             <a:endParaRPr lang="en-US"/>
           </a:p>
@@ -9431,7 +9455,7 @@
           <a:p>
             <a:fld id="{4263717A-E3C1-4BED-ABE0-B7069385E023}" type="datetimeFigureOut">
               <a:rPr lang="en-US" smtClean="0"/>
-              <a:t>8/10/2021</a:t>
+              <a:t>9/9/2021</a:t>
             </a:fld>
             <a:endParaRPr lang="en-US"/>
           </a:p>
@@ -9548,7 +9572,7 @@
           <a:p>
             <a:fld id="{4263717A-E3C1-4BED-ABE0-B7069385E023}" type="datetimeFigureOut">
               <a:rPr lang="en-US" smtClean="0"/>
-              <a:t>8/10/2021</a:t>
+              <a:t>9/9/2021</a:t>
             </a:fld>
             <a:endParaRPr lang="en-US"/>
           </a:p>
@@ -9643,7 +9667,7 @@
           <a:p>
             <a:fld id="{4263717A-E3C1-4BED-ABE0-B7069385E023}" type="datetimeFigureOut">
               <a:rPr lang="en-US" smtClean="0"/>
-              <a:t>8/10/2021</a:t>
+              <a:t>9/9/2021</a:t>
             </a:fld>
             <a:endParaRPr lang="en-US"/>
           </a:p>
@@ -9918,7 +9942,7 @@
           <a:p>
             <a:fld id="{4263717A-E3C1-4BED-ABE0-B7069385E023}" type="datetimeFigureOut">
               <a:rPr lang="en-US" smtClean="0"/>
-              <a:t>8/10/2021</a:t>
+              <a:t>9/9/2021</a:t>
             </a:fld>
             <a:endParaRPr lang="en-US"/>
           </a:p>
@@ -10170,7 +10194,7 @@
           <a:p>
             <a:fld id="{4263717A-E3C1-4BED-ABE0-B7069385E023}" type="datetimeFigureOut">
               <a:rPr lang="en-US" smtClean="0"/>
-              <a:t>8/10/2021</a:t>
+              <a:t>9/9/2021</a:t>
             </a:fld>
             <a:endParaRPr lang="en-US"/>
           </a:p>
@@ -10381,7 +10405,7 @@
           <a:p>
             <a:fld id="{4263717A-E3C1-4BED-ABE0-B7069385E023}" type="datetimeFigureOut">
               <a:rPr lang="en-US" smtClean="0"/>
-              <a:t>8/10/2021</a:t>
+              <a:t>9/9/2021</a:t>
             </a:fld>
             <a:endParaRPr lang="en-US"/>
           </a:p>
@@ -11118,13 +11142,13 @@
           <a:p>
             <a:r>
               <a:rPr lang="en-GB" dirty="0"/>
-              <a:t>Gathering the Evidence</a:t>
+              <a:t>Gathering the evidence</a:t>
             </a:r>
           </a:p>
           <a:p>
             <a:r>
               <a:rPr lang="en-GB" dirty="0"/>
-              <a:t>Acquiring an Image of Evidence Media</a:t>
+              <a:t>Acquiring an image of evidence media</a:t>
             </a:r>
           </a:p>
           <a:p>
@@ -11134,7 +11158,7 @@
             </a:r>
             <a:r>
               <a:rPr lang="en-GB" dirty="0"/>
-              <a:t> Your Digital Evidence </a:t>
+              <a:t> digital evidence </a:t>
             </a:r>
           </a:p>
           <a:p>
@@ -11146,7 +11170,7 @@
           <a:p>
             <a:r>
               <a:rPr lang="en-GB" dirty="0"/>
-              <a:t>Critiquing the Case</a:t>
+              <a:t>Critiquing the case</a:t>
             </a:r>
             <a:endParaRPr lang="en-US" dirty="0"/>
           </a:p>
@@ -13887,6 +13911,107 @@
 </file>
 
 <file path=ppt/slides/slide31.xml><?xml version="1.0" encoding="utf-8"?>
+<p:sld xmlns:a="http://schemas.openxmlformats.org/drawingml/2006/main" xmlns:r="http://schemas.openxmlformats.org/officeDocument/2006/relationships" xmlns:p="http://schemas.openxmlformats.org/presentationml/2006/main">
+  <p:cSld>
+    <p:spTree>
+      <p:nvGrpSpPr>
+        <p:cNvPr id="1" name=""/>
+        <p:cNvGrpSpPr/>
+        <p:nvPr/>
+      </p:nvGrpSpPr>
+      <p:grpSpPr>
+        <a:xfrm>
+          <a:off x="0" y="0"/>
+          <a:ext cx="0" cy="0"/>
+          <a:chOff x="0" y="0"/>
+          <a:chExt cx="0" cy="0"/>
+        </a:xfrm>
+      </p:grpSpPr>
+      <p:sp>
+        <p:nvSpPr>
+          <p:cNvPr id="2" name="Title 1">
+            <a:extLst>
+              <a:ext uri="{FF2B5EF4-FFF2-40B4-BE49-F238E27FC236}">
+                <a16:creationId xmlns:a16="http://schemas.microsoft.com/office/drawing/2014/main" id="{A99E8701-048F-4E27-8CCF-0DBDE11C8FFD}"/>
+              </a:ext>
+            </a:extLst>
+          </p:cNvPr>
+          <p:cNvSpPr>
+            <a:spLocks noGrp="1"/>
+          </p:cNvSpPr>
+          <p:nvPr>
+            <p:ph type="title"/>
+          </p:nvPr>
+        </p:nvSpPr>
+        <p:spPr/>
+        <p:txBody>
+          <a:bodyPr/>
+          <a:lstStyle/>
+          <a:p>
+            <a:r>
+              <a:rPr lang="en-US" dirty="0"/>
+              <a:t>Email search </a:t>
+            </a:r>
+            <a:r>
+              <a:rPr lang="en-US" sz="3200" dirty="0">
+                <a:solidFill>
+                  <a:srgbClr val="7030A0"/>
+                </a:solidFill>
+              </a:rPr>
+              <a:t>[a-zA-Z0-9+_.-]+@[a-zA-Z0-9.-]+</a:t>
+            </a:r>
+            <a:endParaRPr lang="en-US" dirty="0">
+              <a:solidFill>
+                <a:srgbClr val="7030A0"/>
+              </a:solidFill>
+            </a:endParaRPr>
+          </a:p>
+        </p:txBody>
+      </p:sp>
+      <p:pic>
+        <p:nvPicPr>
+          <p:cNvPr id="4" name="Picture 3">
+            <a:extLst>
+              <a:ext uri="{FF2B5EF4-FFF2-40B4-BE49-F238E27FC236}">
+                <a16:creationId xmlns:a16="http://schemas.microsoft.com/office/drawing/2014/main" id="{F4375ED0-2554-4517-9C07-7FA85795281F}"/>
+              </a:ext>
+            </a:extLst>
+          </p:cNvPr>
+          <p:cNvPicPr>
+            <a:picLocks noChangeAspect="1"/>
+          </p:cNvPicPr>
+          <p:nvPr/>
+        </p:nvPicPr>
+        <p:blipFill>
+          <a:blip r:embed="rId2"/>
+          <a:stretch>
+            <a:fillRect/>
+          </a:stretch>
+        </p:blipFill>
+        <p:spPr>
+          <a:xfrm>
+            <a:off x="0" y="1493813"/>
+            <a:ext cx="12192000" cy="3870373"/>
+          </a:xfrm>
+          <a:prstGeom prst="rect">
+            <a:avLst/>
+          </a:prstGeom>
+        </p:spPr>
+      </p:pic>
+    </p:spTree>
+    <p:extLst>
+      <p:ext uri="{BB962C8B-B14F-4D97-AF65-F5344CB8AC3E}">
+        <p14:creationId xmlns:p14="http://schemas.microsoft.com/office/powerpoint/2010/main" val="890370378"/>
+      </p:ext>
+    </p:extLst>
+  </p:cSld>
+  <p:clrMapOvr>
+    <a:masterClrMapping/>
+  </p:clrMapOvr>
+</p:sld>
+</file>
+
+<file path=ppt/slides/slide32.xml><?xml version="1.0" encoding="utf-8"?>
 <p:sld xmlns:a="http://schemas.openxmlformats.org/drawingml/2006/main" xmlns:r="http://schemas.openxmlformats.org/officeDocument/2006/relationships" xmlns:p="http://schemas.openxmlformats.org/presentationml/2006/main">
   <p:cSld>
     <p:spTree>

</xml_diff>

<commit_message>
add generated USN, MFT fiels
</commit_message>
<xml_diff>
--- a/Basic_Computer_Skills_for_Forensics/5_Introduction_to_digital_forensics.pptx
+++ b/Basic_Computer_Skills_for_Forensics/5_Introduction_to_digital_forensics.pptx
@@ -5,7 +5,7 @@
     <p:sldMasterId id="2147483648" r:id="rId1"/>
   </p:sldMasterIdLst>
   <p:notesMasterIdLst>
-    <p:notesMasterId r:id="rId34"/>
+    <p:notesMasterId r:id="rId35"/>
   </p:notesMasterIdLst>
   <p:sldIdLst>
     <p:sldId id="256" r:id="rId2"/>
@@ -38,8 +38,9 @@
     <p:sldId id="382" r:id="rId29"/>
     <p:sldId id="383" r:id="rId30"/>
     <p:sldId id="384" r:id="rId31"/>
-    <p:sldId id="387" r:id="rId32"/>
-    <p:sldId id="385" r:id="rId33"/>
+    <p:sldId id="385" r:id="rId32"/>
+    <p:sldId id="387" r:id="rId33"/>
+    <p:sldId id="388" r:id="rId34"/>
   </p:sldIdLst>
   <p:sldSz cx="12192000" cy="6858000"/>
   <p:notesSz cx="6858000" cy="9144000"/>
@@ -149,7 +150,7 @@
 <file path=ppt/revisionInfo.xml><?xml version="1.0" encoding="utf-8"?>
 <p1510:revInfo xmlns:a="http://schemas.openxmlformats.org/drawingml/2006/main" xmlns:r="http://schemas.openxmlformats.org/officeDocument/2006/relationships" xmlns:p1510="http://schemas.microsoft.com/office/powerpoint/2015/10/main">
   <p1510:revLst>
-    <p1510:client id="{8442418D-DE68-4B3B-96F3-F4D7267D1273}" v="37" dt="2021-08-11T03:21:03.931"/>
+    <p1510:client id="{8442418D-DE68-4B3B-96F3-F4D7267D1273}" v="54" dt="2022-03-07T21:42:41.029"/>
   </p1510:revLst>
 </p1510:revInfo>
 </file>
@@ -158,8 +159,8 @@
 <pc:chgInfo xmlns:a="http://schemas.openxmlformats.org/drawingml/2006/main" xmlns:r="http://schemas.openxmlformats.org/officeDocument/2006/relationships" xmlns:ac="http://schemas.microsoft.com/office/drawing/2013/main/command" xmlns:pc="http://schemas.microsoft.com/office/powerpoint/2013/main/command">
   <pc:docChgLst>
     <pc:chgData name="Weifeng Xu" userId="e7aed605-a3dd-4d5a-a692-a87037af107b" providerId="ADAL" clId="{8442418D-DE68-4B3B-96F3-F4D7267D1273}"/>
-    <pc:docChg chg="undo custSel addSld delSld modSld">
-      <pc:chgData name="Weifeng Xu" userId="e7aed605-a3dd-4d5a-a692-a87037af107b" providerId="ADAL" clId="{8442418D-DE68-4B3B-96F3-F4D7267D1273}" dt="2021-09-14T01:00:55.910" v="524" actId="20577"/>
+    <pc:docChg chg="undo custSel addSld delSld modSld sldOrd">
+      <pc:chgData name="Weifeng Xu" userId="e7aed605-a3dd-4d5a-a692-a87037af107b" providerId="ADAL" clId="{8442418D-DE68-4B3B-96F3-F4D7267D1273}" dt="2022-03-07T23:06:32.398" v="1034" actId="207"/>
       <pc:docMkLst>
         <pc:docMk/>
       </pc:docMkLst>
@@ -249,7 +250,7 @@
         </pc:spChg>
       </pc:sldChg>
       <pc:sldChg chg="addSp delSp modSp new mod modClrScheme chgLayout">
-        <pc:chgData name="Weifeng Xu" userId="e7aed605-a3dd-4d5a-a692-a87037af107b" providerId="ADAL" clId="{8442418D-DE68-4B3B-96F3-F4D7267D1273}" dt="2021-09-14T01:00:55.910" v="524" actId="20577"/>
+        <pc:chgData name="Weifeng Xu" userId="e7aed605-a3dd-4d5a-a692-a87037af107b" providerId="ADAL" clId="{8442418D-DE68-4B3B-96F3-F4D7267D1273}" dt="2022-03-07T19:44:45.222" v="839" actId="207"/>
         <pc:sldMkLst>
           <pc:docMk/>
           <pc:sldMk cId="4252162637" sldId="259"/>
@@ -287,7 +288,7 @@
           </ac:spMkLst>
         </pc:spChg>
         <pc:spChg chg="add mod ord">
-          <ac:chgData name="Weifeng Xu" userId="e7aed605-a3dd-4d5a-a692-a87037af107b" providerId="ADAL" clId="{8442418D-DE68-4B3B-96F3-F4D7267D1273}" dt="2021-09-14T01:00:55.910" v="524" actId="20577"/>
+          <ac:chgData name="Weifeng Xu" userId="e7aed605-a3dd-4d5a-a692-a87037af107b" providerId="ADAL" clId="{8442418D-DE68-4B3B-96F3-F4D7267D1273}" dt="2022-03-07T19:44:45.222" v="839" actId="207"/>
           <ac:spMkLst>
             <pc:docMk/>
             <pc:sldMk cId="4252162637" sldId="259"/>
@@ -296,13 +297,13 @@
         </pc:spChg>
       </pc:sldChg>
       <pc:sldChg chg="modSp new mod">
-        <pc:chgData name="Weifeng Xu" userId="e7aed605-a3dd-4d5a-a692-a87037af107b" providerId="ADAL" clId="{8442418D-DE68-4B3B-96F3-F4D7267D1273}" dt="2021-08-11T02:58:18.344" v="162" actId="207"/>
+        <pc:chgData name="Weifeng Xu" userId="e7aed605-a3dd-4d5a-a692-a87037af107b" providerId="ADAL" clId="{8442418D-DE68-4B3B-96F3-F4D7267D1273}" dt="2022-03-07T19:46:27.048" v="857" actId="20577"/>
         <pc:sldMkLst>
           <pc:docMk/>
           <pc:sldMk cId="3701048862" sldId="260"/>
         </pc:sldMkLst>
         <pc:spChg chg="mod">
-          <ac:chgData name="Weifeng Xu" userId="e7aed605-a3dd-4d5a-a692-a87037af107b" providerId="ADAL" clId="{8442418D-DE68-4B3B-96F3-F4D7267D1273}" dt="2021-08-11T02:54:54.537" v="140"/>
+          <ac:chgData name="Weifeng Xu" userId="e7aed605-a3dd-4d5a-a692-a87037af107b" providerId="ADAL" clId="{8442418D-DE68-4B3B-96F3-F4D7267D1273}" dt="2022-03-07T19:46:27.048" v="857" actId="20577"/>
           <ac:spMkLst>
             <pc:docMk/>
             <pc:sldMk cId="3701048862" sldId="260"/>
@@ -469,7 +470,7 @@
         </pc:sldMkLst>
       </pc:sldChg>
       <pc:sldChg chg="addSp delSp modSp new mod modClrScheme chgLayout">
-        <pc:chgData name="Weifeng Xu" userId="e7aed605-a3dd-4d5a-a692-a87037af107b" providerId="ADAL" clId="{8442418D-DE68-4B3B-96F3-F4D7267D1273}" dt="2021-09-09T22:55:52.463" v="452" actId="20577"/>
+        <pc:chgData name="Weifeng Xu" userId="e7aed605-a3dd-4d5a-a692-a87037af107b" providerId="ADAL" clId="{8442418D-DE68-4B3B-96F3-F4D7267D1273}" dt="2022-03-07T19:50:36.356" v="861"/>
         <pc:sldMkLst>
           <pc:docMk/>
           <pc:sldMk cId="2942198537" sldId="364"/>
@@ -499,7 +500,7 @@
           </ac:spMkLst>
         </pc:spChg>
         <pc:spChg chg="add mod ord">
-          <ac:chgData name="Weifeng Xu" userId="e7aed605-a3dd-4d5a-a692-a87037af107b" providerId="ADAL" clId="{8442418D-DE68-4B3B-96F3-F4D7267D1273}" dt="2021-09-09T22:55:52.463" v="452" actId="20577"/>
+          <ac:chgData name="Weifeng Xu" userId="e7aed605-a3dd-4d5a-a692-a87037af107b" providerId="ADAL" clId="{8442418D-DE68-4B3B-96F3-F4D7267D1273}" dt="2022-03-07T19:50:36.356" v="861"/>
           <ac:spMkLst>
             <pc:docMk/>
             <pc:sldMk cId="2942198537" sldId="364"/>
@@ -522,13 +523,13 @@
         </pc:sldMkLst>
       </pc:sldChg>
       <pc:sldChg chg="addSp modSp new mod setBg">
-        <pc:chgData name="Weifeng Xu" userId="e7aed605-a3dd-4d5a-a692-a87037af107b" providerId="ADAL" clId="{8442418D-DE68-4B3B-96F3-F4D7267D1273}" dt="2021-08-11T03:07:52.452" v="223" actId="14100"/>
+        <pc:chgData name="Weifeng Xu" userId="e7aed605-a3dd-4d5a-a692-a87037af107b" providerId="ADAL" clId="{8442418D-DE68-4B3B-96F3-F4D7267D1273}" dt="2022-03-05T15:53:56.152" v="646" actId="20577"/>
         <pc:sldMkLst>
           <pc:docMk/>
           <pc:sldMk cId="4229272223" sldId="365"/>
         </pc:sldMkLst>
         <pc:spChg chg="mod">
-          <ac:chgData name="Weifeng Xu" userId="e7aed605-a3dd-4d5a-a692-a87037af107b" providerId="ADAL" clId="{8442418D-DE68-4B3B-96F3-F4D7267D1273}" dt="2021-08-11T03:07:07.924" v="208" actId="26606"/>
+          <ac:chgData name="Weifeng Xu" userId="e7aed605-a3dd-4d5a-a692-a87037af107b" providerId="ADAL" clId="{8442418D-DE68-4B3B-96F3-F4D7267D1273}" dt="2022-03-05T15:53:56.152" v="646" actId="20577"/>
           <ac:spMkLst>
             <pc:docMk/>
             <pc:sldMk cId="4229272223" sldId="365"/>
@@ -568,7 +569,7 @@
           </ac:grpSpMkLst>
         </pc:grpChg>
         <pc:picChg chg="add mod">
-          <ac:chgData name="Weifeng Xu" userId="e7aed605-a3dd-4d5a-a692-a87037af107b" providerId="ADAL" clId="{8442418D-DE68-4B3B-96F3-F4D7267D1273}" dt="2021-08-11T03:07:49.699" v="221" actId="1076"/>
+          <ac:chgData name="Weifeng Xu" userId="e7aed605-a3dd-4d5a-a692-a87037af107b" providerId="ADAL" clId="{8442418D-DE68-4B3B-96F3-F4D7267D1273}" dt="2022-03-05T15:53:50.308" v="644" actId="1076"/>
           <ac:picMkLst>
             <pc:docMk/>
             <pc:sldMk cId="4229272223" sldId="365"/>
@@ -591,14 +592,14 @@
           <pc:sldMk cId="764599822" sldId="366"/>
         </pc:sldMkLst>
       </pc:sldChg>
-      <pc:sldChg chg="modSp new mod">
-        <pc:chgData name="Weifeng Xu" userId="e7aed605-a3dd-4d5a-a692-a87037af107b" providerId="ADAL" clId="{8442418D-DE68-4B3B-96F3-F4D7267D1273}" dt="2021-08-11T03:08:49.977" v="231" actId="15"/>
+      <pc:sldChg chg="addSp delSp modSp new mod">
+        <pc:chgData name="Weifeng Xu" userId="e7aed605-a3dd-4d5a-a692-a87037af107b" providerId="ADAL" clId="{8442418D-DE68-4B3B-96F3-F4D7267D1273}" dt="2022-03-07T23:06:32.398" v="1034" actId="207"/>
         <pc:sldMkLst>
           <pc:docMk/>
           <pc:sldMk cId="2996568162" sldId="366"/>
         </pc:sldMkLst>
         <pc:spChg chg="mod">
-          <ac:chgData name="Weifeng Xu" userId="e7aed605-a3dd-4d5a-a692-a87037af107b" providerId="ADAL" clId="{8442418D-DE68-4B3B-96F3-F4D7267D1273}" dt="2021-08-11T03:08:32.907" v="225"/>
+          <ac:chgData name="Weifeng Xu" userId="e7aed605-a3dd-4d5a-a692-a87037af107b" providerId="ADAL" clId="{8442418D-DE68-4B3B-96F3-F4D7267D1273}" dt="2022-03-05T15:55:28.518" v="652" actId="20577"/>
           <ac:spMkLst>
             <pc:docMk/>
             <pc:sldMk cId="2996568162" sldId="366"/>
@@ -606,13 +607,93 @@
           </ac:spMkLst>
         </pc:spChg>
         <pc:spChg chg="mod">
-          <ac:chgData name="Weifeng Xu" userId="e7aed605-a3dd-4d5a-a692-a87037af107b" providerId="ADAL" clId="{8442418D-DE68-4B3B-96F3-F4D7267D1273}" dt="2021-08-11T03:08:49.977" v="231" actId="15"/>
+          <ac:chgData name="Weifeng Xu" userId="e7aed605-a3dd-4d5a-a692-a87037af107b" providerId="ADAL" clId="{8442418D-DE68-4B3B-96F3-F4D7267D1273}" dt="2022-03-05T16:00:44.847" v="681" actId="27636"/>
           <ac:spMkLst>
             <pc:docMk/>
             <pc:sldMk cId="2996568162" sldId="366"/>
             <ac:spMk id="3" creationId="{AD97F87F-19AF-4F97-802C-4FE292347607}"/>
           </ac:spMkLst>
         </pc:spChg>
+        <pc:spChg chg="add mod">
+          <ac:chgData name="Weifeng Xu" userId="e7aed605-a3dd-4d5a-a692-a87037af107b" providerId="ADAL" clId="{8442418D-DE68-4B3B-96F3-F4D7267D1273}" dt="2022-03-05T16:01:27.353" v="693" actId="1076"/>
+          <ac:spMkLst>
+            <pc:docMk/>
+            <pc:sldMk cId="2996568162" sldId="366"/>
+            <ac:spMk id="13" creationId="{DCDCEF93-5A7D-478E-B709-FDD4A1BD879C}"/>
+          </ac:spMkLst>
+        </pc:spChg>
+        <pc:spChg chg="add del mod">
+          <ac:chgData name="Weifeng Xu" userId="e7aed605-a3dd-4d5a-a692-a87037af107b" providerId="ADAL" clId="{8442418D-DE68-4B3B-96F3-F4D7267D1273}" dt="2022-03-05T16:01:34.922" v="697" actId="22"/>
+          <ac:spMkLst>
+            <pc:docMk/>
+            <pc:sldMk cId="2996568162" sldId="366"/>
+            <ac:spMk id="15" creationId="{6FB12A71-DA5C-4721-B992-148FED72DA3E}"/>
+          </ac:spMkLst>
+        </pc:spChg>
+        <pc:spChg chg="add mod">
+          <ac:chgData name="Weifeng Xu" userId="e7aed605-a3dd-4d5a-a692-a87037af107b" providerId="ADAL" clId="{8442418D-DE68-4B3B-96F3-F4D7267D1273}" dt="2022-03-05T16:01:43.879" v="705" actId="20577"/>
+          <ac:spMkLst>
+            <pc:docMk/>
+            <pc:sldMk cId="2996568162" sldId="366"/>
+            <ac:spMk id="16" creationId="{5388B18D-A9DB-4486-A739-4BD19E6B5267}"/>
+          </ac:spMkLst>
+        </pc:spChg>
+        <pc:graphicFrameChg chg="add mod modGraphic">
+          <ac:chgData name="Weifeng Xu" userId="e7aed605-a3dd-4d5a-a692-a87037af107b" providerId="ADAL" clId="{8442418D-DE68-4B3B-96F3-F4D7267D1273}" dt="2022-03-05T16:29:28.588" v="728" actId="207"/>
+          <ac:graphicFrameMkLst>
+            <pc:docMk/>
+            <pc:sldMk cId="2996568162" sldId="366"/>
+            <ac:graphicFrameMk id="4" creationId="{E0F1122D-8CEC-48FE-8F72-CFF83F40E719}"/>
+          </ac:graphicFrameMkLst>
+        </pc:graphicFrameChg>
+        <pc:graphicFrameChg chg="add mod modGraphic">
+          <ac:chgData name="Weifeng Xu" userId="e7aed605-a3dd-4d5a-a692-a87037af107b" providerId="ADAL" clId="{8442418D-DE68-4B3B-96F3-F4D7267D1273}" dt="2022-03-07T23:06:32.398" v="1034" actId="207"/>
+          <ac:graphicFrameMkLst>
+            <pc:docMk/>
+            <pc:sldMk cId="2996568162" sldId="366"/>
+            <ac:graphicFrameMk id="5" creationId="{0CA5BF42-1B92-4A61-A6CF-AD86CFA43BAB}"/>
+          </ac:graphicFrameMkLst>
+        </pc:graphicFrameChg>
+        <pc:graphicFrameChg chg="add del mod">
+          <ac:chgData name="Weifeng Xu" userId="e7aed605-a3dd-4d5a-a692-a87037af107b" providerId="ADAL" clId="{8442418D-DE68-4B3B-96F3-F4D7267D1273}" dt="2022-03-05T16:00:28.906" v="678" actId="478"/>
+          <ac:graphicFrameMkLst>
+            <pc:docMk/>
+            <pc:sldMk cId="2996568162" sldId="366"/>
+            <ac:graphicFrameMk id="6" creationId="{26918C38-9C4A-4F43-9D8E-83BA719FEC2C}"/>
+          </ac:graphicFrameMkLst>
+        </pc:graphicFrameChg>
+        <pc:graphicFrameChg chg="add mod modGraphic">
+          <ac:chgData name="Weifeng Xu" userId="e7aed605-a3dd-4d5a-a692-a87037af107b" providerId="ADAL" clId="{8442418D-DE68-4B3B-96F3-F4D7267D1273}" dt="2022-03-05T16:05:20.590" v="713" actId="1076"/>
+          <ac:graphicFrameMkLst>
+            <pc:docMk/>
+            <pc:sldMk cId="2996568162" sldId="366"/>
+            <ac:graphicFrameMk id="7" creationId="{533B6A4A-5D1C-4F8F-BD8E-9F33F33B4CD8}"/>
+          </ac:graphicFrameMkLst>
+        </pc:graphicFrameChg>
+        <pc:graphicFrameChg chg="add mod modGraphic">
+          <ac:chgData name="Weifeng Xu" userId="e7aed605-a3dd-4d5a-a692-a87037af107b" providerId="ADAL" clId="{8442418D-DE68-4B3B-96F3-F4D7267D1273}" dt="2022-03-05T16:31:31.937" v="782" actId="207"/>
+          <ac:graphicFrameMkLst>
+            <pc:docMk/>
+            <pc:sldMk cId="2996568162" sldId="366"/>
+            <ac:graphicFrameMk id="17" creationId="{48A5EC28-0F5E-4C20-A61A-38F6CCF30C50}"/>
+          </ac:graphicFrameMkLst>
+        </pc:graphicFrameChg>
+        <pc:cxnChg chg="add mod">
+          <ac:chgData name="Weifeng Xu" userId="e7aed605-a3dd-4d5a-a692-a87037af107b" providerId="ADAL" clId="{8442418D-DE68-4B3B-96F3-F4D7267D1273}" dt="2022-03-05T16:00:55.630" v="684" actId="13822"/>
+          <ac:cxnSpMkLst>
+            <pc:docMk/>
+            <pc:sldMk cId="2996568162" sldId="366"/>
+            <ac:cxnSpMk id="9" creationId="{E88E5176-2DDF-4AAD-AE4A-DD6B27C75FBA}"/>
+          </ac:cxnSpMkLst>
+        </pc:cxnChg>
+        <pc:cxnChg chg="add mod">
+          <ac:chgData name="Weifeng Xu" userId="e7aed605-a3dd-4d5a-a692-a87037af107b" providerId="ADAL" clId="{8442418D-DE68-4B3B-96F3-F4D7267D1273}" dt="2022-03-05T16:01:01.889" v="686" actId="13822"/>
+          <ac:cxnSpMkLst>
+            <pc:docMk/>
+            <pc:sldMk cId="2996568162" sldId="366"/>
+            <ac:cxnSpMk id="11" creationId="{2F9C4D62-40B0-4FE2-A9A2-ECC6D5F9A3A4}"/>
+          </ac:cxnSpMkLst>
+        </pc:cxnChg>
       </pc:sldChg>
       <pc:sldChg chg="modSp add del mod">
         <pc:chgData name="Weifeng Xu" userId="e7aed605-a3dd-4d5a-a692-a87037af107b" providerId="ADAL" clId="{8442418D-DE68-4B3B-96F3-F4D7267D1273}" dt="2021-08-11T02:18:07.067" v="101"/>
@@ -629,14 +710,14 @@
           </ac:spMkLst>
         </pc:spChg>
       </pc:sldChg>
-      <pc:sldChg chg="modSp new mod">
-        <pc:chgData name="Weifeng Xu" userId="e7aed605-a3dd-4d5a-a692-a87037af107b" providerId="ADAL" clId="{8442418D-DE68-4B3B-96F3-F4D7267D1273}" dt="2021-08-11T03:11:39.541" v="282" actId="20577"/>
+      <pc:sldChg chg="addSp modSp new mod">
+        <pc:chgData name="Weifeng Xu" userId="e7aed605-a3dd-4d5a-a692-a87037af107b" providerId="ADAL" clId="{8442418D-DE68-4B3B-96F3-F4D7267D1273}" dt="2022-03-05T16:33:36.181" v="783" actId="6549"/>
         <pc:sldMkLst>
           <pc:docMk/>
           <pc:sldMk cId="2906318904" sldId="367"/>
         </pc:sldMkLst>
         <pc:spChg chg="mod">
-          <ac:chgData name="Weifeng Xu" userId="e7aed605-a3dd-4d5a-a692-a87037af107b" providerId="ADAL" clId="{8442418D-DE68-4B3B-96F3-F4D7267D1273}" dt="2021-08-11T03:09:55.174" v="233"/>
+          <ac:chgData name="Weifeng Xu" userId="e7aed605-a3dd-4d5a-a692-a87037af107b" providerId="ADAL" clId="{8442418D-DE68-4B3B-96F3-F4D7267D1273}" dt="2022-03-05T16:33:36.181" v="783" actId="6549"/>
           <ac:spMkLst>
             <pc:docMk/>
             <pc:sldMk cId="2906318904" sldId="367"/>
@@ -644,13 +725,37 @@
           </ac:spMkLst>
         </pc:spChg>
         <pc:spChg chg="mod">
-          <ac:chgData name="Weifeng Xu" userId="e7aed605-a3dd-4d5a-a692-a87037af107b" providerId="ADAL" clId="{8442418D-DE68-4B3B-96F3-F4D7267D1273}" dt="2021-08-11T03:11:39.541" v="282" actId="20577"/>
+          <ac:chgData name="Weifeng Xu" userId="e7aed605-a3dd-4d5a-a692-a87037af107b" providerId="ADAL" clId="{8442418D-DE68-4B3B-96F3-F4D7267D1273}" dt="2022-03-04T21:38:30.250" v="528" actId="14100"/>
           <ac:spMkLst>
             <pc:docMk/>
             <pc:sldMk cId="2906318904" sldId="367"/>
             <ac:spMk id="3" creationId="{D140AC8E-1AA4-4A37-956A-DD86BF0CEB74}"/>
           </ac:spMkLst>
         </pc:spChg>
+        <pc:picChg chg="add mod">
+          <ac:chgData name="Weifeng Xu" userId="e7aed605-a3dd-4d5a-a692-a87037af107b" providerId="ADAL" clId="{8442418D-DE68-4B3B-96F3-F4D7267D1273}" dt="2022-03-04T21:39:30.034" v="540" actId="1076"/>
+          <ac:picMkLst>
+            <pc:docMk/>
+            <pc:sldMk cId="2906318904" sldId="367"/>
+            <ac:picMk id="4" creationId="{F84EE92A-47B1-4AEE-BC87-7DFEC5A10413}"/>
+          </ac:picMkLst>
+        </pc:picChg>
+        <pc:picChg chg="add mod">
+          <ac:chgData name="Weifeng Xu" userId="e7aed605-a3dd-4d5a-a692-a87037af107b" providerId="ADAL" clId="{8442418D-DE68-4B3B-96F3-F4D7267D1273}" dt="2022-03-04T21:39:31.068" v="541" actId="1076"/>
+          <ac:picMkLst>
+            <pc:docMk/>
+            <pc:sldMk cId="2906318904" sldId="367"/>
+            <ac:picMk id="1026" creationId="{D135A29E-3089-439E-91E1-0ED94882A1C5}"/>
+          </ac:picMkLst>
+        </pc:picChg>
+        <pc:picChg chg="add mod">
+          <ac:chgData name="Weifeng Xu" userId="e7aed605-a3dd-4d5a-a692-a87037af107b" providerId="ADAL" clId="{8442418D-DE68-4B3B-96F3-F4D7267D1273}" dt="2022-03-04T21:39:33.753" v="542" actId="1076"/>
+          <ac:picMkLst>
+            <pc:docMk/>
+            <pc:sldMk cId="2906318904" sldId="367"/>
+            <ac:picMk id="1028" creationId="{3A792103-C138-4C81-A8C2-FF99AA1FD9CD}"/>
+          </ac:picMkLst>
+        </pc:picChg>
       </pc:sldChg>
       <pc:sldChg chg="add del">
         <pc:chgData name="Weifeng Xu" userId="e7aed605-a3dd-4d5a-a692-a87037af107b" providerId="ADAL" clId="{8442418D-DE68-4B3B-96F3-F4D7267D1273}" dt="2021-08-11T03:05:59.477" v="197"/>
@@ -803,13 +908,13 @@
         </pc:sldMkLst>
       </pc:sldChg>
       <pc:sldChg chg="modSp add del mod">
-        <pc:chgData name="Weifeng Xu" userId="e7aed605-a3dd-4d5a-a692-a87037af107b" providerId="ADAL" clId="{8442418D-DE68-4B3B-96F3-F4D7267D1273}" dt="2021-08-11T03:26:49.492" v="341" actId="27636"/>
+        <pc:chgData name="Weifeng Xu" userId="e7aed605-a3dd-4d5a-a692-a87037af107b" providerId="ADAL" clId="{8442418D-DE68-4B3B-96F3-F4D7267D1273}" dt="2022-03-07T19:56:06.098" v="882" actId="114"/>
         <pc:sldMkLst>
           <pc:docMk/>
           <pc:sldMk cId="591311306" sldId="372"/>
         </pc:sldMkLst>
         <pc:spChg chg="mod">
-          <ac:chgData name="Weifeng Xu" userId="e7aed605-a3dd-4d5a-a692-a87037af107b" providerId="ADAL" clId="{8442418D-DE68-4B3B-96F3-F4D7267D1273}" dt="2021-08-11T03:26:49.492" v="341" actId="27636"/>
+          <ac:chgData name="Weifeng Xu" userId="e7aed605-a3dd-4d5a-a692-a87037af107b" providerId="ADAL" clId="{8442418D-DE68-4B3B-96F3-F4D7267D1273}" dt="2022-03-07T19:56:06.098" v="882" actId="114"/>
           <ac:spMkLst>
             <pc:docMk/>
             <pc:sldMk cId="591311306" sldId="372"/>
@@ -915,13 +1020,21 @@
         </pc:picChg>
       </pc:sldChg>
       <pc:sldChg chg="modSp add del mod">
-        <pc:chgData name="Weifeng Xu" userId="e7aed605-a3dd-4d5a-a692-a87037af107b" providerId="ADAL" clId="{8442418D-DE68-4B3B-96F3-F4D7267D1273}" dt="2021-08-11T03:35:36.980" v="398" actId="14100"/>
+        <pc:chgData name="Weifeng Xu" userId="e7aed605-a3dd-4d5a-a692-a87037af107b" providerId="ADAL" clId="{8442418D-DE68-4B3B-96F3-F4D7267D1273}" dt="2022-03-05T16:36:06.812" v="835" actId="1037"/>
         <pc:sldMkLst>
           <pc:docMk/>
           <pc:sldMk cId="335882978" sldId="379"/>
         </pc:sldMkLst>
+        <pc:spChg chg="mod">
+          <ac:chgData name="Weifeng Xu" userId="e7aed605-a3dd-4d5a-a692-a87037af107b" providerId="ADAL" clId="{8442418D-DE68-4B3B-96F3-F4D7267D1273}" dt="2022-03-05T16:36:06.812" v="835" actId="1037"/>
+          <ac:spMkLst>
+            <pc:docMk/>
+            <pc:sldMk cId="335882978" sldId="379"/>
+            <ac:spMk id="10" creationId="{00000000-0000-0000-0000-000000000000}"/>
+          </ac:spMkLst>
+        </pc:spChg>
         <pc:picChg chg="mod">
-          <ac:chgData name="Weifeng Xu" userId="e7aed605-a3dd-4d5a-a692-a87037af107b" providerId="ADAL" clId="{8442418D-DE68-4B3B-96F3-F4D7267D1273}" dt="2021-08-11T03:35:36.980" v="398" actId="14100"/>
+          <ac:chgData name="Weifeng Xu" userId="e7aed605-a3dd-4d5a-a692-a87037af107b" providerId="ADAL" clId="{8442418D-DE68-4B3B-96F3-F4D7267D1273}" dt="2022-03-05T16:36:02.671" v="820" actId="1076"/>
           <ac:picMkLst>
             <pc:docMk/>
             <pc:sldMk cId="335882978" sldId="379"/>
@@ -1090,8 +1203,8 @@
           </ac:picMkLst>
         </pc:picChg>
       </pc:sldChg>
-      <pc:sldChg chg="addSp modSp new mod">
-        <pc:chgData name="Weifeng Xu" userId="e7aed605-a3dd-4d5a-a692-a87037af107b" providerId="ADAL" clId="{8442418D-DE68-4B3B-96F3-F4D7267D1273}" dt="2021-09-09T23:15:55.663" v="474" actId="22"/>
+      <pc:sldChg chg="addSp modSp new mod ord">
+        <pc:chgData name="Weifeng Xu" userId="e7aed605-a3dd-4d5a-a692-a87037af107b" providerId="ADAL" clId="{8442418D-DE68-4B3B-96F3-F4D7267D1273}" dt="2022-03-07T21:45:58.267" v="938" actId="313"/>
         <pc:sldMkLst>
           <pc:docMk/>
           <pc:sldMk cId="890370378" sldId="387"/>
@@ -1102,6 +1215,14 @@
             <pc:docMk/>
             <pc:sldMk cId="890370378" sldId="387"/>
             <ac:spMk id="2" creationId="{A99E8701-048F-4E27-8CCF-0DBDE11C8FFD}"/>
+          </ac:spMkLst>
+        </pc:spChg>
+        <pc:spChg chg="add mod">
+          <ac:chgData name="Weifeng Xu" userId="e7aed605-a3dd-4d5a-a692-a87037af107b" providerId="ADAL" clId="{8442418D-DE68-4B3B-96F3-F4D7267D1273}" dt="2022-03-07T21:45:58.267" v="938" actId="313"/>
+          <ac:spMkLst>
+            <pc:docMk/>
+            <pc:sldMk cId="890370378" sldId="387"/>
+            <ac:spMk id="3" creationId="{06AA3397-A31A-46F3-A99D-BF9E554D997D}"/>
           </ac:spMkLst>
         </pc:spChg>
         <pc:picChg chg="add">
@@ -1112,6 +1233,29 @@
             <ac:picMk id="4" creationId="{F4375ED0-2554-4517-9C07-7FA85795281F}"/>
           </ac:picMkLst>
         </pc:picChg>
+      </pc:sldChg>
+      <pc:sldChg chg="addSp modSp new mod modClrScheme chgLayout">
+        <pc:chgData name="Weifeng Xu" userId="e7aed605-a3dd-4d5a-a692-a87037af107b" providerId="ADAL" clId="{8442418D-DE68-4B3B-96F3-F4D7267D1273}" dt="2022-03-07T21:49:06.952" v="1031" actId="20577"/>
+        <pc:sldMkLst>
+          <pc:docMk/>
+          <pc:sldMk cId="2776652354" sldId="388"/>
+        </pc:sldMkLst>
+        <pc:spChg chg="mod ord">
+          <ac:chgData name="Weifeng Xu" userId="e7aed605-a3dd-4d5a-a692-a87037af107b" providerId="ADAL" clId="{8442418D-DE68-4B3B-96F3-F4D7267D1273}" dt="2022-03-04T21:46:35.879" v="618" actId="20577"/>
+          <ac:spMkLst>
+            <pc:docMk/>
+            <pc:sldMk cId="2776652354" sldId="388"/>
+            <ac:spMk id="2" creationId="{0478612A-D65D-4E81-AE36-86A77A9AE6E4}"/>
+          </ac:spMkLst>
+        </pc:spChg>
+        <pc:spChg chg="add mod ord">
+          <ac:chgData name="Weifeng Xu" userId="e7aed605-a3dd-4d5a-a692-a87037af107b" providerId="ADAL" clId="{8442418D-DE68-4B3B-96F3-F4D7267D1273}" dt="2022-03-07T21:49:06.952" v="1031" actId="20577"/>
+          <ac:spMkLst>
+            <pc:docMk/>
+            <pc:sldMk cId="2776652354" sldId="388"/>
+            <ac:spMk id="3" creationId="{FFD95E78-2E0E-498A-89D2-FE0493DE1395}"/>
+          </ac:spMkLst>
+        </pc:spChg>
       </pc:sldChg>
       <pc:sldChg chg="del">
         <pc:chgData name="Weifeng Xu" userId="e7aed605-a3dd-4d5a-a692-a87037af107b" providerId="ADAL" clId="{8442418D-DE68-4B3B-96F3-F4D7267D1273}" dt="2021-08-11T02:13:30.053" v="27" actId="47"/>
@@ -7702,7 +7846,7 @@
           <a:p>
             <a:fld id="{B9658D5F-65FB-4E17-9D5B-8CF1DE5A98DF}" type="datetimeFigureOut">
               <a:rPr lang="en-US" smtClean="0"/>
-              <a:t>9/13/2021</a:t>
+              <a:t>3/7/2022</a:t>
             </a:fld>
             <a:endParaRPr lang="en-US"/>
           </a:p>
@@ -8098,7 +8242,7 @@
           <a:p>
             <a:fld id="{4263717A-E3C1-4BED-ABE0-B7069385E023}" type="datetimeFigureOut">
               <a:rPr lang="en-US" smtClean="0"/>
-              <a:t>9/13/2021</a:t>
+              <a:t>3/7/2022</a:t>
             </a:fld>
             <a:endParaRPr lang="en-US"/>
           </a:p>
@@ -8271,7 +8415,7 @@
           <a:p>
             <a:fld id="{4263717A-E3C1-4BED-ABE0-B7069385E023}" type="datetimeFigureOut">
               <a:rPr lang="en-US" smtClean="0"/>
-              <a:t>9/13/2021</a:t>
+              <a:t>3/7/2022</a:t>
             </a:fld>
             <a:endParaRPr lang="en-US"/>
           </a:p>
@@ -8449,7 +8593,7 @@
           <a:p>
             <a:fld id="{4263717A-E3C1-4BED-ABE0-B7069385E023}" type="datetimeFigureOut">
               <a:rPr lang="en-US" smtClean="0"/>
-              <a:t>9/13/2021</a:t>
+              <a:t>3/7/2022</a:t>
             </a:fld>
             <a:endParaRPr lang="en-US"/>
           </a:p>
@@ -8617,7 +8761,7 @@
           <a:p>
             <a:fld id="{4263717A-E3C1-4BED-ABE0-B7069385E023}" type="datetimeFigureOut">
               <a:rPr lang="en-US" smtClean="0"/>
-              <a:t>9/13/2021</a:t>
+              <a:t>3/7/2022</a:t>
             </a:fld>
             <a:endParaRPr lang="en-US"/>
           </a:p>
@@ -8862,7 +9006,7 @@
           <a:p>
             <a:fld id="{4263717A-E3C1-4BED-ABE0-B7069385E023}" type="datetimeFigureOut">
               <a:rPr lang="en-US" smtClean="0"/>
-              <a:t>9/13/2021</a:t>
+              <a:t>3/7/2022</a:t>
             </a:fld>
             <a:endParaRPr lang="en-US"/>
           </a:p>
@@ -9091,7 +9235,7 @@
           <a:p>
             <a:fld id="{4263717A-E3C1-4BED-ABE0-B7069385E023}" type="datetimeFigureOut">
               <a:rPr lang="en-US" smtClean="0"/>
-              <a:t>9/13/2021</a:t>
+              <a:t>3/7/2022</a:t>
             </a:fld>
             <a:endParaRPr lang="en-US"/>
           </a:p>
@@ -9455,7 +9599,7 @@
           <a:p>
             <a:fld id="{4263717A-E3C1-4BED-ABE0-B7069385E023}" type="datetimeFigureOut">
               <a:rPr lang="en-US" smtClean="0"/>
-              <a:t>9/13/2021</a:t>
+              <a:t>3/7/2022</a:t>
             </a:fld>
             <a:endParaRPr lang="en-US"/>
           </a:p>
@@ -9572,7 +9716,7 @@
           <a:p>
             <a:fld id="{4263717A-E3C1-4BED-ABE0-B7069385E023}" type="datetimeFigureOut">
               <a:rPr lang="en-US" smtClean="0"/>
-              <a:t>9/13/2021</a:t>
+              <a:t>3/7/2022</a:t>
             </a:fld>
             <a:endParaRPr lang="en-US"/>
           </a:p>
@@ -9667,7 +9811,7 @@
           <a:p>
             <a:fld id="{4263717A-E3C1-4BED-ABE0-B7069385E023}" type="datetimeFigureOut">
               <a:rPr lang="en-US" smtClean="0"/>
-              <a:t>9/13/2021</a:t>
+              <a:t>3/7/2022</a:t>
             </a:fld>
             <a:endParaRPr lang="en-US"/>
           </a:p>
@@ -9942,7 +10086,7 @@
           <a:p>
             <a:fld id="{4263717A-E3C1-4BED-ABE0-B7069385E023}" type="datetimeFigureOut">
               <a:rPr lang="en-US" smtClean="0"/>
-              <a:t>9/13/2021</a:t>
+              <a:t>3/7/2022</a:t>
             </a:fld>
             <a:endParaRPr lang="en-US"/>
           </a:p>
@@ -10194,7 +10338,7 @@
           <a:p>
             <a:fld id="{4263717A-E3C1-4BED-ABE0-B7069385E023}" type="datetimeFigureOut">
               <a:rPr lang="en-US" smtClean="0"/>
-              <a:t>9/13/2021</a:t>
+              <a:t>3/7/2022</a:t>
             </a:fld>
             <a:endParaRPr lang="en-US"/>
           </a:p>
@@ -10405,7 +10549,7 @@
           <a:p>
             <a:fld id="{4263717A-E3C1-4BED-ABE0-B7069385E023}" type="datetimeFigureOut">
               <a:rPr lang="en-US" smtClean="0"/>
-              <a:t>9/13/2021</a:t>
+              <a:t>3/7/2022</a:t>
             </a:fld>
             <a:endParaRPr lang="en-US"/>
           </a:p>
@@ -11142,7 +11286,7 @@
           <a:p>
             <a:r>
               <a:rPr lang="en-GB" dirty="0"/>
-              <a:t>Gathering the evidence</a:t>
+              <a:t>Procedure of gathering the evidence (evidence media)</a:t>
             </a:r>
           </a:p>
           <a:p>
@@ -11306,8 +11450,12 @@
           <a:lstStyle/>
           <a:p>
             <a:r>
+              <a:rPr lang="en-GB" sz="3600" dirty="0"/>
+              <a:t>Procedure of </a:t>
+            </a:r>
+            <a:r>
               <a:rPr lang="en-US" sz="3600" dirty="0"/>
-              <a:t>Gathering the Evidence</a:t>
+              <a:t>gathering the Evidence</a:t>
             </a:r>
           </a:p>
         </p:txBody>
@@ -11728,7 +11876,7 @@
         </p:blipFill>
         <p:spPr bwMode="auto">
           <a:xfrm>
-            <a:off x="7162050" y="617686"/>
+            <a:off x="7535749" y="560455"/>
             <a:ext cx="3047033" cy="3284024"/>
           </a:xfrm>
           <a:prstGeom prst="rect">
@@ -11844,7 +11992,7 @@
           <a:p>
             <a:r>
               <a:rPr lang="en-GB" dirty="0"/>
-              <a:t>Acquiring an Image of Evidence Media</a:t>
+              <a:t>Acquiring an image of evidence media</a:t>
             </a:r>
             <a:endParaRPr lang="en-US" dirty="0"/>
           </a:p>
@@ -11866,9 +12014,16 @@
             <p:ph idx="1"/>
           </p:nvPr>
         </p:nvSpPr>
-        <p:spPr/>
+        <p:spPr>
+          <a:xfrm>
+            <a:off x="838200" y="1825625"/>
+            <a:ext cx="4744792" cy="4351338"/>
+          </a:xfrm>
+        </p:spPr>
         <p:txBody>
-          <a:bodyPr/>
+          <a:bodyPr>
+            <a:normAutofit fontScale="92500" lnSpcReduction="10000"/>
+          </a:bodyPr>
           <a:lstStyle/>
           <a:p>
             <a:r>
@@ -11922,6 +12077,1989 @@
           </a:p>
         </p:txBody>
       </p:sp>
+      <p:graphicFrame>
+        <p:nvGraphicFramePr>
+          <p:cNvPr id="4" name="Table 4">
+            <a:extLst>
+              <a:ext uri="{FF2B5EF4-FFF2-40B4-BE49-F238E27FC236}">
+                <a16:creationId xmlns:a16="http://schemas.microsoft.com/office/drawing/2014/main" id="{E0F1122D-8CEC-48FE-8F72-CFF83F40E719}"/>
+              </a:ext>
+            </a:extLst>
+          </p:cNvPr>
+          <p:cNvGraphicFramePr>
+            <a:graphicFrameLocks noGrp="1"/>
+          </p:cNvGraphicFramePr>
+          <p:nvPr>
+            <p:extLst>
+              <p:ext uri="{D42A27DB-BD31-4B8C-83A1-F6EECF244321}">
+                <p14:modId xmlns:p14="http://schemas.microsoft.com/office/powerpoint/2010/main" val="2326233607"/>
+              </p:ext>
+            </p:extLst>
+          </p:nvPr>
+        </p:nvGraphicFramePr>
+        <p:xfrm>
+          <a:off x="5702479" y="2797979"/>
+          <a:ext cx="2385450" cy="2194560"/>
+        </p:xfrm>
+        <a:graphic>
+          <a:graphicData uri="http://schemas.openxmlformats.org/drawingml/2006/table">
+            <a:tbl>
+              <a:tblPr firstRow="1" bandRow="1">
+                <a:tableStyleId>{5940675A-B579-460E-94D1-54222C63F5DA}</a:tableStyleId>
+              </a:tblPr>
+              <a:tblGrid>
+                <a:gridCol w="268810">
+                  <a:extLst>
+                    <a:ext uri="{9D8B030D-6E8A-4147-A177-3AD203B41FA5}">
+                      <a16:colId xmlns:a16="http://schemas.microsoft.com/office/drawing/2014/main" val="4054565479"/>
+                    </a:ext>
+                  </a:extLst>
+                </a:gridCol>
+                <a:gridCol w="208280">
+                  <a:extLst>
+                    <a:ext uri="{9D8B030D-6E8A-4147-A177-3AD203B41FA5}">
+                      <a16:colId xmlns:a16="http://schemas.microsoft.com/office/drawing/2014/main" val="1296035226"/>
+                    </a:ext>
+                  </a:extLst>
+                </a:gridCol>
+                <a:gridCol w="238545">
+                  <a:extLst>
+                    <a:ext uri="{9D8B030D-6E8A-4147-A177-3AD203B41FA5}">
+                      <a16:colId xmlns:a16="http://schemas.microsoft.com/office/drawing/2014/main" val="598123529"/>
+                    </a:ext>
+                  </a:extLst>
+                </a:gridCol>
+                <a:gridCol w="238545">
+                  <a:extLst>
+                    <a:ext uri="{9D8B030D-6E8A-4147-A177-3AD203B41FA5}">
+                      <a16:colId xmlns:a16="http://schemas.microsoft.com/office/drawing/2014/main" val="313009279"/>
+                    </a:ext>
+                  </a:extLst>
+                </a:gridCol>
+                <a:gridCol w="238545">
+                  <a:extLst>
+                    <a:ext uri="{9D8B030D-6E8A-4147-A177-3AD203B41FA5}">
+                      <a16:colId xmlns:a16="http://schemas.microsoft.com/office/drawing/2014/main" val="3886772213"/>
+                    </a:ext>
+                  </a:extLst>
+                </a:gridCol>
+                <a:gridCol w="238545">
+                  <a:extLst>
+                    <a:ext uri="{9D8B030D-6E8A-4147-A177-3AD203B41FA5}">
+                      <a16:colId xmlns:a16="http://schemas.microsoft.com/office/drawing/2014/main" val="3361492463"/>
+                    </a:ext>
+                  </a:extLst>
+                </a:gridCol>
+                <a:gridCol w="238545">
+                  <a:extLst>
+                    <a:ext uri="{9D8B030D-6E8A-4147-A177-3AD203B41FA5}">
+                      <a16:colId xmlns:a16="http://schemas.microsoft.com/office/drawing/2014/main" val="2726099323"/>
+                    </a:ext>
+                  </a:extLst>
+                </a:gridCol>
+                <a:gridCol w="238545">
+                  <a:extLst>
+                    <a:ext uri="{9D8B030D-6E8A-4147-A177-3AD203B41FA5}">
+                      <a16:colId xmlns:a16="http://schemas.microsoft.com/office/drawing/2014/main" val="3165214645"/>
+                    </a:ext>
+                  </a:extLst>
+                </a:gridCol>
+                <a:gridCol w="238545">
+                  <a:extLst>
+                    <a:ext uri="{9D8B030D-6E8A-4147-A177-3AD203B41FA5}">
+                      <a16:colId xmlns:a16="http://schemas.microsoft.com/office/drawing/2014/main" val="3074088871"/>
+                    </a:ext>
+                  </a:extLst>
+                </a:gridCol>
+                <a:gridCol w="238545">
+                  <a:extLst>
+                    <a:ext uri="{9D8B030D-6E8A-4147-A177-3AD203B41FA5}">
+                      <a16:colId xmlns:a16="http://schemas.microsoft.com/office/drawing/2014/main" val="1828758157"/>
+                    </a:ext>
+                  </a:extLst>
+                </a:gridCol>
+              </a:tblGrid>
+              <a:tr h="122098">
+                <a:tc>
+                  <a:txBody>
+                    <a:bodyPr/>
+                    <a:lstStyle/>
+                    <a:p>
+                      <a:endParaRPr lang="en-US" dirty="0"/>
+                    </a:p>
+                  </a:txBody>
+                  <a:tcPr>
+                    <a:solidFill>
+                      <a:srgbClr val="FF0000"/>
+                    </a:solidFill>
+                  </a:tcPr>
+                </a:tc>
+                <a:tc>
+                  <a:txBody>
+                    <a:bodyPr/>
+                    <a:lstStyle/>
+                    <a:p>
+                      <a:endParaRPr lang="en-US" dirty="0"/>
+                    </a:p>
+                  </a:txBody>
+                  <a:tcPr>
+                    <a:solidFill>
+                      <a:srgbClr val="FF0000"/>
+                    </a:solidFill>
+                  </a:tcPr>
+                </a:tc>
+                <a:tc>
+                  <a:txBody>
+                    <a:bodyPr/>
+                    <a:lstStyle/>
+                    <a:p>
+                      <a:endParaRPr lang="en-US" dirty="0"/>
+                    </a:p>
+                  </a:txBody>
+                  <a:tcPr>
+                    <a:solidFill>
+                      <a:schemeClr val="bg2">
+                        <a:lumMod val="90000"/>
+                      </a:schemeClr>
+                    </a:solidFill>
+                  </a:tcPr>
+                </a:tc>
+                <a:tc>
+                  <a:txBody>
+                    <a:bodyPr/>
+                    <a:lstStyle/>
+                    <a:p>
+                      <a:endParaRPr lang="en-US" dirty="0"/>
+                    </a:p>
+                  </a:txBody>
+                  <a:tcPr>
+                    <a:solidFill>
+                      <a:schemeClr val="bg2">
+                        <a:lumMod val="90000"/>
+                      </a:schemeClr>
+                    </a:solidFill>
+                  </a:tcPr>
+                </a:tc>
+                <a:tc>
+                  <a:txBody>
+                    <a:bodyPr/>
+                    <a:lstStyle/>
+                    <a:p>
+                      <a:endParaRPr lang="en-US"/>
+                    </a:p>
+                  </a:txBody>
+                  <a:tcPr/>
+                </a:tc>
+                <a:tc>
+                  <a:txBody>
+                    <a:bodyPr/>
+                    <a:lstStyle/>
+                    <a:p>
+                      <a:endParaRPr lang="en-US" dirty="0"/>
+                    </a:p>
+                  </a:txBody>
+                  <a:tcPr/>
+                </a:tc>
+                <a:tc>
+                  <a:txBody>
+                    <a:bodyPr/>
+                    <a:lstStyle/>
+                    <a:p>
+                      <a:endParaRPr lang="en-US" dirty="0"/>
+                    </a:p>
+                  </a:txBody>
+                  <a:tcPr>
+                    <a:solidFill>
+                      <a:srgbClr val="FF0000"/>
+                    </a:solidFill>
+                  </a:tcPr>
+                </a:tc>
+                <a:tc>
+                  <a:txBody>
+                    <a:bodyPr/>
+                    <a:lstStyle/>
+                    <a:p>
+                      <a:endParaRPr lang="en-US"/>
+                    </a:p>
+                  </a:txBody>
+                  <a:tcPr/>
+                </a:tc>
+                <a:tc>
+                  <a:txBody>
+                    <a:bodyPr/>
+                    <a:lstStyle/>
+                    <a:p>
+                      <a:endParaRPr lang="en-US"/>
+                    </a:p>
+                  </a:txBody>
+                  <a:tcPr/>
+                </a:tc>
+                <a:tc>
+                  <a:txBody>
+                    <a:bodyPr/>
+                    <a:lstStyle/>
+                    <a:p>
+                      <a:endParaRPr lang="en-US" dirty="0"/>
+                    </a:p>
+                  </a:txBody>
+                  <a:tcPr>
+                    <a:solidFill>
+                      <a:schemeClr val="bg2">
+                        <a:lumMod val="90000"/>
+                      </a:schemeClr>
+                    </a:solidFill>
+                  </a:tcPr>
+                </a:tc>
+                <a:extLst>
+                  <a:ext uri="{0D108BD9-81ED-4DB2-BD59-A6C34878D82A}">
+                    <a16:rowId xmlns:a16="http://schemas.microsoft.com/office/drawing/2014/main" val="1065175009"/>
+                  </a:ext>
+                </a:extLst>
+              </a:tr>
+              <a:tr h="122098">
+                <a:tc>
+                  <a:txBody>
+                    <a:bodyPr/>
+                    <a:lstStyle/>
+                    <a:p>
+                      <a:endParaRPr lang="en-US"/>
+                    </a:p>
+                  </a:txBody>
+                  <a:tcPr/>
+                </a:tc>
+                <a:tc>
+                  <a:txBody>
+                    <a:bodyPr/>
+                    <a:lstStyle/>
+                    <a:p>
+                      <a:endParaRPr lang="en-US"/>
+                    </a:p>
+                  </a:txBody>
+                  <a:tcPr/>
+                </a:tc>
+                <a:tc>
+                  <a:txBody>
+                    <a:bodyPr/>
+                    <a:lstStyle/>
+                    <a:p>
+                      <a:endParaRPr lang="en-US"/>
+                    </a:p>
+                  </a:txBody>
+                  <a:tcPr/>
+                </a:tc>
+                <a:tc>
+                  <a:txBody>
+                    <a:bodyPr/>
+                    <a:lstStyle/>
+                    <a:p>
+                      <a:endParaRPr lang="en-US" dirty="0"/>
+                    </a:p>
+                  </a:txBody>
+                  <a:tcPr>
+                    <a:solidFill>
+                      <a:schemeClr val="accent5"/>
+                    </a:solidFill>
+                  </a:tcPr>
+                </a:tc>
+                <a:tc>
+                  <a:txBody>
+                    <a:bodyPr/>
+                    <a:lstStyle/>
+                    <a:p>
+                      <a:endParaRPr lang="en-US" dirty="0"/>
+                    </a:p>
+                  </a:txBody>
+                  <a:tcPr>
+                    <a:solidFill>
+                      <a:schemeClr val="bg1"/>
+                    </a:solidFill>
+                  </a:tcPr>
+                </a:tc>
+                <a:tc>
+                  <a:txBody>
+                    <a:bodyPr/>
+                    <a:lstStyle/>
+                    <a:p>
+                      <a:endParaRPr lang="en-US"/>
+                    </a:p>
+                  </a:txBody>
+                  <a:tcPr/>
+                </a:tc>
+                <a:tc>
+                  <a:txBody>
+                    <a:bodyPr/>
+                    <a:lstStyle/>
+                    <a:p>
+                      <a:endParaRPr lang="en-US"/>
+                    </a:p>
+                  </a:txBody>
+                  <a:tcPr/>
+                </a:tc>
+                <a:tc>
+                  <a:txBody>
+                    <a:bodyPr/>
+                    <a:lstStyle/>
+                    <a:p>
+                      <a:endParaRPr lang="en-US"/>
+                    </a:p>
+                  </a:txBody>
+                  <a:tcPr/>
+                </a:tc>
+                <a:tc>
+                  <a:txBody>
+                    <a:bodyPr/>
+                    <a:lstStyle/>
+                    <a:p>
+                      <a:endParaRPr lang="en-US"/>
+                    </a:p>
+                  </a:txBody>
+                  <a:tcPr/>
+                </a:tc>
+                <a:tc>
+                  <a:txBody>
+                    <a:bodyPr/>
+                    <a:lstStyle/>
+                    <a:p>
+                      <a:endParaRPr lang="en-US"/>
+                    </a:p>
+                  </a:txBody>
+                  <a:tcPr/>
+                </a:tc>
+                <a:extLst>
+                  <a:ext uri="{0D108BD9-81ED-4DB2-BD59-A6C34878D82A}">
+                    <a16:rowId xmlns:a16="http://schemas.microsoft.com/office/drawing/2014/main" val="3322564858"/>
+                  </a:ext>
+                </a:extLst>
+              </a:tr>
+              <a:tr h="122098">
+                <a:tc>
+                  <a:txBody>
+                    <a:bodyPr/>
+                    <a:lstStyle/>
+                    <a:p>
+                      <a:endParaRPr lang="en-US"/>
+                    </a:p>
+                  </a:txBody>
+                  <a:tcPr/>
+                </a:tc>
+                <a:tc>
+                  <a:txBody>
+                    <a:bodyPr/>
+                    <a:lstStyle/>
+                    <a:p>
+                      <a:endParaRPr lang="en-US"/>
+                    </a:p>
+                  </a:txBody>
+                  <a:tcPr/>
+                </a:tc>
+                <a:tc>
+                  <a:txBody>
+                    <a:bodyPr/>
+                    <a:lstStyle/>
+                    <a:p>
+                      <a:endParaRPr lang="en-US"/>
+                    </a:p>
+                  </a:txBody>
+                  <a:tcPr/>
+                </a:tc>
+                <a:tc>
+                  <a:txBody>
+                    <a:bodyPr/>
+                    <a:lstStyle/>
+                    <a:p>
+                      <a:endParaRPr lang="en-US"/>
+                    </a:p>
+                  </a:txBody>
+                  <a:tcPr/>
+                </a:tc>
+                <a:tc>
+                  <a:txBody>
+                    <a:bodyPr/>
+                    <a:lstStyle/>
+                    <a:p>
+                      <a:endParaRPr lang="en-US"/>
+                    </a:p>
+                  </a:txBody>
+                  <a:tcPr/>
+                </a:tc>
+                <a:tc>
+                  <a:txBody>
+                    <a:bodyPr/>
+                    <a:lstStyle/>
+                    <a:p>
+                      <a:endParaRPr lang="en-US" dirty="0"/>
+                    </a:p>
+                  </a:txBody>
+                  <a:tcPr/>
+                </a:tc>
+                <a:tc>
+                  <a:txBody>
+                    <a:bodyPr/>
+                    <a:lstStyle/>
+                    <a:p>
+                      <a:endParaRPr lang="en-US"/>
+                    </a:p>
+                  </a:txBody>
+                  <a:tcPr/>
+                </a:tc>
+                <a:tc>
+                  <a:txBody>
+                    <a:bodyPr/>
+                    <a:lstStyle/>
+                    <a:p>
+                      <a:endParaRPr lang="en-US"/>
+                    </a:p>
+                  </a:txBody>
+                  <a:tcPr/>
+                </a:tc>
+                <a:tc>
+                  <a:txBody>
+                    <a:bodyPr/>
+                    <a:lstStyle/>
+                    <a:p>
+                      <a:endParaRPr lang="en-US"/>
+                    </a:p>
+                  </a:txBody>
+                  <a:tcPr/>
+                </a:tc>
+                <a:tc>
+                  <a:txBody>
+                    <a:bodyPr/>
+                    <a:lstStyle/>
+                    <a:p>
+                      <a:endParaRPr lang="en-US"/>
+                    </a:p>
+                  </a:txBody>
+                  <a:tcPr/>
+                </a:tc>
+                <a:extLst>
+                  <a:ext uri="{0D108BD9-81ED-4DB2-BD59-A6C34878D82A}">
+                    <a16:rowId xmlns:a16="http://schemas.microsoft.com/office/drawing/2014/main" val="666459008"/>
+                  </a:ext>
+                </a:extLst>
+              </a:tr>
+              <a:tr h="122098">
+                <a:tc>
+                  <a:txBody>
+                    <a:bodyPr/>
+                    <a:lstStyle/>
+                    <a:p>
+                      <a:endParaRPr lang="en-US"/>
+                    </a:p>
+                  </a:txBody>
+                  <a:tcPr/>
+                </a:tc>
+                <a:tc>
+                  <a:txBody>
+                    <a:bodyPr/>
+                    <a:lstStyle/>
+                    <a:p>
+                      <a:endParaRPr lang="en-US"/>
+                    </a:p>
+                  </a:txBody>
+                  <a:tcPr/>
+                </a:tc>
+                <a:tc>
+                  <a:txBody>
+                    <a:bodyPr/>
+                    <a:lstStyle/>
+                    <a:p>
+                      <a:endParaRPr lang="en-US"/>
+                    </a:p>
+                  </a:txBody>
+                  <a:tcPr/>
+                </a:tc>
+                <a:tc>
+                  <a:txBody>
+                    <a:bodyPr/>
+                    <a:lstStyle/>
+                    <a:p>
+                      <a:endParaRPr lang="en-US"/>
+                    </a:p>
+                  </a:txBody>
+                  <a:tcPr/>
+                </a:tc>
+                <a:tc>
+                  <a:txBody>
+                    <a:bodyPr/>
+                    <a:lstStyle/>
+                    <a:p>
+                      <a:endParaRPr lang="en-US"/>
+                    </a:p>
+                  </a:txBody>
+                  <a:tcPr/>
+                </a:tc>
+                <a:tc>
+                  <a:txBody>
+                    <a:bodyPr/>
+                    <a:lstStyle/>
+                    <a:p>
+                      <a:endParaRPr lang="en-US"/>
+                    </a:p>
+                  </a:txBody>
+                  <a:tcPr/>
+                </a:tc>
+                <a:tc>
+                  <a:txBody>
+                    <a:bodyPr/>
+                    <a:lstStyle/>
+                    <a:p>
+                      <a:endParaRPr lang="en-US" dirty="0"/>
+                    </a:p>
+                  </a:txBody>
+                  <a:tcPr/>
+                </a:tc>
+                <a:tc>
+                  <a:txBody>
+                    <a:bodyPr/>
+                    <a:lstStyle/>
+                    <a:p>
+                      <a:endParaRPr lang="en-US"/>
+                    </a:p>
+                  </a:txBody>
+                  <a:tcPr/>
+                </a:tc>
+                <a:tc>
+                  <a:txBody>
+                    <a:bodyPr/>
+                    <a:lstStyle/>
+                    <a:p>
+                      <a:endParaRPr lang="en-US"/>
+                    </a:p>
+                  </a:txBody>
+                  <a:tcPr/>
+                </a:tc>
+                <a:tc>
+                  <a:txBody>
+                    <a:bodyPr/>
+                    <a:lstStyle/>
+                    <a:p>
+                      <a:endParaRPr lang="en-US"/>
+                    </a:p>
+                  </a:txBody>
+                  <a:tcPr/>
+                </a:tc>
+                <a:extLst>
+                  <a:ext uri="{0D108BD9-81ED-4DB2-BD59-A6C34878D82A}">
+                    <a16:rowId xmlns:a16="http://schemas.microsoft.com/office/drawing/2014/main" val="3117541777"/>
+                  </a:ext>
+                </a:extLst>
+              </a:tr>
+              <a:tr h="122098">
+                <a:tc>
+                  <a:txBody>
+                    <a:bodyPr/>
+                    <a:lstStyle/>
+                    <a:p>
+                      <a:endParaRPr lang="en-US"/>
+                    </a:p>
+                  </a:txBody>
+                  <a:tcPr/>
+                </a:tc>
+                <a:tc>
+                  <a:txBody>
+                    <a:bodyPr/>
+                    <a:lstStyle/>
+                    <a:p>
+                      <a:endParaRPr lang="en-US"/>
+                    </a:p>
+                  </a:txBody>
+                  <a:tcPr/>
+                </a:tc>
+                <a:tc>
+                  <a:txBody>
+                    <a:bodyPr/>
+                    <a:lstStyle/>
+                    <a:p>
+                      <a:endParaRPr lang="en-US"/>
+                    </a:p>
+                  </a:txBody>
+                  <a:tcPr/>
+                </a:tc>
+                <a:tc>
+                  <a:txBody>
+                    <a:bodyPr/>
+                    <a:lstStyle/>
+                    <a:p>
+                      <a:endParaRPr lang="en-US"/>
+                    </a:p>
+                  </a:txBody>
+                  <a:tcPr/>
+                </a:tc>
+                <a:tc>
+                  <a:txBody>
+                    <a:bodyPr/>
+                    <a:lstStyle/>
+                    <a:p>
+                      <a:endParaRPr lang="en-US"/>
+                    </a:p>
+                  </a:txBody>
+                  <a:tcPr/>
+                </a:tc>
+                <a:tc>
+                  <a:txBody>
+                    <a:bodyPr/>
+                    <a:lstStyle/>
+                    <a:p>
+                      <a:endParaRPr lang="en-US"/>
+                    </a:p>
+                  </a:txBody>
+                  <a:tcPr/>
+                </a:tc>
+                <a:tc>
+                  <a:txBody>
+                    <a:bodyPr/>
+                    <a:lstStyle/>
+                    <a:p>
+                      <a:endParaRPr lang="en-US"/>
+                    </a:p>
+                  </a:txBody>
+                  <a:tcPr/>
+                </a:tc>
+                <a:tc>
+                  <a:txBody>
+                    <a:bodyPr/>
+                    <a:lstStyle/>
+                    <a:p>
+                      <a:endParaRPr lang="en-US"/>
+                    </a:p>
+                  </a:txBody>
+                  <a:tcPr/>
+                </a:tc>
+                <a:tc>
+                  <a:txBody>
+                    <a:bodyPr/>
+                    <a:lstStyle/>
+                    <a:p>
+                      <a:endParaRPr lang="en-US"/>
+                    </a:p>
+                  </a:txBody>
+                  <a:tcPr/>
+                </a:tc>
+                <a:tc>
+                  <a:txBody>
+                    <a:bodyPr/>
+                    <a:lstStyle/>
+                    <a:p>
+                      <a:endParaRPr lang="en-US"/>
+                    </a:p>
+                  </a:txBody>
+                  <a:tcPr/>
+                </a:tc>
+                <a:extLst>
+                  <a:ext uri="{0D108BD9-81ED-4DB2-BD59-A6C34878D82A}">
+                    <a16:rowId xmlns:a16="http://schemas.microsoft.com/office/drawing/2014/main" val="587711478"/>
+                  </a:ext>
+                </a:extLst>
+              </a:tr>
+              <a:tr h="122098">
+                <a:tc>
+                  <a:txBody>
+                    <a:bodyPr/>
+                    <a:lstStyle/>
+                    <a:p>
+                      <a:endParaRPr lang="en-US"/>
+                    </a:p>
+                  </a:txBody>
+                  <a:tcPr/>
+                </a:tc>
+                <a:tc>
+                  <a:txBody>
+                    <a:bodyPr/>
+                    <a:lstStyle/>
+                    <a:p>
+                      <a:endParaRPr lang="en-US"/>
+                    </a:p>
+                  </a:txBody>
+                  <a:tcPr/>
+                </a:tc>
+                <a:tc>
+                  <a:txBody>
+                    <a:bodyPr/>
+                    <a:lstStyle/>
+                    <a:p>
+                      <a:endParaRPr lang="en-US" dirty="0"/>
+                    </a:p>
+                  </a:txBody>
+                  <a:tcPr/>
+                </a:tc>
+                <a:tc>
+                  <a:txBody>
+                    <a:bodyPr/>
+                    <a:lstStyle/>
+                    <a:p>
+                      <a:endParaRPr lang="en-US"/>
+                    </a:p>
+                  </a:txBody>
+                  <a:tcPr/>
+                </a:tc>
+                <a:tc>
+                  <a:txBody>
+                    <a:bodyPr/>
+                    <a:lstStyle/>
+                    <a:p>
+                      <a:endParaRPr lang="en-US"/>
+                    </a:p>
+                  </a:txBody>
+                  <a:tcPr/>
+                </a:tc>
+                <a:tc>
+                  <a:txBody>
+                    <a:bodyPr/>
+                    <a:lstStyle/>
+                    <a:p>
+                      <a:endParaRPr lang="en-US"/>
+                    </a:p>
+                  </a:txBody>
+                  <a:tcPr/>
+                </a:tc>
+                <a:tc>
+                  <a:txBody>
+                    <a:bodyPr/>
+                    <a:lstStyle/>
+                    <a:p>
+                      <a:endParaRPr lang="en-US"/>
+                    </a:p>
+                  </a:txBody>
+                  <a:tcPr/>
+                </a:tc>
+                <a:tc>
+                  <a:txBody>
+                    <a:bodyPr/>
+                    <a:lstStyle/>
+                    <a:p>
+                      <a:endParaRPr lang="en-US"/>
+                    </a:p>
+                  </a:txBody>
+                  <a:tcPr/>
+                </a:tc>
+                <a:tc>
+                  <a:txBody>
+                    <a:bodyPr/>
+                    <a:lstStyle/>
+                    <a:p>
+                      <a:endParaRPr lang="en-US"/>
+                    </a:p>
+                  </a:txBody>
+                  <a:tcPr/>
+                </a:tc>
+                <a:tc>
+                  <a:txBody>
+                    <a:bodyPr/>
+                    <a:lstStyle/>
+                    <a:p>
+                      <a:endParaRPr lang="en-US" dirty="0"/>
+                    </a:p>
+                  </a:txBody>
+                  <a:tcPr>
+                    <a:solidFill>
+                      <a:schemeClr val="accent5"/>
+                    </a:solidFill>
+                  </a:tcPr>
+                </a:tc>
+                <a:extLst>
+                  <a:ext uri="{0D108BD9-81ED-4DB2-BD59-A6C34878D82A}">
+                    <a16:rowId xmlns:a16="http://schemas.microsoft.com/office/drawing/2014/main" val="123372279"/>
+                  </a:ext>
+                </a:extLst>
+              </a:tr>
+            </a:tbl>
+          </a:graphicData>
+        </a:graphic>
+      </p:graphicFrame>
+      <p:graphicFrame>
+        <p:nvGraphicFramePr>
+          <p:cNvPr id="5" name="Table 4">
+            <a:extLst>
+              <a:ext uri="{FF2B5EF4-FFF2-40B4-BE49-F238E27FC236}">
+                <a16:creationId xmlns:a16="http://schemas.microsoft.com/office/drawing/2014/main" id="{0CA5BF42-1B92-4A61-A6CF-AD86CFA43BAB}"/>
+              </a:ext>
+            </a:extLst>
+          </p:cNvPr>
+          <p:cNvGraphicFramePr>
+            <a:graphicFrameLocks noGrp="1"/>
+          </p:cNvGraphicFramePr>
+          <p:nvPr>
+            <p:extLst>
+              <p:ext uri="{D42A27DB-BD31-4B8C-83A1-F6EECF244321}">
+                <p14:modId xmlns:p14="http://schemas.microsoft.com/office/powerpoint/2010/main" val="1966281498"/>
+              </p:ext>
+            </p:extLst>
+          </p:nvPr>
+        </p:nvGraphicFramePr>
+        <p:xfrm>
+          <a:off x="9448085" y="1806734"/>
+          <a:ext cx="2385450" cy="2194560"/>
+        </p:xfrm>
+        <a:graphic>
+          <a:graphicData uri="http://schemas.openxmlformats.org/drawingml/2006/table">
+            <a:tbl>
+              <a:tblPr firstRow="1" bandRow="1">
+                <a:tableStyleId>{5940675A-B579-460E-94D1-54222C63F5DA}</a:tableStyleId>
+              </a:tblPr>
+              <a:tblGrid>
+                <a:gridCol w="268810">
+                  <a:extLst>
+                    <a:ext uri="{9D8B030D-6E8A-4147-A177-3AD203B41FA5}">
+                      <a16:colId xmlns:a16="http://schemas.microsoft.com/office/drawing/2014/main" val="4054565479"/>
+                    </a:ext>
+                  </a:extLst>
+                </a:gridCol>
+                <a:gridCol w="208280">
+                  <a:extLst>
+                    <a:ext uri="{9D8B030D-6E8A-4147-A177-3AD203B41FA5}">
+                      <a16:colId xmlns:a16="http://schemas.microsoft.com/office/drawing/2014/main" val="1296035226"/>
+                    </a:ext>
+                  </a:extLst>
+                </a:gridCol>
+                <a:gridCol w="238545">
+                  <a:extLst>
+                    <a:ext uri="{9D8B030D-6E8A-4147-A177-3AD203B41FA5}">
+                      <a16:colId xmlns:a16="http://schemas.microsoft.com/office/drawing/2014/main" val="598123529"/>
+                    </a:ext>
+                  </a:extLst>
+                </a:gridCol>
+                <a:gridCol w="238545">
+                  <a:extLst>
+                    <a:ext uri="{9D8B030D-6E8A-4147-A177-3AD203B41FA5}">
+                      <a16:colId xmlns:a16="http://schemas.microsoft.com/office/drawing/2014/main" val="313009279"/>
+                    </a:ext>
+                  </a:extLst>
+                </a:gridCol>
+                <a:gridCol w="238545">
+                  <a:extLst>
+                    <a:ext uri="{9D8B030D-6E8A-4147-A177-3AD203B41FA5}">
+                      <a16:colId xmlns:a16="http://schemas.microsoft.com/office/drawing/2014/main" val="3886772213"/>
+                    </a:ext>
+                  </a:extLst>
+                </a:gridCol>
+                <a:gridCol w="238545">
+                  <a:extLst>
+                    <a:ext uri="{9D8B030D-6E8A-4147-A177-3AD203B41FA5}">
+                      <a16:colId xmlns:a16="http://schemas.microsoft.com/office/drawing/2014/main" val="3361492463"/>
+                    </a:ext>
+                  </a:extLst>
+                </a:gridCol>
+                <a:gridCol w="238545">
+                  <a:extLst>
+                    <a:ext uri="{9D8B030D-6E8A-4147-A177-3AD203B41FA5}">
+                      <a16:colId xmlns:a16="http://schemas.microsoft.com/office/drawing/2014/main" val="2726099323"/>
+                    </a:ext>
+                  </a:extLst>
+                </a:gridCol>
+                <a:gridCol w="238545">
+                  <a:extLst>
+                    <a:ext uri="{9D8B030D-6E8A-4147-A177-3AD203B41FA5}">
+                      <a16:colId xmlns:a16="http://schemas.microsoft.com/office/drawing/2014/main" val="3165214645"/>
+                    </a:ext>
+                  </a:extLst>
+                </a:gridCol>
+                <a:gridCol w="238545">
+                  <a:extLst>
+                    <a:ext uri="{9D8B030D-6E8A-4147-A177-3AD203B41FA5}">
+                      <a16:colId xmlns:a16="http://schemas.microsoft.com/office/drawing/2014/main" val="3074088871"/>
+                    </a:ext>
+                  </a:extLst>
+                </a:gridCol>
+                <a:gridCol w="238545">
+                  <a:extLst>
+                    <a:ext uri="{9D8B030D-6E8A-4147-A177-3AD203B41FA5}">
+                      <a16:colId xmlns:a16="http://schemas.microsoft.com/office/drawing/2014/main" val="1828758157"/>
+                    </a:ext>
+                  </a:extLst>
+                </a:gridCol>
+              </a:tblGrid>
+              <a:tr h="122098">
+                <a:tc>
+                  <a:txBody>
+                    <a:bodyPr/>
+                    <a:lstStyle/>
+                    <a:p>
+                      <a:endParaRPr lang="en-US" dirty="0"/>
+                    </a:p>
+                  </a:txBody>
+                  <a:tcPr>
+                    <a:solidFill>
+                      <a:srgbClr val="FF0000"/>
+                    </a:solidFill>
+                  </a:tcPr>
+                </a:tc>
+                <a:tc>
+                  <a:txBody>
+                    <a:bodyPr/>
+                    <a:lstStyle/>
+                    <a:p>
+                      <a:endParaRPr lang="en-US" dirty="0"/>
+                    </a:p>
+                  </a:txBody>
+                  <a:tcPr>
+                    <a:solidFill>
+                      <a:srgbClr val="FF0000"/>
+                    </a:solidFill>
+                  </a:tcPr>
+                </a:tc>
+                <a:tc>
+                  <a:txBody>
+                    <a:bodyPr/>
+                    <a:lstStyle/>
+                    <a:p>
+                      <a:endParaRPr lang="en-US" dirty="0"/>
+                    </a:p>
+                  </a:txBody>
+                  <a:tcPr>
+                    <a:solidFill>
+                      <a:schemeClr val="bg2"/>
+                    </a:solidFill>
+                  </a:tcPr>
+                </a:tc>
+                <a:tc>
+                  <a:txBody>
+                    <a:bodyPr/>
+                    <a:lstStyle/>
+                    <a:p>
+                      <a:endParaRPr lang="en-US" dirty="0"/>
+                    </a:p>
+                  </a:txBody>
+                  <a:tcPr>
+                    <a:solidFill>
+                      <a:schemeClr val="bg2"/>
+                    </a:solidFill>
+                  </a:tcPr>
+                </a:tc>
+                <a:tc>
+                  <a:txBody>
+                    <a:bodyPr/>
+                    <a:lstStyle/>
+                    <a:p>
+                      <a:endParaRPr lang="en-US"/>
+                    </a:p>
+                  </a:txBody>
+                  <a:tcPr/>
+                </a:tc>
+                <a:tc>
+                  <a:txBody>
+                    <a:bodyPr/>
+                    <a:lstStyle/>
+                    <a:p>
+                      <a:endParaRPr lang="en-US"/>
+                    </a:p>
+                  </a:txBody>
+                  <a:tcPr/>
+                </a:tc>
+                <a:tc>
+                  <a:txBody>
+                    <a:bodyPr/>
+                    <a:lstStyle/>
+                    <a:p>
+                      <a:endParaRPr lang="en-US" dirty="0"/>
+                    </a:p>
+                  </a:txBody>
+                  <a:tcPr>
+                    <a:solidFill>
+                      <a:srgbClr val="FF0000"/>
+                    </a:solidFill>
+                  </a:tcPr>
+                </a:tc>
+                <a:tc>
+                  <a:txBody>
+                    <a:bodyPr/>
+                    <a:lstStyle/>
+                    <a:p>
+                      <a:endParaRPr lang="en-US"/>
+                    </a:p>
+                  </a:txBody>
+                  <a:tcPr/>
+                </a:tc>
+                <a:tc>
+                  <a:txBody>
+                    <a:bodyPr/>
+                    <a:lstStyle/>
+                    <a:p>
+                      <a:endParaRPr lang="en-US"/>
+                    </a:p>
+                  </a:txBody>
+                  <a:tcPr/>
+                </a:tc>
+                <a:tc>
+                  <a:txBody>
+                    <a:bodyPr/>
+                    <a:lstStyle/>
+                    <a:p>
+                      <a:endParaRPr lang="en-US" dirty="0"/>
+                    </a:p>
+                  </a:txBody>
+                  <a:tcPr>
+                    <a:solidFill>
+                      <a:schemeClr val="bg2"/>
+                    </a:solidFill>
+                  </a:tcPr>
+                </a:tc>
+                <a:extLst>
+                  <a:ext uri="{0D108BD9-81ED-4DB2-BD59-A6C34878D82A}">
+                    <a16:rowId xmlns:a16="http://schemas.microsoft.com/office/drawing/2014/main" val="1065175009"/>
+                  </a:ext>
+                </a:extLst>
+              </a:tr>
+              <a:tr h="122098">
+                <a:tc>
+                  <a:txBody>
+                    <a:bodyPr/>
+                    <a:lstStyle/>
+                    <a:p>
+                      <a:endParaRPr lang="en-US"/>
+                    </a:p>
+                  </a:txBody>
+                  <a:tcPr/>
+                </a:tc>
+                <a:tc>
+                  <a:txBody>
+                    <a:bodyPr/>
+                    <a:lstStyle/>
+                    <a:p>
+                      <a:endParaRPr lang="en-US"/>
+                    </a:p>
+                  </a:txBody>
+                  <a:tcPr/>
+                </a:tc>
+                <a:tc>
+                  <a:txBody>
+                    <a:bodyPr/>
+                    <a:lstStyle/>
+                    <a:p>
+                      <a:endParaRPr lang="en-US"/>
+                    </a:p>
+                  </a:txBody>
+                  <a:tcPr/>
+                </a:tc>
+                <a:tc>
+                  <a:txBody>
+                    <a:bodyPr/>
+                    <a:lstStyle/>
+                    <a:p>
+                      <a:endParaRPr lang="en-US" dirty="0"/>
+                    </a:p>
+                  </a:txBody>
+                  <a:tcPr>
+                    <a:solidFill>
+                      <a:schemeClr val="accent5"/>
+                    </a:solidFill>
+                  </a:tcPr>
+                </a:tc>
+                <a:tc>
+                  <a:txBody>
+                    <a:bodyPr/>
+                    <a:lstStyle/>
+                    <a:p>
+                      <a:endParaRPr lang="en-US" dirty="0"/>
+                    </a:p>
+                  </a:txBody>
+                  <a:tcPr>
+                    <a:noFill/>
+                  </a:tcPr>
+                </a:tc>
+                <a:tc>
+                  <a:txBody>
+                    <a:bodyPr/>
+                    <a:lstStyle/>
+                    <a:p>
+                      <a:endParaRPr lang="en-US"/>
+                    </a:p>
+                  </a:txBody>
+                  <a:tcPr/>
+                </a:tc>
+                <a:tc>
+                  <a:txBody>
+                    <a:bodyPr/>
+                    <a:lstStyle/>
+                    <a:p>
+                      <a:endParaRPr lang="en-US"/>
+                    </a:p>
+                  </a:txBody>
+                  <a:tcPr/>
+                </a:tc>
+                <a:tc>
+                  <a:txBody>
+                    <a:bodyPr/>
+                    <a:lstStyle/>
+                    <a:p>
+                      <a:endParaRPr lang="en-US"/>
+                    </a:p>
+                  </a:txBody>
+                  <a:tcPr/>
+                </a:tc>
+                <a:tc>
+                  <a:txBody>
+                    <a:bodyPr/>
+                    <a:lstStyle/>
+                    <a:p>
+                      <a:endParaRPr lang="en-US"/>
+                    </a:p>
+                  </a:txBody>
+                  <a:tcPr/>
+                </a:tc>
+                <a:tc>
+                  <a:txBody>
+                    <a:bodyPr/>
+                    <a:lstStyle/>
+                    <a:p>
+                      <a:endParaRPr lang="en-US"/>
+                    </a:p>
+                  </a:txBody>
+                  <a:tcPr/>
+                </a:tc>
+                <a:extLst>
+                  <a:ext uri="{0D108BD9-81ED-4DB2-BD59-A6C34878D82A}">
+                    <a16:rowId xmlns:a16="http://schemas.microsoft.com/office/drawing/2014/main" val="3322564858"/>
+                  </a:ext>
+                </a:extLst>
+              </a:tr>
+              <a:tr h="122098">
+                <a:tc>
+                  <a:txBody>
+                    <a:bodyPr/>
+                    <a:lstStyle/>
+                    <a:p>
+                      <a:endParaRPr lang="en-US"/>
+                    </a:p>
+                  </a:txBody>
+                  <a:tcPr/>
+                </a:tc>
+                <a:tc>
+                  <a:txBody>
+                    <a:bodyPr/>
+                    <a:lstStyle/>
+                    <a:p>
+                      <a:endParaRPr lang="en-US"/>
+                    </a:p>
+                  </a:txBody>
+                  <a:tcPr/>
+                </a:tc>
+                <a:tc>
+                  <a:txBody>
+                    <a:bodyPr/>
+                    <a:lstStyle/>
+                    <a:p>
+                      <a:endParaRPr lang="en-US"/>
+                    </a:p>
+                  </a:txBody>
+                  <a:tcPr/>
+                </a:tc>
+                <a:tc>
+                  <a:txBody>
+                    <a:bodyPr/>
+                    <a:lstStyle/>
+                    <a:p>
+                      <a:endParaRPr lang="en-US"/>
+                    </a:p>
+                  </a:txBody>
+                  <a:tcPr/>
+                </a:tc>
+                <a:tc>
+                  <a:txBody>
+                    <a:bodyPr/>
+                    <a:lstStyle/>
+                    <a:p>
+                      <a:endParaRPr lang="en-US"/>
+                    </a:p>
+                  </a:txBody>
+                  <a:tcPr/>
+                </a:tc>
+                <a:tc>
+                  <a:txBody>
+                    <a:bodyPr/>
+                    <a:lstStyle/>
+                    <a:p>
+                      <a:endParaRPr lang="en-US" dirty="0"/>
+                    </a:p>
+                  </a:txBody>
+                  <a:tcPr/>
+                </a:tc>
+                <a:tc>
+                  <a:txBody>
+                    <a:bodyPr/>
+                    <a:lstStyle/>
+                    <a:p>
+                      <a:endParaRPr lang="en-US"/>
+                    </a:p>
+                  </a:txBody>
+                  <a:tcPr/>
+                </a:tc>
+                <a:tc>
+                  <a:txBody>
+                    <a:bodyPr/>
+                    <a:lstStyle/>
+                    <a:p>
+                      <a:endParaRPr lang="en-US"/>
+                    </a:p>
+                  </a:txBody>
+                  <a:tcPr/>
+                </a:tc>
+                <a:tc>
+                  <a:txBody>
+                    <a:bodyPr/>
+                    <a:lstStyle/>
+                    <a:p>
+                      <a:endParaRPr lang="en-US"/>
+                    </a:p>
+                  </a:txBody>
+                  <a:tcPr/>
+                </a:tc>
+                <a:tc>
+                  <a:txBody>
+                    <a:bodyPr/>
+                    <a:lstStyle/>
+                    <a:p>
+                      <a:endParaRPr lang="en-US"/>
+                    </a:p>
+                  </a:txBody>
+                  <a:tcPr/>
+                </a:tc>
+                <a:extLst>
+                  <a:ext uri="{0D108BD9-81ED-4DB2-BD59-A6C34878D82A}">
+                    <a16:rowId xmlns:a16="http://schemas.microsoft.com/office/drawing/2014/main" val="666459008"/>
+                  </a:ext>
+                </a:extLst>
+              </a:tr>
+              <a:tr h="122098">
+                <a:tc>
+                  <a:txBody>
+                    <a:bodyPr/>
+                    <a:lstStyle/>
+                    <a:p>
+                      <a:endParaRPr lang="en-US"/>
+                    </a:p>
+                  </a:txBody>
+                  <a:tcPr/>
+                </a:tc>
+                <a:tc>
+                  <a:txBody>
+                    <a:bodyPr/>
+                    <a:lstStyle/>
+                    <a:p>
+                      <a:endParaRPr lang="en-US"/>
+                    </a:p>
+                  </a:txBody>
+                  <a:tcPr/>
+                </a:tc>
+                <a:tc>
+                  <a:txBody>
+                    <a:bodyPr/>
+                    <a:lstStyle/>
+                    <a:p>
+                      <a:endParaRPr lang="en-US"/>
+                    </a:p>
+                  </a:txBody>
+                  <a:tcPr/>
+                </a:tc>
+                <a:tc>
+                  <a:txBody>
+                    <a:bodyPr/>
+                    <a:lstStyle/>
+                    <a:p>
+                      <a:endParaRPr lang="en-US"/>
+                    </a:p>
+                  </a:txBody>
+                  <a:tcPr/>
+                </a:tc>
+                <a:tc>
+                  <a:txBody>
+                    <a:bodyPr/>
+                    <a:lstStyle/>
+                    <a:p>
+                      <a:endParaRPr lang="en-US"/>
+                    </a:p>
+                  </a:txBody>
+                  <a:tcPr/>
+                </a:tc>
+                <a:tc>
+                  <a:txBody>
+                    <a:bodyPr/>
+                    <a:lstStyle/>
+                    <a:p>
+                      <a:endParaRPr lang="en-US"/>
+                    </a:p>
+                  </a:txBody>
+                  <a:tcPr/>
+                </a:tc>
+                <a:tc>
+                  <a:txBody>
+                    <a:bodyPr/>
+                    <a:lstStyle/>
+                    <a:p>
+                      <a:endParaRPr lang="en-US" dirty="0"/>
+                    </a:p>
+                  </a:txBody>
+                  <a:tcPr/>
+                </a:tc>
+                <a:tc>
+                  <a:txBody>
+                    <a:bodyPr/>
+                    <a:lstStyle/>
+                    <a:p>
+                      <a:endParaRPr lang="en-US"/>
+                    </a:p>
+                  </a:txBody>
+                  <a:tcPr/>
+                </a:tc>
+                <a:tc>
+                  <a:txBody>
+                    <a:bodyPr/>
+                    <a:lstStyle/>
+                    <a:p>
+                      <a:endParaRPr lang="en-US"/>
+                    </a:p>
+                  </a:txBody>
+                  <a:tcPr/>
+                </a:tc>
+                <a:tc>
+                  <a:txBody>
+                    <a:bodyPr/>
+                    <a:lstStyle/>
+                    <a:p>
+                      <a:endParaRPr lang="en-US"/>
+                    </a:p>
+                  </a:txBody>
+                  <a:tcPr/>
+                </a:tc>
+                <a:extLst>
+                  <a:ext uri="{0D108BD9-81ED-4DB2-BD59-A6C34878D82A}">
+                    <a16:rowId xmlns:a16="http://schemas.microsoft.com/office/drawing/2014/main" val="3117541777"/>
+                  </a:ext>
+                </a:extLst>
+              </a:tr>
+              <a:tr h="122098">
+                <a:tc>
+                  <a:txBody>
+                    <a:bodyPr/>
+                    <a:lstStyle/>
+                    <a:p>
+                      <a:endParaRPr lang="en-US"/>
+                    </a:p>
+                  </a:txBody>
+                  <a:tcPr/>
+                </a:tc>
+                <a:tc>
+                  <a:txBody>
+                    <a:bodyPr/>
+                    <a:lstStyle/>
+                    <a:p>
+                      <a:endParaRPr lang="en-US"/>
+                    </a:p>
+                  </a:txBody>
+                  <a:tcPr/>
+                </a:tc>
+                <a:tc>
+                  <a:txBody>
+                    <a:bodyPr/>
+                    <a:lstStyle/>
+                    <a:p>
+                      <a:endParaRPr lang="en-US"/>
+                    </a:p>
+                  </a:txBody>
+                  <a:tcPr/>
+                </a:tc>
+                <a:tc>
+                  <a:txBody>
+                    <a:bodyPr/>
+                    <a:lstStyle/>
+                    <a:p>
+                      <a:endParaRPr lang="en-US"/>
+                    </a:p>
+                  </a:txBody>
+                  <a:tcPr/>
+                </a:tc>
+                <a:tc>
+                  <a:txBody>
+                    <a:bodyPr/>
+                    <a:lstStyle/>
+                    <a:p>
+                      <a:endParaRPr lang="en-US" dirty="0"/>
+                    </a:p>
+                  </a:txBody>
+                  <a:tcPr/>
+                </a:tc>
+                <a:tc>
+                  <a:txBody>
+                    <a:bodyPr/>
+                    <a:lstStyle/>
+                    <a:p>
+                      <a:endParaRPr lang="en-US"/>
+                    </a:p>
+                  </a:txBody>
+                  <a:tcPr/>
+                </a:tc>
+                <a:tc>
+                  <a:txBody>
+                    <a:bodyPr/>
+                    <a:lstStyle/>
+                    <a:p>
+                      <a:endParaRPr lang="en-US"/>
+                    </a:p>
+                  </a:txBody>
+                  <a:tcPr/>
+                </a:tc>
+                <a:tc>
+                  <a:txBody>
+                    <a:bodyPr/>
+                    <a:lstStyle/>
+                    <a:p>
+                      <a:endParaRPr lang="en-US"/>
+                    </a:p>
+                  </a:txBody>
+                  <a:tcPr/>
+                </a:tc>
+                <a:tc>
+                  <a:txBody>
+                    <a:bodyPr/>
+                    <a:lstStyle/>
+                    <a:p>
+                      <a:endParaRPr lang="en-US"/>
+                    </a:p>
+                  </a:txBody>
+                  <a:tcPr/>
+                </a:tc>
+                <a:tc>
+                  <a:txBody>
+                    <a:bodyPr/>
+                    <a:lstStyle/>
+                    <a:p>
+                      <a:endParaRPr lang="en-US"/>
+                    </a:p>
+                  </a:txBody>
+                  <a:tcPr/>
+                </a:tc>
+                <a:extLst>
+                  <a:ext uri="{0D108BD9-81ED-4DB2-BD59-A6C34878D82A}">
+                    <a16:rowId xmlns:a16="http://schemas.microsoft.com/office/drawing/2014/main" val="587711478"/>
+                  </a:ext>
+                </a:extLst>
+              </a:tr>
+              <a:tr h="122098">
+                <a:tc>
+                  <a:txBody>
+                    <a:bodyPr/>
+                    <a:lstStyle/>
+                    <a:p>
+                      <a:endParaRPr lang="en-US"/>
+                    </a:p>
+                  </a:txBody>
+                  <a:tcPr/>
+                </a:tc>
+                <a:tc>
+                  <a:txBody>
+                    <a:bodyPr/>
+                    <a:lstStyle/>
+                    <a:p>
+                      <a:endParaRPr lang="en-US"/>
+                    </a:p>
+                  </a:txBody>
+                  <a:tcPr/>
+                </a:tc>
+                <a:tc>
+                  <a:txBody>
+                    <a:bodyPr/>
+                    <a:lstStyle/>
+                    <a:p>
+                      <a:endParaRPr lang="en-US"/>
+                    </a:p>
+                  </a:txBody>
+                  <a:tcPr/>
+                </a:tc>
+                <a:tc>
+                  <a:txBody>
+                    <a:bodyPr/>
+                    <a:lstStyle/>
+                    <a:p>
+                      <a:endParaRPr lang="en-US"/>
+                    </a:p>
+                  </a:txBody>
+                  <a:tcPr/>
+                </a:tc>
+                <a:tc>
+                  <a:txBody>
+                    <a:bodyPr/>
+                    <a:lstStyle/>
+                    <a:p>
+                      <a:endParaRPr lang="en-US"/>
+                    </a:p>
+                  </a:txBody>
+                  <a:tcPr/>
+                </a:tc>
+                <a:tc>
+                  <a:txBody>
+                    <a:bodyPr/>
+                    <a:lstStyle/>
+                    <a:p>
+                      <a:endParaRPr lang="en-US"/>
+                    </a:p>
+                  </a:txBody>
+                  <a:tcPr/>
+                </a:tc>
+                <a:tc>
+                  <a:txBody>
+                    <a:bodyPr/>
+                    <a:lstStyle/>
+                    <a:p>
+                      <a:endParaRPr lang="en-US"/>
+                    </a:p>
+                  </a:txBody>
+                  <a:tcPr/>
+                </a:tc>
+                <a:tc>
+                  <a:txBody>
+                    <a:bodyPr/>
+                    <a:lstStyle/>
+                    <a:p>
+                      <a:endParaRPr lang="en-US"/>
+                    </a:p>
+                  </a:txBody>
+                  <a:tcPr/>
+                </a:tc>
+                <a:tc>
+                  <a:txBody>
+                    <a:bodyPr/>
+                    <a:lstStyle/>
+                    <a:p>
+                      <a:endParaRPr lang="en-US"/>
+                    </a:p>
+                  </a:txBody>
+                  <a:tcPr/>
+                </a:tc>
+                <a:tc>
+                  <a:txBody>
+                    <a:bodyPr/>
+                    <a:lstStyle/>
+                    <a:p>
+                      <a:endParaRPr lang="en-US" dirty="0"/>
+                    </a:p>
+                  </a:txBody>
+                  <a:tcPr>
+                    <a:solidFill>
+                      <a:schemeClr val="accent5"/>
+                    </a:solidFill>
+                  </a:tcPr>
+                </a:tc>
+                <a:extLst>
+                  <a:ext uri="{0D108BD9-81ED-4DB2-BD59-A6C34878D82A}">
+                    <a16:rowId xmlns:a16="http://schemas.microsoft.com/office/drawing/2014/main" val="123372279"/>
+                  </a:ext>
+                </a:extLst>
+              </a:tr>
+            </a:tbl>
+          </a:graphicData>
+        </a:graphic>
+      </p:graphicFrame>
+      <p:graphicFrame>
+        <p:nvGraphicFramePr>
+          <p:cNvPr id="7" name="Table 4">
+            <a:extLst>
+              <a:ext uri="{FF2B5EF4-FFF2-40B4-BE49-F238E27FC236}">
+                <a16:creationId xmlns:a16="http://schemas.microsoft.com/office/drawing/2014/main" id="{533B6A4A-5D1C-4F8F-BD8E-9F33F33B4CD8}"/>
+              </a:ext>
+            </a:extLst>
+          </p:cNvPr>
+          <p:cNvGraphicFramePr>
+            <a:graphicFrameLocks noGrp="1"/>
+          </p:cNvGraphicFramePr>
+          <p:nvPr>
+            <p:extLst>
+              <p:ext uri="{D42A27DB-BD31-4B8C-83A1-F6EECF244321}">
+                <p14:modId xmlns:p14="http://schemas.microsoft.com/office/powerpoint/2010/main" val="1285034060"/>
+              </p:ext>
+            </p:extLst>
+          </p:nvPr>
+        </p:nvGraphicFramePr>
+        <p:xfrm>
+          <a:off x="9382440" y="5137037"/>
+          <a:ext cx="1192725" cy="365760"/>
+        </p:xfrm>
+        <a:graphic>
+          <a:graphicData uri="http://schemas.openxmlformats.org/drawingml/2006/table">
+            <a:tbl>
+              <a:tblPr firstRow="1" bandRow="1">
+                <a:tableStyleId>{5940675A-B579-460E-94D1-54222C63F5DA}</a:tableStyleId>
+              </a:tblPr>
+              <a:tblGrid>
+                <a:gridCol w="268810">
+                  <a:extLst>
+                    <a:ext uri="{9D8B030D-6E8A-4147-A177-3AD203B41FA5}">
+                      <a16:colId xmlns:a16="http://schemas.microsoft.com/office/drawing/2014/main" val="4054565479"/>
+                    </a:ext>
+                  </a:extLst>
+                </a:gridCol>
+                <a:gridCol w="208280">
+                  <a:extLst>
+                    <a:ext uri="{9D8B030D-6E8A-4147-A177-3AD203B41FA5}">
+                      <a16:colId xmlns:a16="http://schemas.microsoft.com/office/drawing/2014/main" val="1296035226"/>
+                    </a:ext>
+                  </a:extLst>
+                </a:gridCol>
+                <a:gridCol w="238545">
+                  <a:extLst>
+                    <a:ext uri="{9D8B030D-6E8A-4147-A177-3AD203B41FA5}">
+                      <a16:colId xmlns:a16="http://schemas.microsoft.com/office/drawing/2014/main" val="598123529"/>
+                    </a:ext>
+                  </a:extLst>
+                </a:gridCol>
+                <a:gridCol w="238545">
+                  <a:extLst>
+                    <a:ext uri="{9D8B030D-6E8A-4147-A177-3AD203B41FA5}">
+                      <a16:colId xmlns:a16="http://schemas.microsoft.com/office/drawing/2014/main" val="313009279"/>
+                    </a:ext>
+                  </a:extLst>
+                </a:gridCol>
+                <a:gridCol w="238545">
+                  <a:extLst>
+                    <a:ext uri="{9D8B030D-6E8A-4147-A177-3AD203B41FA5}">
+                      <a16:colId xmlns:a16="http://schemas.microsoft.com/office/drawing/2014/main" val="3886772213"/>
+                    </a:ext>
+                  </a:extLst>
+                </a:gridCol>
+              </a:tblGrid>
+              <a:tr h="122098">
+                <a:tc>
+                  <a:txBody>
+                    <a:bodyPr/>
+                    <a:lstStyle/>
+                    <a:p>
+                      <a:endParaRPr lang="en-US" dirty="0"/>
+                    </a:p>
+                  </a:txBody>
+                  <a:tcPr>
+                    <a:solidFill>
+                      <a:srgbClr val="FF0000"/>
+                    </a:solidFill>
+                  </a:tcPr>
+                </a:tc>
+                <a:tc>
+                  <a:txBody>
+                    <a:bodyPr/>
+                    <a:lstStyle/>
+                    <a:p>
+                      <a:endParaRPr lang="en-US" dirty="0"/>
+                    </a:p>
+                  </a:txBody>
+                  <a:tcPr>
+                    <a:solidFill>
+                      <a:srgbClr val="FF0000"/>
+                    </a:solidFill>
+                  </a:tcPr>
+                </a:tc>
+                <a:tc>
+                  <a:txBody>
+                    <a:bodyPr/>
+                    <a:lstStyle/>
+                    <a:p>
+                      <a:endParaRPr lang="en-US" dirty="0"/>
+                    </a:p>
+                  </a:txBody>
+                  <a:tcPr>
+                    <a:solidFill>
+                      <a:srgbClr val="FF0000"/>
+                    </a:solidFill>
+                  </a:tcPr>
+                </a:tc>
+                <a:tc>
+                  <a:txBody>
+                    <a:bodyPr/>
+                    <a:lstStyle/>
+                    <a:p>
+                      <a:endParaRPr lang="en-US" dirty="0"/>
+                    </a:p>
+                  </a:txBody>
+                  <a:tcPr>
+                    <a:solidFill>
+                      <a:schemeClr val="accent5"/>
+                    </a:solidFill>
+                  </a:tcPr>
+                </a:tc>
+                <a:tc>
+                  <a:txBody>
+                    <a:bodyPr/>
+                    <a:lstStyle/>
+                    <a:p>
+                      <a:endParaRPr lang="en-US" dirty="0"/>
+                    </a:p>
+                  </a:txBody>
+                  <a:tcPr>
+                    <a:solidFill>
+                      <a:schemeClr val="accent5"/>
+                    </a:solidFill>
+                  </a:tcPr>
+                </a:tc>
+                <a:extLst>
+                  <a:ext uri="{0D108BD9-81ED-4DB2-BD59-A6C34878D82A}">
+                    <a16:rowId xmlns:a16="http://schemas.microsoft.com/office/drawing/2014/main" val="1065175009"/>
+                  </a:ext>
+                </a:extLst>
+              </a:tr>
+            </a:tbl>
+          </a:graphicData>
+        </a:graphic>
+      </p:graphicFrame>
+      <p:cxnSp>
+        <p:nvCxnSpPr>
+          <p:cNvPr id="9" name="Straight Arrow Connector 8">
+            <a:extLst>
+              <a:ext uri="{FF2B5EF4-FFF2-40B4-BE49-F238E27FC236}">
+                <a16:creationId xmlns:a16="http://schemas.microsoft.com/office/drawing/2014/main" id="{E88E5176-2DDF-4AAD-AE4A-DD6B27C75FBA}"/>
+              </a:ext>
+            </a:extLst>
+          </p:cNvPr>
+          <p:cNvCxnSpPr/>
+          <p:nvPr/>
+        </p:nvCxnSpPr>
+        <p:spPr>
+          <a:xfrm flipV="1">
+            <a:off x="8171645" y="2768958"/>
+            <a:ext cx="1159099" cy="901521"/>
+          </a:xfrm>
+          <a:prstGeom prst="straightConnector1">
+            <a:avLst/>
+          </a:prstGeom>
+          <a:ln>
+            <a:tailEnd type="triangle"/>
+          </a:ln>
+        </p:spPr>
+        <p:style>
+          <a:lnRef idx="1">
+            <a:schemeClr val="accent2"/>
+          </a:lnRef>
+          <a:fillRef idx="0">
+            <a:schemeClr val="accent2"/>
+          </a:fillRef>
+          <a:effectRef idx="0">
+            <a:schemeClr val="accent2"/>
+          </a:effectRef>
+          <a:fontRef idx="minor">
+            <a:schemeClr val="tx1"/>
+          </a:fontRef>
+        </p:style>
+      </p:cxnSp>
+      <p:cxnSp>
+        <p:nvCxnSpPr>
+          <p:cNvPr id="11" name="Straight Arrow Connector 10">
+            <a:extLst>
+              <a:ext uri="{FF2B5EF4-FFF2-40B4-BE49-F238E27FC236}">
+                <a16:creationId xmlns:a16="http://schemas.microsoft.com/office/drawing/2014/main" id="{2F9C4D62-40B0-4FE2-A9A2-ECC6D5F9A3A4}"/>
+              </a:ext>
+            </a:extLst>
+          </p:cNvPr>
+          <p:cNvCxnSpPr/>
+          <p:nvPr/>
+        </p:nvCxnSpPr>
+        <p:spPr>
+          <a:xfrm>
+            <a:off x="8188457" y="4475408"/>
+            <a:ext cx="1097211" cy="779172"/>
+          </a:xfrm>
+          <a:prstGeom prst="straightConnector1">
+            <a:avLst/>
+          </a:prstGeom>
+          <a:ln>
+            <a:tailEnd type="triangle"/>
+          </a:ln>
+        </p:spPr>
+        <p:style>
+          <a:lnRef idx="1">
+            <a:schemeClr val="accent2"/>
+          </a:lnRef>
+          <a:fillRef idx="0">
+            <a:schemeClr val="accent2"/>
+          </a:fillRef>
+          <a:effectRef idx="0">
+            <a:schemeClr val="accent2"/>
+          </a:effectRef>
+          <a:fontRef idx="minor">
+            <a:schemeClr val="tx1"/>
+          </a:fontRef>
+        </p:style>
+      </p:cxnSp>
+      <p:sp>
+        <p:nvSpPr>
+          <p:cNvPr id="13" name="TextBox 12">
+            <a:extLst>
+              <a:ext uri="{FF2B5EF4-FFF2-40B4-BE49-F238E27FC236}">
+                <a16:creationId xmlns:a16="http://schemas.microsoft.com/office/drawing/2014/main" id="{DCDCEF93-5A7D-478E-B709-FDD4A1BD879C}"/>
+              </a:ext>
+            </a:extLst>
+          </p:cNvPr>
+          <p:cNvSpPr txBox="1"/>
+          <p:nvPr/>
+        </p:nvSpPr>
+        <p:spPr>
+          <a:xfrm>
+            <a:off x="8171645" y="3065829"/>
+            <a:ext cx="1556733" cy="307777"/>
+          </a:xfrm>
+          <a:prstGeom prst="rect">
+            <a:avLst/>
+          </a:prstGeom>
+          <a:noFill/>
+        </p:spPr>
+        <p:txBody>
+          <a:bodyPr wrap="square">
+            <a:spAutoFit/>
+          </a:bodyPr>
+          <a:lstStyle/>
+          <a:p>
+            <a:r>
+              <a:rPr lang="en-GB" sz="1400" dirty="0"/>
+              <a:t>Bit-stream copy</a:t>
+            </a:r>
+          </a:p>
+        </p:txBody>
+      </p:sp>
+      <p:sp>
+        <p:nvSpPr>
+          <p:cNvPr id="16" name="TextBox 15">
+            <a:extLst>
+              <a:ext uri="{FF2B5EF4-FFF2-40B4-BE49-F238E27FC236}">
+                <a16:creationId xmlns:a16="http://schemas.microsoft.com/office/drawing/2014/main" id="{5388B18D-A9DB-4486-A739-4BD19E6B5267}"/>
+              </a:ext>
+            </a:extLst>
+          </p:cNvPr>
+          <p:cNvSpPr txBox="1"/>
+          <p:nvPr/>
+        </p:nvSpPr>
+        <p:spPr>
+          <a:xfrm>
+            <a:off x="8091685" y="4652334"/>
+            <a:ext cx="1556733" cy="307777"/>
+          </a:xfrm>
+          <a:prstGeom prst="rect">
+            <a:avLst/>
+          </a:prstGeom>
+          <a:noFill/>
+        </p:spPr>
+        <p:txBody>
+          <a:bodyPr wrap="square">
+            <a:spAutoFit/>
+          </a:bodyPr>
+          <a:lstStyle/>
+          <a:p>
+            <a:r>
+              <a:rPr lang="en-GB" sz="1400" dirty="0"/>
+              <a:t>backup copy</a:t>
+            </a:r>
+          </a:p>
+        </p:txBody>
+      </p:sp>
+      <p:graphicFrame>
+        <p:nvGraphicFramePr>
+          <p:cNvPr id="17" name="Table 16">
+            <a:extLst>
+              <a:ext uri="{FF2B5EF4-FFF2-40B4-BE49-F238E27FC236}">
+                <a16:creationId xmlns:a16="http://schemas.microsoft.com/office/drawing/2014/main" id="{48A5EC28-0F5E-4C20-A61A-38F6CCF30C50}"/>
+              </a:ext>
+            </a:extLst>
+          </p:cNvPr>
+          <p:cNvGraphicFramePr>
+            <a:graphicFrameLocks noGrp="1"/>
+          </p:cNvGraphicFramePr>
+          <p:nvPr>
+            <p:extLst>
+              <p:ext uri="{D42A27DB-BD31-4B8C-83A1-F6EECF244321}">
+                <p14:modId xmlns:p14="http://schemas.microsoft.com/office/powerpoint/2010/main" val="4067419418"/>
+              </p:ext>
+            </p:extLst>
+          </p:nvPr>
+        </p:nvGraphicFramePr>
+        <p:xfrm>
+          <a:off x="5702478" y="5643579"/>
+          <a:ext cx="2953842" cy="365760"/>
+        </p:xfrm>
+        <a:graphic>
+          <a:graphicData uri="http://schemas.openxmlformats.org/drawingml/2006/table">
+            <a:tbl>
+              <a:tblPr firstRow="1" bandRow="1">
+                <a:tableStyleId>{5940675A-B579-460E-94D1-54222C63F5DA}</a:tableStyleId>
+              </a:tblPr>
+              <a:tblGrid>
+                <a:gridCol w="659337">
+                  <a:extLst>
+                    <a:ext uri="{9D8B030D-6E8A-4147-A177-3AD203B41FA5}">
+                      <a16:colId xmlns:a16="http://schemas.microsoft.com/office/drawing/2014/main" val="1300531843"/>
+                    </a:ext>
+                  </a:extLst>
+                </a:gridCol>
+                <a:gridCol w="712510">
+                  <a:extLst>
+                    <a:ext uri="{9D8B030D-6E8A-4147-A177-3AD203B41FA5}">
+                      <a16:colId xmlns:a16="http://schemas.microsoft.com/office/drawing/2014/main" val="2628936900"/>
+                    </a:ext>
+                  </a:extLst>
+                </a:gridCol>
+                <a:gridCol w="1581995">
+                  <a:extLst>
+                    <a:ext uri="{9D8B030D-6E8A-4147-A177-3AD203B41FA5}">
+                      <a16:colId xmlns:a16="http://schemas.microsoft.com/office/drawing/2014/main" val="3186011200"/>
+                    </a:ext>
+                  </a:extLst>
+                </a:gridCol>
+              </a:tblGrid>
+              <a:tr h="122098">
+                <a:tc>
+                  <a:txBody>
+                    <a:bodyPr/>
+                    <a:lstStyle/>
+                    <a:p>
+                      <a:r>
+                        <a:rPr lang="en-US" dirty="0"/>
+                        <a:t>File1</a:t>
+                      </a:r>
+                    </a:p>
+                  </a:txBody>
+                  <a:tcPr>
+                    <a:solidFill>
+                      <a:srgbClr val="FF0000"/>
+                    </a:solidFill>
+                  </a:tcPr>
+                </a:tc>
+                <a:tc>
+                  <a:txBody>
+                    <a:bodyPr/>
+                    <a:lstStyle/>
+                    <a:p>
+                      <a:r>
+                        <a:rPr lang="en-US" dirty="0"/>
+                        <a:t>File2</a:t>
+                      </a:r>
+                    </a:p>
+                  </a:txBody>
+                  <a:tcPr>
+                    <a:solidFill>
+                      <a:schemeClr val="accent5"/>
+                    </a:solidFill>
+                  </a:tcPr>
+                </a:tc>
+                <a:tc>
+                  <a:txBody>
+                    <a:bodyPr/>
+                    <a:lstStyle/>
+                    <a:p>
+                      <a:r>
+                        <a:rPr lang="en-US" dirty="0"/>
+                        <a:t>Deleted file</a:t>
+                      </a:r>
+                    </a:p>
+                  </a:txBody>
+                  <a:tcPr>
+                    <a:solidFill>
+                      <a:schemeClr val="bg2"/>
+                    </a:solidFill>
+                  </a:tcPr>
+                </a:tc>
+                <a:extLst>
+                  <a:ext uri="{0D108BD9-81ED-4DB2-BD59-A6C34878D82A}">
+                    <a16:rowId xmlns:a16="http://schemas.microsoft.com/office/drawing/2014/main" val="3191882215"/>
+                  </a:ext>
+                </a:extLst>
+              </a:tr>
+            </a:tbl>
+          </a:graphicData>
+        </a:graphic>
+      </p:graphicFrame>
     </p:spTree>
     <p:extLst>
       <p:ext uri="{BB962C8B-B14F-4D97-AF65-F5344CB8AC3E}">
@@ -11975,7 +14113,7 @@
           <a:p>
             <a:r>
               <a:rPr lang="en-US" dirty="0"/>
-              <a:t>Analyzing Your Digital Evidence </a:t>
+              <a:t>Analyzing Digital Evidence </a:t>
             </a:r>
           </a:p>
         </p:txBody>
@@ -11996,7 +14134,12 @@
             <p:ph idx="1"/>
           </p:nvPr>
         </p:nvSpPr>
-        <p:spPr/>
+        <p:spPr>
+          <a:xfrm>
+            <a:off x="838200" y="1825625"/>
+            <a:ext cx="4937760" cy="2212975"/>
+          </a:xfrm>
+        </p:spPr>
         <p:txBody>
           <a:bodyPr/>
           <a:lstStyle/>
@@ -12029,6 +14172,130 @@
           </a:p>
         </p:txBody>
       </p:sp>
+      <p:pic>
+        <p:nvPicPr>
+          <p:cNvPr id="4" name="Picture 3">
+            <a:extLst>
+              <a:ext uri="{FF2B5EF4-FFF2-40B4-BE49-F238E27FC236}">
+                <a16:creationId xmlns:a16="http://schemas.microsoft.com/office/drawing/2014/main" id="{F84EE92A-47B1-4AEE-BC87-7DFEC5A10413}"/>
+              </a:ext>
+            </a:extLst>
+          </p:cNvPr>
+          <p:cNvPicPr>
+            <a:picLocks noChangeAspect="1"/>
+          </p:cNvPicPr>
+          <p:nvPr/>
+        </p:nvPicPr>
+        <p:blipFill>
+          <a:blip r:embed="rId2"/>
+          <a:stretch>
+            <a:fillRect/>
+          </a:stretch>
+        </p:blipFill>
+        <p:spPr>
+          <a:xfrm>
+            <a:off x="7935278" y="4381500"/>
+            <a:ext cx="2672288" cy="1743075"/>
+          </a:xfrm>
+          <a:prstGeom prst="rect">
+            <a:avLst/>
+          </a:prstGeom>
+        </p:spPr>
+      </p:pic>
+      <p:pic>
+        <p:nvPicPr>
+          <p:cNvPr id="1026" name="Picture 2" descr="Digital forensics: How to recover deleted files | Malwarebytes Labs">
+            <a:extLst>
+              <a:ext uri="{FF2B5EF4-FFF2-40B4-BE49-F238E27FC236}">
+                <a16:creationId xmlns:a16="http://schemas.microsoft.com/office/drawing/2014/main" id="{D135A29E-3089-439E-91E1-0ED94882A1C5}"/>
+              </a:ext>
+            </a:extLst>
+          </p:cNvPr>
+          <p:cNvPicPr>
+            <a:picLocks noChangeAspect="1" noChangeArrowheads="1"/>
+          </p:cNvPicPr>
+          <p:nvPr/>
+        </p:nvPicPr>
+        <p:blipFill>
+          <a:blip r:embed="rId3">
+            <a:extLst>
+              <a:ext uri="{28A0092B-C50C-407E-A947-70E740481C1C}">
+                <a14:useLocalDpi xmlns:a14="http://schemas.microsoft.com/office/drawing/2010/main" val="0"/>
+              </a:ext>
+            </a:extLst>
+          </a:blip>
+          <a:srcRect/>
+          <a:stretch>
+            <a:fillRect/>
+          </a:stretch>
+        </p:blipFill>
+        <p:spPr bwMode="auto">
+          <a:xfrm>
+            <a:off x="7988191" y="2476500"/>
+            <a:ext cx="2619375" cy="1743075"/>
+          </a:xfrm>
+          <a:prstGeom prst="rect">
+            <a:avLst/>
+          </a:prstGeom>
+          <a:noFill/>
+          <a:extLst>
+            <a:ext uri="{909E8E84-426E-40DD-AFC4-6F175D3DCCD1}">
+              <a14:hiddenFill xmlns:a14="http://schemas.microsoft.com/office/drawing/2010/main">
+                <a:solidFill>
+                  <a:srgbClr val="FFFFFF"/>
+                </a:solidFill>
+              </a14:hiddenFill>
+            </a:ext>
+          </a:extLst>
+        </p:spPr>
+      </p:pic>
+      <p:pic>
+        <p:nvPicPr>
+          <p:cNvPr id="1028" name="Picture 4" descr="How Computer Memory Works | HowStuffWorks">
+            <a:extLst>
+              <a:ext uri="{FF2B5EF4-FFF2-40B4-BE49-F238E27FC236}">
+                <a16:creationId xmlns:a16="http://schemas.microsoft.com/office/drawing/2014/main" id="{3A792103-C138-4C81-A8C2-FF99AA1FD9CD}"/>
+              </a:ext>
+            </a:extLst>
+          </p:cNvPr>
+          <p:cNvPicPr>
+            <a:picLocks noChangeAspect="1" noChangeArrowheads="1"/>
+          </p:cNvPicPr>
+          <p:nvPr/>
+        </p:nvPicPr>
+        <p:blipFill>
+          <a:blip r:embed="rId4">
+            <a:extLst>
+              <a:ext uri="{28A0092B-C50C-407E-A947-70E740481C1C}">
+                <a14:useLocalDpi xmlns:a14="http://schemas.microsoft.com/office/drawing/2010/main" val="0"/>
+              </a:ext>
+            </a:extLst>
+          </a:blip>
+          <a:srcRect/>
+          <a:stretch>
+            <a:fillRect/>
+          </a:stretch>
+        </p:blipFill>
+        <p:spPr bwMode="auto">
+          <a:xfrm>
+            <a:off x="8481060" y="490538"/>
+            <a:ext cx="1905000" cy="1905000"/>
+          </a:xfrm>
+          <a:prstGeom prst="rect">
+            <a:avLst/>
+          </a:prstGeom>
+          <a:noFill/>
+          <a:extLst>
+            <a:ext uri="{909E8E84-426E-40DD-AFC4-6F175D3DCCD1}">
+              <a14:hiddenFill xmlns:a14="http://schemas.microsoft.com/office/drawing/2010/main">
+                <a:solidFill>
+                  <a:srgbClr val="FFFFFF"/>
+                </a:solidFill>
+              </a14:hiddenFill>
+            </a:ext>
+          </a:extLst>
+        </p:spPr>
+      </p:pic>
     </p:spTree>
     <p:extLst>
       <p:ext uri="{BB962C8B-B14F-4D97-AF65-F5344CB8AC3E}">
@@ -12444,7 +14711,7 @@
         <p:spPr/>
         <p:txBody>
           <a:bodyPr>
-            <a:normAutofit/>
+            <a:normAutofit lnSpcReduction="10000"/>
           </a:bodyPr>
           <a:lstStyle/>
           <a:p>
@@ -12469,9 +14736,28 @@
           <a:p>
             <a:pPr lvl="1"/>
             <a:r>
-              <a:rPr lang="en-US" dirty="0"/>
+              <a:rPr lang="en-US" dirty="0">
+                <a:hlinkClick r:id="rId2"/>
+              </a:rPr>
               <a:t>https://www.dropbox.com/s/nw23q14vzsykyup/Ch01InChap01.dd</a:t>
             </a:r>
+            <a:endParaRPr lang="en-US" dirty="0"/>
+          </a:p>
+          <a:p>
+            <a:pPr lvl="1"/>
+            <a:r>
+              <a:rPr lang="en-GB" dirty="0"/>
+              <a:t>(from book </a:t>
+            </a:r>
+            <a:r>
+              <a:rPr lang="en-GB" i="1" dirty="0"/>
+              <a:t>Guide to Computer Forensics and Investigations</a:t>
+            </a:r>
+            <a:r>
+              <a:rPr lang="en-GB" dirty="0"/>
+              <a:t>. Sixth Edition)</a:t>
+            </a:r>
+            <a:endParaRPr lang="en-US" dirty="0"/>
           </a:p>
           <a:p>
             <a:r>
@@ -13231,7 +15517,7 @@
         </p:blipFill>
         <p:spPr>
           <a:xfrm>
-            <a:off x="838200" y="1762853"/>
+            <a:off x="657390" y="1698308"/>
             <a:ext cx="10480980" cy="4592605"/>
           </a:xfrm>
           <a:prstGeom prst="rect">
@@ -13247,7 +15533,7 @@
         </p:nvSpPr>
         <p:spPr>
           <a:xfrm>
-            <a:off x="6667501" y="4520046"/>
+            <a:off x="6591301" y="4725786"/>
             <a:ext cx="883227" cy="249383"/>
           </a:xfrm>
           <a:prstGeom prst="rect">
@@ -13929,6 +16215,82 @@
       </p:grpSpPr>
       <p:sp>
         <p:nvSpPr>
+          <p:cNvPr id="2" name="Title 1"/>
+          <p:cNvSpPr>
+            <a:spLocks noGrp="1"/>
+          </p:cNvSpPr>
+          <p:nvPr>
+            <p:ph type="title"/>
+          </p:nvPr>
+        </p:nvSpPr>
+        <p:spPr/>
+        <p:txBody>
+          <a:bodyPr/>
+          <a:lstStyle/>
+          <a:p>
+            <a:r>
+              <a:rPr lang="en-US" dirty="0"/>
+              <a:t>Generate reports</a:t>
+            </a:r>
+          </a:p>
+        </p:txBody>
+      </p:sp>
+      <p:pic>
+        <p:nvPicPr>
+          <p:cNvPr id="3" name="Picture 2"/>
+          <p:cNvPicPr>
+            <a:picLocks noChangeAspect="1"/>
+          </p:cNvPicPr>
+          <p:nvPr/>
+        </p:nvPicPr>
+        <p:blipFill>
+          <a:blip r:embed="rId2"/>
+          <a:stretch>
+            <a:fillRect/>
+          </a:stretch>
+        </p:blipFill>
+        <p:spPr>
+          <a:xfrm>
+            <a:off x="838200" y="1449924"/>
+            <a:ext cx="6665768" cy="5042951"/>
+          </a:xfrm>
+          <a:prstGeom prst="rect">
+            <a:avLst/>
+          </a:prstGeom>
+        </p:spPr>
+      </p:pic>
+    </p:spTree>
+    <p:extLst>
+      <p:ext uri="{BB962C8B-B14F-4D97-AF65-F5344CB8AC3E}">
+        <p14:creationId xmlns:p14="http://schemas.microsoft.com/office/powerpoint/2010/main" val="4126387251"/>
+      </p:ext>
+    </p:extLst>
+  </p:cSld>
+  <p:clrMapOvr>
+    <a:masterClrMapping/>
+  </p:clrMapOvr>
+</p:sld>
+</file>
+
+<file path=ppt/slides/slide32.xml><?xml version="1.0" encoding="utf-8"?>
+<p:sld xmlns:a="http://schemas.openxmlformats.org/drawingml/2006/main" xmlns:r="http://schemas.openxmlformats.org/officeDocument/2006/relationships" xmlns:p="http://schemas.openxmlformats.org/presentationml/2006/main">
+  <p:cSld>
+    <p:spTree>
+      <p:nvGrpSpPr>
+        <p:cNvPr id="1" name=""/>
+        <p:cNvGrpSpPr/>
+        <p:nvPr/>
+      </p:nvGrpSpPr>
+      <p:grpSpPr>
+        <a:xfrm>
+          <a:off x="0" y="0"/>
+          <a:ext cx="0" cy="0"/>
+          <a:chOff x="0" y="0"/>
+          <a:chExt cx="0" cy="0"/>
+        </a:xfrm>
+      </p:grpSpPr>
+      <p:sp>
+        <p:nvSpPr>
           <p:cNvPr id="2" name="Title 1">
             <a:extLst>
               <a:ext uri="{FF2B5EF4-FFF2-40B4-BE49-F238E27FC236}">
@@ -13998,6 +16360,49 @@
           </a:prstGeom>
         </p:spPr>
       </p:pic>
+      <p:sp>
+        <p:nvSpPr>
+          <p:cNvPr id="3" name="TextBox 2">
+            <a:extLst>
+              <a:ext uri="{FF2B5EF4-FFF2-40B4-BE49-F238E27FC236}">
+                <a16:creationId xmlns:a16="http://schemas.microsoft.com/office/drawing/2014/main" id="{06AA3397-A31A-46F3-A99D-BF9E554D997D}"/>
+              </a:ext>
+            </a:extLst>
+          </p:cNvPr>
+          <p:cNvSpPr txBox="1"/>
+          <p:nvPr/>
+        </p:nvSpPr>
+        <p:spPr>
+          <a:xfrm>
+            <a:off x="2423160" y="180459"/>
+            <a:ext cx="3824958" cy="369332"/>
+          </a:xfrm>
+          <a:prstGeom prst="rect">
+            <a:avLst/>
+          </a:prstGeom>
+          <a:noFill/>
+        </p:spPr>
+        <p:txBody>
+          <a:bodyPr wrap="none" rtlCol="0">
+            <a:spAutoFit/>
+          </a:bodyPr>
+          <a:lstStyle/>
+          <a:p>
+            <a:r>
+              <a:rPr lang="en-US" dirty="0">
+                <a:solidFill>
+                  <a:srgbClr val="7030A0"/>
+                </a:solidFill>
+              </a:rPr>
+              <a:t>[]</a:t>
+            </a:r>
+            <a:r>
+              <a:rPr lang="en-US" dirty="0"/>
+              <a:t> square bracket: match one element</a:t>
+            </a:r>
+          </a:p>
+        </p:txBody>
+      </p:sp>
     </p:spTree>
     <p:extLst>
       <p:ext uri="{BB962C8B-B14F-4D97-AF65-F5344CB8AC3E}">
@@ -14011,7 +16416,7 @@
 </p:sld>
 </file>
 
-<file path=ppt/slides/slide32.xml><?xml version="1.0" encoding="utf-8"?>
+<file path=ppt/slides/slide33.xml><?xml version="1.0" encoding="utf-8"?>
 <p:sld xmlns:a="http://schemas.openxmlformats.org/drawingml/2006/main" xmlns:r="http://schemas.openxmlformats.org/officeDocument/2006/relationships" xmlns:p="http://schemas.openxmlformats.org/presentationml/2006/main">
   <p:cSld>
     <p:spTree>
@@ -14030,7 +16435,13 @@
       </p:grpSpPr>
       <p:sp>
         <p:nvSpPr>
-          <p:cNvPr id="2" name="Title 1"/>
+          <p:cNvPr id="2" name="Title 1">
+            <a:extLst>
+              <a:ext uri="{FF2B5EF4-FFF2-40B4-BE49-F238E27FC236}">
+                <a16:creationId xmlns:a16="http://schemas.microsoft.com/office/drawing/2014/main" id="{0478612A-D65D-4E81-AE36-86A77A9AE6E4}"/>
+              </a:ext>
+            </a:extLst>
+          </p:cNvPr>
           <p:cNvSpPr>
             <a:spLocks noGrp="1"/>
           </p:cNvSpPr>
@@ -14044,40 +16455,86 @@
           <a:lstStyle/>
           <a:p>
             <a:r>
-              <a:rPr lang="en-US" dirty="0"/>
-              <a:t>Generate reports</a:t>
-            </a:r>
+              <a:rPr lang="en-US"/>
+              <a:t>Assignments</a:t>
+            </a:r>
+            <a:endParaRPr lang="en-US" dirty="0"/>
           </a:p>
         </p:txBody>
       </p:sp>
-      <p:pic>
-        <p:nvPicPr>
-          <p:cNvPr id="3" name="Picture 2"/>
-          <p:cNvPicPr>
-            <a:picLocks noChangeAspect="1"/>
-          </p:cNvPicPr>
-          <p:nvPr/>
-        </p:nvPicPr>
-        <p:blipFill>
-          <a:blip r:embed="rId2"/>
-          <a:stretch>
-            <a:fillRect/>
-          </a:stretch>
-        </p:blipFill>
-        <p:spPr>
-          <a:xfrm>
-            <a:off x="838200" y="1449924"/>
-            <a:ext cx="6665768" cy="5042951"/>
-          </a:xfrm>
-          <a:prstGeom prst="rect">
-            <a:avLst/>
-          </a:prstGeom>
-        </p:spPr>
-      </p:pic>
+      <p:sp>
+        <p:nvSpPr>
+          <p:cNvPr id="3" name="Content Placeholder 2">
+            <a:extLst>
+              <a:ext uri="{FF2B5EF4-FFF2-40B4-BE49-F238E27FC236}">
+                <a16:creationId xmlns:a16="http://schemas.microsoft.com/office/drawing/2014/main" id="{FFD95E78-2E0E-498A-89D2-FE0493DE1395}"/>
+              </a:ext>
+            </a:extLst>
+          </p:cNvPr>
+          <p:cNvSpPr>
+            <a:spLocks noGrp="1"/>
+          </p:cNvSpPr>
+          <p:nvPr>
+            <p:ph idx="1"/>
+          </p:nvPr>
+        </p:nvSpPr>
+        <p:spPr/>
+        <p:txBody>
+          <a:bodyPr/>
+          <a:lstStyle/>
+          <a:p>
+            <a:r>
+              <a:rPr lang="en-US" dirty="0"/>
+              <a:t>Find all zip code using regular expression</a:t>
+            </a:r>
+          </a:p>
+          <a:p>
+            <a:pPr lvl="1"/>
+            <a:r>
+              <a:rPr lang="en-US" dirty="0"/>
+              <a:t>test “90210”, “70313”</a:t>
+            </a:r>
+          </a:p>
+          <a:p>
+            <a:r>
+              <a:rPr lang="en-US" dirty="0"/>
+              <a:t>Find all phone number using regular expression</a:t>
+            </a:r>
+          </a:p>
+          <a:p>
+            <a:pPr lvl="1"/>
+            <a:r>
+              <a:rPr lang="en-US" dirty="0"/>
+              <a:t>(123)3456789</a:t>
+            </a:r>
+          </a:p>
+          <a:p>
+            <a:pPr lvl="1"/>
+            <a:r>
+              <a:rPr lang="en-US" dirty="0"/>
+              <a:t>123-345-6789</a:t>
+            </a:r>
+          </a:p>
+          <a:p>
+            <a:pPr lvl="1"/>
+            <a:r>
+              <a:rPr lang="en-US" dirty="0"/>
+              <a:t>123456789</a:t>
+            </a:r>
+          </a:p>
+          <a:p>
+            <a:pPr lvl="1"/>
+            <a:endParaRPr lang="en-US" dirty="0"/>
+          </a:p>
+          <a:p>
+            <a:endParaRPr lang="en-US" dirty="0"/>
+          </a:p>
+        </p:txBody>
+      </p:sp>
     </p:spTree>
     <p:extLst>
       <p:ext uri="{BB962C8B-B14F-4D97-AF65-F5344CB8AC3E}">
-        <p14:creationId xmlns:p14="http://schemas.microsoft.com/office/powerpoint/2010/main" val="4126387251"/>
+        <p14:creationId xmlns:p14="http://schemas.microsoft.com/office/powerpoint/2010/main" val="2776652354"/>
       </p:ext>
     </p:extLst>
   </p:cSld>
@@ -14181,7 +16638,31 @@
             </a:r>
             <a:r>
               <a:rPr lang="en-GB" dirty="0"/>
-              <a:t>for a legal purpose involving the analysis of digital evidence after </a:t>
+              <a:t>for </a:t>
+            </a:r>
+            <a:r>
+              <a:rPr lang="en-GB" dirty="0">
+                <a:solidFill>
+                  <a:srgbClr val="7030A0"/>
+                </a:solidFill>
+              </a:rPr>
+              <a:t>a legal purpose </a:t>
+            </a:r>
+            <a:r>
+              <a:rPr lang="en-GB" dirty="0"/>
+              <a:t>involving the </a:t>
+            </a:r>
+            <a:r>
+              <a:rPr lang="en-GB" dirty="0">
+                <a:solidFill>
+                  <a:srgbClr val="7030A0"/>
+                </a:solidFill>
+              </a:rPr>
+              <a:t>analysis of digital evidence </a:t>
+            </a:r>
+            <a:r>
+              <a:rPr lang="en-GB" dirty="0"/>
+              <a:t>after </a:t>
             </a:r>
           </a:p>
           <a:p>

</xml_diff>

<commit_message>
add some figures to help students to understand difficult content
</commit_message>
<xml_diff>
--- a/Basic_Computer_Skills_for_Forensics/5_Introduction_to_digital_forensics.pptx
+++ b/Basic_Computer_Skills_for_Forensics/5_Introduction_to_digital_forensics.pptx
@@ -150,7 +150,7 @@
 <file path=ppt/revisionInfo.xml><?xml version="1.0" encoding="utf-8"?>
 <p1510:revInfo xmlns:a="http://schemas.openxmlformats.org/drawingml/2006/main" xmlns:r="http://schemas.openxmlformats.org/officeDocument/2006/relationships" xmlns:p1510="http://schemas.microsoft.com/office/powerpoint/2015/10/main">
   <p1510:revLst>
-    <p1510:client id="{8442418D-DE68-4B3B-96F3-F4D7267D1273}" v="54" dt="2022-03-07T21:42:41.029"/>
+    <p1510:client id="{8442418D-DE68-4B3B-96F3-F4D7267D1273}" v="56" dt="2022-10-03T12:36:15.777"/>
   </p1510:revLst>
 </p1510:revInfo>
 </file>
@@ -160,7 +160,7 @@
   <pc:docChgLst>
     <pc:chgData name="Weifeng Xu" userId="e7aed605-a3dd-4d5a-a692-a87037af107b" providerId="ADAL" clId="{8442418D-DE68-4B3B-96F3-F4D7267D1273}"/>
     <pc:docChg chg="undo custSel addSld delSld modSld sldOrd">
-      <pc:chgData name="Weifeng Xu" userId="e7aed605-a3dd-4d5a-a692-a87037af107b" providerId="ADAL" clId="{8442418D-DE68-4B3B-96F3-F4D7267D1273}" dt="2022-03-07T23:06:32.398" v="1034" actId="207"/>
+      <pc:chgData name="Weifeng Xu" userId="e7aed605-a3dd-4d5a-a692-a87037af107b" providerId="ADAL" clId="{8442418D-DE68-4B3B-96F3-F4D7267D1273}" dt="2022-10-03T12:39:13.073" v="1197" actId="20577"/>
       <pc:docMkLst>
         <pc:docMk/>
       </pc:docMkLst>
@@ -593,7 +593,7 @@
         </pc:sldMkLst>
       </pc:sldChg>
       <pc:sldChg chg="addSp delSp modSp new mod">
-        <pc:chgData name="Weifeng Xu" userId="e7aed605-a3dd-4d5a-a692-a87037af107b" providerId="ADAL" clId="{8442418D-DE68-4B3B-96F3-F4D7267D1273}" dt="2022-03-07T23:06:32.398" v="1034" actId="207"/>
+        <pc:chgData name="Weifeng Xu" userId="e7aed605-a3dd-4d5a-a692-a87037af107b" providerId="ADAL" clId="{8442418D-DE68-4B3B-96F3-F4D7267D1273}" dt="2022-08-30T14:30:29.227" v="1035" actId="1076"/>
         <pc:sldMkLst>
           <pc:docMk/>
           <pc:sldMk cId="2996568162" sldId="366"/>
@@ -671,7 +671,7 @@
           </ac:graphicFrameMkLst>
         </pc:graphicFrameChg>
         <pc:graphicFrameChg chg="add mod modGraphic">
-          <ac:chgData name="Weifeng Xu" userId="e7aed605-a3dd-4d5a-a692-a87037af107b" providerId="ADAL" clId="{8442418D-DE68-4B3B-96F3-F4D7267D1273}" dt="2022-03-05T16:31:31.937" v="782" actId="207"/>
+          <ac:chgData name="Weifeng Xu" userId="e7aed605-a3dd-4d5a-a692-a87037af107b" providerId="ADAL" clId="{8442418D-DE68-4B3B-96F3-F4D7267D1273}" dt="2022-08-30T14:30:29.227" v="1035" actId="1076"/>
           <ac:graphicFrameMkLst>
             <pc:docMk/>
             <pc:sldMk cId="2996568162" sldId="366"/>
@@ -1235,13 +1235,13 @@
         </pc:picChg>
       </pc:sldChg>
       <pc:sldChg chg="addSp modSp new mod modClrScheme chgLayout">
-        <pc:chgData name="Weifeng Xu" userId="e7aed605-a3dd-4d5a-a692-a87037af107b" providerId="ADAL" clId="{8442418D-DE68-4B3B-96F3-F4D7267D1273}" dt="2022-03-07T21:49:06.952" v="1031" actId="20577"/>
+        <pc:chgData name="Weifeng Xu" userId="e7aed605-a3dd-4d5a-a692-a87037af107b" providerId="ADAL" clId="{8442418D-DE68-4B3B-96F3-F4D7267D1273}" dt="2022-10-03T12:39:13.073" v="1197" actId="20577"/>
         <pc:sldMkLst>
           <pc:docMk/>
           <pc:sldMk cId="2776652354" sldId="388"/>
         </pc:sldMkLst>
         <pc:spChg chg="mod ord">
-          <ac:chgData name="Weifeng Xu" userId="e7aed605-a3dd-4d5a-a692-a87037af107b" providerId="ADAL" clId="{8442418D-DE68-4B3B-96F3-F4D7267D1273}" dt="2022-03-04T21:46:35.879" v="618" actId="20577"/>
+          <ac:chgData name="Weifeng Xu" userId="e7aed605-a3dd-4d5a-a692-a87037af107b" providerId="ADAL" clId="{8442418D-DE68-4B3B-96F3-F4D7267D1273}" dt="2022-10-03T12:39:13.073" v="1197" actId="20577"/>
           <ac:spMkLst>
             <pc:docMk/>
             <pc:sldMk cId="2776652354" sldId="388"/>
@@ -1249,7 +1249,7 @@
           </ac:spMkLst>
         </pc:spChg>
         <pc:spChg chg="add mod ord">
-          <ac:chgData name="Weifeng Xu" userId="e7aed605-a3dd-4d5a-a692-a87037af107b" providerId="ADAL" clId="{8442418D-DE68-4B3B-96F3-F4D7267D1273}" dt="2022-03-07T21:49:06.952" v="1031" actId="20577"/>
+          <ac:chgData name="Weifeng Xu" userId="e7aed605-a3dd-4d5a-a692-a87037af107b" providerId="ADAL" clId="{8442418D-DE68-4B3B-96F3-F4D7267D1273}" dt="2022-10-03T12:38:36.142" v="1150" actId="13926"/>
           <ac:spMkLst>
             <pc:docMk/>
             <pc:sldMk cId="2776652354" sldId="388"/>
@@ -7846,7 +7846,7 @@
           <a:p>
             <a:fld id="{B9658D5F-65FB-4E17-9D5B-8CF1DE5A98DF}" type="datetimeFigureOut">
               <a:rPr lang="en-US" smtClean="0"/>
-              <a:t>3/7/2022</a:t>
+              <a:t>10/3/2022</a:t>
             </a:fld>
             <a:endParaRPr lang="en-US"/>
           </a:p>
@@ -8242,7 +8242,7 @@
           <a:p>
             <a:fld id="{4263717A-E3C1-4BED-ABE0-B7069385E023}" type="datetimeFigureOut">
               <a:rPr lang="en-US" smtClean="0"/>
-              <a:t>3/7/2022</a:t>
+              <a:t>10/3/2022</a:t>
             </a:fld>
             <a:endParaRPr lang="en-US"/>
           </a:p>
@@ -8415,7 +8415,7 @@
           <a:p>
             <a:fld id="{4263717A-E3C1-4BED-ABE0-B7069385E023}" type="datetimeFigureOut">
               <a:rPr lang="en-US" smtClean="0"/>
-              <a:t>3/7/2022</a:t>
+              <a:t>10/3/2022</a:t>
             </a:fld>
             <a:endParaRPr lang="en-US"/>
           </a:p>
@@ -8593,7 +8593,7 @@
           <a:p>
             <a:fld id="{4263717A-E3C1-4BED-ABE0-B7069385E023}" type="datetimeFigureOut">
               <a:rPr lang="en-US" smtClean="0"/>
-              <a:t>3/7/2022</a:t>
+              <a:t>10/3/2022</a:t>
             </a:fld>
             <a:endParaRPr lang="en-US"/>
           </a:p>
@@ -8761,7 +8761,7 @@
           <a:p>
             <a:fld id="{4263717A-E3C1-4BED-ABE0-B7069385E023}" type="datetimeFigureOut">
               <a:rPr lang="en-US" smtClean="0"/>
-              <a:t>3/7/2022</a:t>
+              <a:t>10/3/2022</a:t>
             </a:fld>
             <a:endParaRPr lang="en-US"/>
           </a:p>
@@ -9006,7 +9006,7 @@
           <a:p>
             <a:fld id="{4263717A-E3C1-4BED-ABE0-B7069385E023}" type="datetimeFigureOut">
               <a:rPr lang="en-US" smtClean="0"/>
-              <a:t>3/7/2022</a:t>
+              <a:t>10/3/2022</a:t>
             </a:fld>
             <a:endParaRPr lang="en-US"/>
           </a:p>
@@ -9235,7 +9235,7 @@
           <a:p>
             <a:fld id="{4263717A-E3C1-4BED-ABE0-B7069385E023}" type="datetimeFigureOut">
               <a:rPr lang="en-US" smtClean="0"/>
-              <a:t>3/7/2022</a:t>
+              <a:t>10/3/2022</a:t>
             </a:fld>
             <a:endParaRPr lang="en-US"/>
           </a:p>
@@ -9599,7 +9599,7 @@
           <a:p>
             <a:fld id="{4263717A-E3C1-4BED-ABE0-B7069385E023}" type="datetimeFigureOut">
               <a:rPr lang="en-US" smtClean="0"/>
-              <a:t>3/7/2022</a:t>
+              <a:t>10/3/2022</a:t>
             </a:fld>
             <a:endParaRPr lang="en-US"/>
           </a:p>
@@ -9716,7 +9716,7 @@
           <a:p>
             <a:fld id="{4263717A-E3C1-4BED-ABE0-B7069385E023}" type="datetimeFigureOut">
               <a:rPr lang="en-US" smtClean="0"/>
-              <a:t>3/7/2022</a:t>
+              <a:t>10/3/2022</a:t>
             </a:fld>
             <a:endParaRPr lang="en-US"/>
           </a:p>
@@ -9811,7 +9811,7 @@
           <a:p>
             <a:fld id="{4263717A-E3C1-4BED-ABE0-B7069385E023}" type="datetimeFigureOut">
               <a:rPr lang="en-US" smtClean="0"/>
-              <a:t>3/7/2022</a:t>
+              <a:t>10/3/2022</a:t>
             </a:fld>
             <a:endParaRPr lang="en-US"/>
           </a:p>
@@ -10086,7 +10086,7 @@
           <a:p>
             <a:fld id="{4263717A-E3C1-4BED-ABE0-B7069385E023}" type="datetimeFigureOut">
               <a:rPr lang="en-US" smtClean="0"/>
-              <a:t>3/7/2022</a:t>
+              <a:t>10/3/2022</a:t>
             </a:fld>
             <a:endParaRPr lang="en-US"/>
           </a:p>
@@ -10338,7 +10338,7 @@
           <a:p>
             <a:fld id="{4263717A-E3C1-4BED-ABE0-B7069385E023}" type="datetimeFigureOut">
               <a:rPr lang="en-US" smtClean="0"/>
-              <a:t>3/7/2022</a:t>
+              <a:t>10/3/2022</a:t>
             </a:fld>
             <a:endParaRPr lang="en-US"/>
           </a:p>
@@ -10549,7 +10549,7 @@
           <a:p>
             <a:fld id="{4263717A-E3C1-4BED-ABE0-B7069385E023}" type="datetimeFigureOut">
               <a:rPr lang="en-US" smtClean="0"/>
-              <a:t>3/7/2022</a:t>
+              <a:t>10/3/2022</a:t>
             </a:fld>
             <a:endParaRPr lang="en-US"/>
           </a:p>
@@ -13960,13 +13960,13 @@
           <p:nvPr>
             <p:extLst>
               <p:ext uri="{D42A27DB-BD31-4B8C-83A1-F6EECF244321}">
-                <p14:modId xmlns:p14="http://schemas.microsoft.com/office/powerpoint/2010/main" val="4067419418"/>
+                <p14:modId xmlns:p14="http://schemas.microsoft.com/office/powerpoint/2010/main" val="2406286135"/>
               </p:ext>
             </p:extLst>
           </p:nvPr>
         </p:nvGraphicFramePr>
         <p:xfrm>
-          <a:off x="5702478" y="5643579"/>
+          <a:off x="5638682" y="1490230"/>
           <a:ext cx="2953842" cy="365760"/>
         </p:xfrm>
         <a:graphic>
@@ -16455,8 +16455,12 @@
           <a:lstStyle/>
           <a:p>
             <a:r>
+              <a:rPr lang="en-US" dirty="0"/>
+              <a:t>Assignments- </a:t>
+            </a:r>
+            <a:r>
               <a:rPr lang="en-US"/>
-              <a:t>Assignments</a:t>
+              <a:t>highlighting search results</a:t>
             </a:r>
             <a:endParaRPr lang="en-US" dirty="0"/>
           </a:p>
@@ -16485,14 +16489,43 @@
           <a:p>
             <a:r>
               <a:rPr lang="en-US" dirty="0"/>
-              <a:t>Find all zip code using regular expression</a:t>
+              <a:t>Find all zip code using regular expression using  </a:t>
+            </a:r>
+            <a:r>
+              <a:rPr lang="en-US" sz="2000" dirty="0">
+                <a:latin typeface="Britannic Bold" panose="020B0903060703020204" pitchFamily="34" charset="0"/>
+              </a:rPr>
+              <a:t>https://regex101.com/</a:t>
             </a:r>
           </a:p>
           <a:p>
             <a:pPr lvl="1"/>
             <a:r>
               <a:rPr lang="en-US" dirty="0"/>
-              <a:t>test “90210”, “70313”</a:t>
+              <a:t>the zip code is </a:t>
+            </a:r>
+            <a:r>
+              <a:rPr lang="en-US" dirty="0">
+                <a:highlight>
+                  <a:srgbClr val="00FFFF"/>
+                </a:highlight>
+              </a:rPr>
+              <a:t>90210</a:t>
+            </a:r>
+          </a:p>
+          <a:p>
+            <a:pPr lvl="1"/>
+            <a:r>
+              <a:rPr lang="en-US" dirty="0"/>
+              <a:t>the zip code is </a:t>
+            </a:r>
+            <a:r>
+              <a:rPr lang="en-US" dirty="0">
+                <a:highlight>
+                  <a:srgbClr val="00FFFF"/>
+                </a:highlight>
+              </a:rPr>
+              <a:t>70313</a:t>
             </a:r>
           </a:p>
           <a:p>
@@ -16505,6 +16538,14 @@
             <a:pPr lvl="1"/>
             <a:r>
               <a:rPr lang="en-US" dirty="0"/>
+              <a:t>my phone number is </a:t>
+            </a:r>
+            <a:r>
+              <a:rPr lang="en-US" dirty="0">
+                <a:highlight>
+                  <a:srgbClr val="00FFFF"/>
+                </a:highlight>
+              </a:rPr>
               <a:t>(123)3456789</a:t>
             </a:r>
           </a:p>
@@ -16512,6 +16553,14 @@
             <a:pPr lvl="1"/>
             <a:r>
               <a:rPr lang="en-US" dirty="0"/>
+              <a:t>my phone number is </a:t>
+            </a:r>
+            <a:r>
+              <a:rPr lang="en-US" dirty="0">
+                <a:highlight>
+                  <a:srgbClr val="00FFFF"/>
+                </a:highlight>
+              </a:rPr>
               <a:t>123-345-6789</a:t>
             </a:r>
           </a:p>
@@ -16519,6 +16568,14 @@
             <a:pPr lvl="1"/>
             <a:r>
               <a:rPr lang="en-US" dirty="0"/>
+              <a:t>my phone number is </a:t>
+            </a:r>
+            <a:r>
+              <a:rPr lang="en-US" dirty="0">
+                <a:highlight>
+                  <a:srgbClr val="00FFFF"/>
+                </a:highlight>
+              </a:rPr>
               <a:t>123456789</a:t>
             </a:r>
           </a:p>

</xml_diff>

<commit_message>
add sqlite tutorial to basic computer skills
</commit_message>
<xml_diff>
--- a/Basic_Computer_Skills_for_Forensics/5_Introduction_to_digital_forensics.pptx
+++ b/Basic_Computer_Skills_for_Forensics/5_Introduction_to_digital_forensics.pptx
@@ -5,7 +5,7 @@
     <p:sldMasterId id="2147483648" r:id="rId1"/>
   </p:sldMasterIdLst>
   <p:notesMasterIdLst>
-    <p:notesMasterId r:id="rId35"/>
+    <p:notesMasterId r:id="rId36"/>
   </p:notesMasterIdLst>
   <p:sldIdLst>
     <p:sldId id="256" r:id="rId2"/>
@@ -25,22 +25,23 @@
     <p:sldId id="369" r:id="rId16"/>
     <p:sldId id="370" r:id="rId17"/>
     <p:sldId id="372" r:id="rId18"/>
-    <p:sldId id="386" r:id="rId19"/>
-    <p:sldId id="373" r:id="rId20"/>
-    <p:sldId id="374" r:id="rId21"/>
-    <p:sldId id="375" r:id="rId22"/>
-    <p:sldId id="376" r:id="rId23"/>
-    <p:sldId id="377" r:id="rId24"/>
-    <p:sldId id="378" r:id="rId25"/>
-    <p:sldId id="379" r:id="rId26"/>
-    <p:sldId id="380" r:id="rId27"/>
-    <p:sldId id="381" r:id="rId28"/>
-    <p:sldId id="382" r:id="rId29"/>
-    <p:sldId id="383" r:id="rId30"/>
-    <p:sldId id="384" r:id="rId31"/>
-    <p:sldId id="385" r:id="rId32"/>
-    <p:sldId id="387" r:id="rId33"/>
-    <p:sldId id="388" r:id="rId34"/>
+    <p:sldId id="389" r:id="rId19"/>
+    <p:sldId id="386" r:id="rId20"/>
+    <p:sldId id="373" r:id="rId21"/>
+    <p:sldId id="374" r:id="rId22"/>
+    <p:sldId id="375" r:id="rId23"/>
+    <p:sldId id="376" r:id="rId24"/>
+    <p:sldId id="377" r:id="rId25"/>
+    <p:sldId id="378" r:id="rId26"/>
+    <p:sldId id="379" r:id="rId27"/>
+    <p:sldId id="380" r:id="rId28"/>
+    <p:sldId id="381" r:id="rId29"/>
+    <p:sldId id="382" r:id="rId30"/>
+    <p:sldId id="383" r:id="rId31"/>
+    <p:sldId id="384" r:id="rId32"/>
+    <p:sldId id="385" r:id="rId33"/>
+    <p:sldId id="387" r:id="rId34"/>
+    <p:sldId id="388" r:id="rId35"/>
   </p:sldIdLst>
   <p:sldSz cx="12192000" cy="6858000"/>
   <p:notesSz cx="6858000" cy="9144000"/>
@@ -150,7 +151,7 @@
 <file path=ppt/revisionInfo.xml><?xml version="1.0" encoding="utf-8"?>
 <p1510:revInfo xmlns:a="http://schemas.openxmlformats.org/drawingml/2006/main" xmlns:r="http://schemas.openxmlformats.org/officeDocument/2006/relationships" xmlns:p1510="http://schemas.microsoft.com/office/powerpoint/2015/10/main">
   <p1510:revLst>
-    <p1510:client id="{8442418D-DE68-4B3B-96F3-F4D7267D1273}" v="56" dt="2022-10-03T12:36:15.777"/>
+    <p1510:client id="{F5E39DD8-02D2-467F-8A59-B65F864F6561}" v="2" dt="2024-05-12T14:45:28.242"/>
   </p1510:revLst>
 </p1510:revInfo>
 </file>
@@ -4771,6 +4772,45 @@
             <ac:picMk id="6" creationId="{86091216-7469-46ED-95F0-405F871469F2}"/>
           </ac:picMkLst>
         </pc:picChg>
+      </pc:sldChg>
+    </pc:docChg>
+  </pc:docChgLst>
+  <pc:docChgLst>
+    <pc:chgData name="Weifeng Xu" userId="e7aed605-a3dd-4d5a-a692-a87037af107b" providerId="ADAL" clId="{F5E39DD8-02D2-467F-8A59-B65F864F6561}"/>
+    <pc:docChg chg="custSel addSld modSld">
+      <pc:chgData name="Weifeng Xu" userId="e7aed605-a3dd-4d5a-a692-a87037af107b" providerId="ADAL" clId="{F5E39DD8-02D2-467F-8A59-B65F864F6561}" dt="2024-05-12T14:45:42.142" v="16" actId="6549"/>
+      <pc:docMkLst>
+        <pc:docMk/>
+      </pc:docMkLst>
+      <pc:sldChg chg="modSp mod">
+        <pc:chgData name="Weifeng Xu" userId="e7aed605-a3dd-4d5a-a692-a87037af107b" providerId="ADAL" clId="{F5E39DD8-02D2-467F-8A59-B65F864F6561}" dt="2024-05-12T14:45:42.142" v="16" actId="6549"/>
+        <pc:sldMkLst>
+          <pc:docMk/>
+          <pc:sldMk cId="591311306" sldId="372"/>
+        </pc:sldMkLst>
+        <pc:spChg chg="mod">
+          <ac:chgData name="Weifeng Xu" userId="e7aed605-a3dd-4d5a-a692-a87037af107b" providerId="ADAL" clId="{F5E39DD8-02D2-467F-8A59-B65F864F6561}" dt="2024-05-12T14:45:42.142" v="16" actId="6549"/>
+          <ac:spMkLst>
+            <pc:docMk/>
+            <pc:sldMk cId="591311306" sldId="372"/>
+            <ac:spMk id="3" creationId="{00000000-0000-0000-0000-000000000000}"/>
+          </ac:spMkLst>
+        </pc:spChg>
+      </pc:sldChg>
+      <pc:sldChg chg="modSp add mod">
+        <pc:chgData name="Weifeng Xu" userId="e7aed605-a3dd-4d5a-a692-a87037af107b" providerId="ADAL" clId="{F5E39DD8-02D2-467F-8A59-B65F864F6561}" dt="2024-05-12T14:45:01.827" v="1" actId="20577"/>
+        <pc:sldMkLst>
+          <pc:docMk/>
+          <pc:sldMk cId="332893432" sldId="389"/>
+        </pc:sldMkLst>
+        <pc:spChg chg="mod">
+          <ac:chgData name="Weifeng Xu" userId="e7aed605-a3dd-4d5a-a692-a87037af107b" providerId="ADAL" clId="{F5E39DD8-02D2-467F-8A59-B65F864F6561}" dt="2024-05-12T14:45:01.827" v="1" actId="20577"/>
+          <ac:spMkLst>
+            <pc:docMk/>
+            <pc:sldMk cId="332893432" sldId="389"/>
+            <ac:spMk id="2" creationId="{F2F5478C-B9EB-45D5-86FE-31965B3F1F45}"/>
+          </ac:spMkLst>
+        </pc:spChg>
       </pc:sldChg>
     </pc:docChg>
   </pc:docChgLst>
@@ -7846,7 +7886,7 @@
           <a:p>
             <a:fld id="{B9658D5F-65FB-4E17-9D5B-8CF1DE5A98DF}" type="datetimeFigureOut">
               <a:rPr lang="en-US" smtClean="0"/>
-              <a:t>10/3/2022</a:t>
+              <a:t>5/12/2024</a:t>
             </a:fld>
             <a:endParaRPr lang="en-US"/>
           </a:p>
@@ -8113,6 +8153,98 @@
 </p:notesMaster>
 </file>
 
+<file path=ppt/notesSlides/notesSlide1.xml><?xml version="1.0" encoding="utf-8"?>
+<p:notes xmlns:a="http://schemas.openxmlformats.org/drawingml/2006/main" xmlns:r="http://schemas.openxmlformats.org/officeDocument/2006/relationships" xmlns:p="http://schemas.openxmlformats.org/presentationml/2006/main">
+  <p:cSld>
+    <p:spTree>
+      <p:nvGrpSpPr>
+        <p:cNvPr id="1" name=""/>
+        <p:cNvGrpSpPr/>
+        <p:nvPr/>
+      </p:nvGrpSpPr>
+      <p:grpSpPr>
+        <a:xfrm>
+          <a:off x="0" y="0"/>
+          <a:ext cx="0" cy="0"/>
+          <a:chOff x="0" y="0"/>
+          <a:chExt cx="0" cy="0"/>
+        </a:xfrm>
+      </p:grpSpPr>
+      <p:sp>
+        <p:nvSpPr>
+          <p:cNvPr id="2" name="Slide Image Placeholder 1"/>
+          <p:cNvSpPr>
+            <a:spLocks noGrp="1" noRot="1" noChangeAspect="1"/>
+          </p:cNvSpPr>
+          <p:nvPr>
+            <p:ph type="sldImg"/>
+          </p:nvPr>
+        </p:nvSpPr>
+        <p:spPr/>
+      </p:sp>
+      <p:sp>
+        <p:nvSpPr>
+          <p:cNvPr id="3" name="Notes Placeholder 2"/>
+          <p:cNvSpPr>
+            <a:spLocks noGrp="1"/>
+          </p:cNvSpPr>
+          <p:nvPr>
+            <p:ph type="body" idx="1"/>
+          </p:nvPr>
+        </p:nvSpPr>
+        <p:spPr/>
+        <p:txBody>
+          <a:bodyPr/>
+          <a:lstStyle/>
+          <a:p>
+            <a:r>
+              <a:rPr lang="fr-FR" dirty="0" err="1"/>
+              <a:t>wget</a:t>
+            </a:r>
+            <a:r>
+              <a:rPr lang="fr-FR" dirty="0"/>
+              <a:t>  -q https://raw.githubusercontent.com/frankwxu/digital-forensics-lab/main/Basic_Computer_Skills_for_Forensics/file_carving/usb_image/120M.7z</a:t>
+            </a:r>
+            <a:endParaRPr lang="en-US" dirty="0"/>
+          </a:p>
+        </p:txBody>
+      </p:sp>
+      <p:sp>
+        <p:nvSpPr>
+          <p:cNvPr id="4" name="Slide Number Placeholder 3"/>
+          <p:cNvSpPr>
+            <a:spLocks noGrp="1"/>
+          </p:cNvSpPr>
+          <p:nvPr>
+            <p:ph type="sldNum" sz="quarter" idx="5"/>
+          </p:nvPr>
+        </p:nvSpPr>
+        <p:spPr/>
+        <p:txBody>
+          <a:bodyPr/>
+          <a:lstStyle/>
+          <a:p>
+            <a:fld id="{DDBF98C7-164A-4723-84F0-B1E4B080DDEC}" type="slidenum">
+              <a:rPr lang="en-US" smtClean="0"/>
+              <a:t>18</a:t>
+            </a:fld>
+            <a:endParaRPr lang="en-US"/>
+          </a:p>
+        </p:txBody>
+      </p:sp>
+    </p:spTree>
+    <p:extLst>
+      <p:ext uri="{BB962C8B-B14F-4D97-AF65-F5344CB8AC3E}">
+        <p14:creationId xmlns:p14="http://schemas.microsoft.com/office/powerpoint/2010/main" val="2162039666"/>
+      </p:ext>
+    </p:extLst>
+  </p:cSld>
+  <p:clrMapOvr>
+    <a:masterClrMapping/>
+  </p:clrMapOvr>
+</p:notes>
+</file>
+
 <file path=ppt/slideLayouts/slideLayout1.xml><?xml version="1.0" encoding="utf-8"?>
 <p:sldLayout xmlns:a="http://schemas.openxmlformats.org/drawingml/2006/main" xmlns:r="http://schemas.openxmlformats.org/officeDocument/2006/relationships" xmlns:p="http://schemas.openxmlformats.org/presentationml/2006/main" type="title" preserve="1">
   <p:cSld name="Title Slide">
@@ -8242,7 +8374,7 @@
           <a:p>
             <a:fld id="{4263717A-E3C1-4BED-ABE0-B7069385E023}" type="datetimeFigureOut">
               <a:rPr lang="en-US" smtClean="0"/>
-              <a:t>10/3/2022</a:t>
+              <a:t>5/12/2024</a:t>
             </a:fld>
             <a:endParaRPr lang="en-US"/>
           </a:p>
@@ -8415,7 +8547,7 @@
           <a:p>
             <a:fld id="{4263717A-E3C1-4BED-ABE0-B7069385E023}" type="datetimeFigureOut">
               <a:rPr lang="en-US" smtClean="0"/>
-              <a:t>10/3/2022</a:t>
+              <a:t>5/12/2024</a:t>
             </a:fld>
             <a:endParaRPr lang="en-US"/>
           </a:p>
@@ -8593,7 +8725,7 @@
           <a:p>
             <a:fld id="{4263717A-E3C1-4BED-ABE0-B7069385E023}" type="datetimeFigureOut">
               <a:rPr lang="en-US" smtClean="0"/>
-              <a:t>10/3/2022</a:t>
+              <a:t>5/12/2024</a:t>
             </a:fld>
             <a:endParaRPr lang="en-US"/>
           </a:p>
@@ -8761,7 +8893,7 @@
           <a:p>
             <a:fld id="{4263717A-E3C1-4BED-ABE0-B7069385E023}" type="datetimeFigureOut">
               <a:rPr lang="en-US" smtClean="0"/>
-              <a:t>10/3/2022</a:t>
+              <a:t>5/12/2024</a:t>
             </a:fld>
             <a:endParaRPr lang="en-US"/>
           </a:p>
@@ -9006,7 +9138,7 @@
           <a:p>
             <a:fld id="{4263717A-E3C1-4BED-ABE0-B7069385E023}" type="datetimeFigureOut">
               <a:rPr lang="en-US" smtClean="0"/>
-              <a:t>10/3/2022</a:t>
+              <a:t>5/12/2024</a:t>
             </a:fld>
             <a:endParaRPr lang="en-US"/>
           </a:p>
@@ -9235,7 +9367,7 @@
           <a:p>
             <a:fld id="{4263717A-E3C1-4BED-ABE0-B7069385E023}" type="datetimeFigureOut">
               <a:rPr lang="en-US" smtClean="0"/>
-              <a:t>10/3/2022</a:t>
+              <a:t>5/12/2024</a:t>
             </a:fld>
             <a:endParaRPr lang="en-US"/>
           </a:p>
@@ -9599,7 +9731,7 @@
           <a:p>
             <a:fld id="{4263717A-E3C1-4BED-ABE0-B7069385E023}" type="datetimeFigureOut">
               <a:rPr lang="en-US" smtClean="0"/>
-              <a:t>10/3/2022</a:t>
+              <a:t>5/12/2024</a:t>
             </a:fld>
             <a:endParaRPr lang="en-US"/>
           </a:p>
@@ -9716,7 +9848,7 @@
           <a:p>
             <a:fld id="{4263717A-E3C1-4BED-ABE0-B7069385E023}" type="datetimeFigureOut">
               <a:rPr lang="en-US" smtClean="0"/>
-              <a:t>10/3/2022</a:t>
+              <a:t>5/12/2024</a:t>
             </a:fld>
             <a:endParaRPr lang="en-US"/>
           </a:p>
@@ -9811,7 +9943,7 @@
           <a:p>
             <a:fld id="{4263717A-E3C1-4BED-ABE0-B7069385E023}" type="datetimeFigureOut">
               <a:rPr lang="en-US" smtClean="0"/>
-              <a:t>10/3/2022</a:t>
+              <a:t>5/12/2024</a:t>
             </a:fld>
             <a:endParaRPr lang="en-US"/>
           </a:p>
@@ -10086,7 +10218,7 @@
           <a:p>
             <a:fld id="{4263717A-E3C1-4BED-ABE0-B7069385E023}" type="datetimeFigureOut">
               <a:rPr lang="en-US" smtClean="0"/>
-              <a:t>10/3/2022</a:t>
+              <a:t>5/12/2024</a:t>
             </a:fld>
             <a:endParaRPr lang="en-US"/>
           </a:p>
@@ -10338,7 +10470,7 @@
           <a:p>
             <a:fld id="{4263717A-E3C1-4BED-ABE0-B7069385E023}" type="datetimeFigureOut">
               <a:rPr lang="en-US" smtClean="0"/>
-              <a:t>10/3/2022</a:t>
+              <a:t>5/12/2024</a:t>
             </a:fld>
             <a:endParaRPr lang="en-US"/>
           </a:p>
@@ -10549,7 +10681,7 @@
           <a:p>
             <a:fld id="{4263717A-E3C1-4BED-ABE0-B7069385E023}" type="datetimeFigureOut">
               <a:rPr lang="en-US" smtClean="0"/>
-              <a:t>10/3/2022</a:t>
+              <a:t>5/12/2024</a:t>
             </a:fld>
             <a:endParaRPr lang="en-US"/>
           </a:p>
@@ -14711,26 +14843,17 @@
         <p:spPr/>
         <p:txBody>
           <a:bodyPr>
-            <a:normAutofit lnSpcReduction="10000"/>
+            <a:normAutofit/>
           </a:bodyPr>
           <a:lstStyle/>
           <a:p>
             <a:r>
+              <a:rPr lang="en-US"/>
+              <a:t>Assume </a:t>
+            </a:r>
+            <a:r>
               <a:rPr lang="en-US" dirty="0"/>
-              <a:t>Investigate a USB drive</a:t>
-            </a:r>
-          </a:p>
-          <a:p>
-            <a:pPr lvl="1"/>
-            <a:r>
-              <a:rPr lang="en-US" dirty="0"/>
-              <a:t>Owned by George Montgomery</a:t>
-            </a:r>
-          </a:p>
-          <a:p>
-            <a:r>
-              <a:rPr lang="en-US" dirty="0"/>
-              <a:t>Assume we have the image file</a:t>
+              <a:t>we have the image file</a:t>
             </a:r>
           </a:p>
           <a:p>
@@ -14739,38 +14862,9 @@
               <a:rPr lang="en-US" dirty="0">
                 <a:hlinkClick r:id="rId2"/>
               </a:rPr>
-              <a:t>https://www.dropbox.com/s/nw23q14vzsykyup/Ch01InChap01.dd</a:t>
+              <a:t>https://raw.githubusercontent.com/frankwxu/digital-forensics-lab/main/Basic_Computer_Skills_for_Forensics/file_carving/usb_image/120M.7z</a:t>
             </a:r>
             <a:endParaRPr lang="en-US" dirty="0"/>
-          </a:p>
-          <a:p>
-            <a:pPr lvl="1"/>
-            <a:r>
-              <a:rPr lang="en-GB" dirty="0"/>
-              <a:t>(from book </a:t>
-            </a:r>
-            <a:r>
-              <a:rPr lang="en-GB" i="1" dirty="0"/>
-              <a:t>Guide to Computer Forensics and Investigations</a:t>
-            </a:r>
-            <a:r>
-              <a:rPr lang="en-GB" dirty="0"/>
-              <a:t>. Sixth Edition)</a:t>
-            </a:r>
-            <a:endParaRPr lang="en-US" dirty="0"/>
-          </a:p>
-          <a:p>
-            <a:r>
-              <a:rPr lang="en-US" dirty="0"/>
-              <a:t>Software</a:t>
-            </a:r>
-          </a:p>
-          <a:p>
-            <a:pPr lvl="1"/>
-            <a:r>
-              <a:rPr lang="en-US" dirty="0"/>
-              <a:t>Autopsy</a:t>
-            </a:r>
           </a:p>
           <a:p>
             <a:r>
@@ -14808,6 +14902,200 @@
 </file>
 
 <file path=ppt/slides/slide18.xml><?xml version="1.0" encoding="utf-8"?>
+<p:sld xmlns:a="http://schemas.openxmlformats.org/drawingml/2006/main" xmlns:r="http://schemas.openxmlformats.org/officeDocument/2006/relationships" xmlns:p="http://schemas.openxmlformats.org/presentationml/2006/main">
+  <p:cSld>
+    <p:spTree>
+      <p:nvGrpSpPr>
+        <p:cNvPr id="1" name=""/>
+        <p:cNvGrpSpPr/>
+        <p:nvPr/>
+      </p:nvGrpSpPr>
+      <p:grpSpPr>
+        <a:xfrm>
+          <a:off x="0" y="0"/>
+          <a:ext cx="0" cy="0"/>
+          <a:chOff x="0" y="0"/>
+          <a:chExt cx="0" cy="0"/>
+        </a:xfrm>
+      </p:grpSpPr>
+      <p:sp>
+        <p:nvSpPr>
+          <p:cNvPr id="2" name="Title 1">
+            <a:extLst>
+              <a:ext uri="{FF2B5EF4-FFF2-40B4-BE49-F238E27FC236}">
+                <a16:creationId xmlns:a16="http://schemas.microsoft.com/office/drawing/2014/main" id="{F2F5478C-B9EB-45D5-86FE-31965B3F1F45}"/>
+              </a:ext>
+            </a:extLst>
+          </p:cNvPr>
+          <p:cNvSpPr>
+            <a:spLocks noGrp="1"/>
+          </p:cNvSpPr>
+          <p:nvPr>
+            <p:ph type="title"/>
+          </p:nvPr>
+        </p:nvSpPr>
+        <p:spPr/>
+        <p:txBody>
+          <a:bodyPr/>
+          <a:lstStyle/>
+          <a:p>
+            <a:r>
+              <a:rPr lang="en-GB" dirty="0"/>
+              <a:t>Prepare a USB image</a:t>
+            </a:r>
+            <a:endParaRPr lang="en-US" dirty="0"/>
+          </a:p>
+        </p:txBody>
+      </p:sp>
+      <p:pic>
+        <p:nvPicPr>
+          <p:cNvPr id="4" name="Picture 3">
+            <a:extLst>
+              <a:ext uri="{FF2B5EF4-FFF2-40B4-BE49-F238E27FC236}">
+                <a16:creationId xmlns:a16="http://schemas.microsoft.com/office/drawing/2014/main" id="{CA9F136A-91E1-4743-A0D6-638305A71704}"/>
+              </a:ext>
+            </a:extLst>
+          </p:cNvPr>
+          <p:cNvPicPr>
+            <a:picLocks noChangeAspect="1"/>
+          </p:cNvPicPr>
+          <p:nvPr/>
+        </p:nvPicPr>
+        <p:blipFill rotWithShape="1">
+          <a:blip r:embed="rId3"/>
+          <a:srcRect b="57042"/>
+          <a:stretch/>
+        </p:blipFill>
+        <p:spPr>
+          <a:xfrm>
+            <a:off x="838200" y="1917835"/>
+            <a:ext cx="10519804" cy="1808346"/>
+          </a:xfrm>
+          <a:prstGeom prst="rect">
+            <a:avLst/>
+          </a:prstGeom>
+        </p:spPr>
+      </p:pic>
+      <p:pic>
+        <p:nvPicPr>
+          <p:cNvPr id="6" name="Picture 5">
+            <a:extLst>
+              <a:ext uri="{FF2B5EF4-FFF2-40B4-BE49-F238E27FC236}">
+                <a16:creationId xmlns:a16="http://schemas.microsoft.com/office/drawing/2014/main" id="{5D021EE7-C592-4851-8B4A-A29E01D6B4EE}"/>
+              </a:ext>
+            </a:extLst>
+          </p:cNvPr>
+          <p:cNvPicPr>
+            <a:picLocks noChangeAspect="1"/>
+          </p:cNvPicPr>
+          <p:nvPr/>
+        </p:nvPicPr>
+        <p:blipFill>
+          <a:blip r:embed="rId4"/>
+          <a:stretch>
+            <a:fillRect/>
+          </a:stretch>
+        </p:blipFill>
+        <p:spPr>
+          <a:xfrm>
+            <a:off x="838200" y="4167310"/>
+            <a:ext cx="10515600" cy="2325565"/>
+          </a:xfrm>
+          <a:prstGeom prst="rect">
+            <a:avLst/>
+          </a:prstGeom>
+        </p:spPr>
+      </p:pic>
+      <p:sp>
+        <p:nvSpPr>
+          <p:cNvPr id="7" name="TextBox 6">
+            <a:extLst>
+              <a:ext uri="{FF2B5EF4-FFF2-40B4-BE49-F238E27FC236}">
+                <a16:creationId xmlns:a16="http://schemas.microsoft.com/office/drawing/2014/main" id="{B200A21C-FD21-4EE4-BAD3-4E1E0000DF71}"/>
+              </a:ext>
+            </a:extLst>
+          </p:cNvPr>
+          <p:cNvSpPr txBox="1"/>
+          <p:nvPr/>
+        </p:nvSpPr>
+        <p:spPr>
+          <a:xfrm>
+            <a:off x="838200" y="1548503"/>
+            <a:ext cx="3241978" cy="369332"/>
+          </a:xfrm>
+          <a:prstGeom prst="rect">
+            <a:avLst/>
+          </a:prstGeom>
+          <a:solidFill>
+            <a:schemeClr val="accent4"/>
+          </a:solidFill>
+        </p:spPr>
+        <p:txBody>
+          <a:bodyPr wrap="none" rtlCol="0">
+            <a:spAutoFit/>
+          </a:bodyPr>
+          <a:lstStyle/>
+          <a:p>
+            <a:r>
+              <a:rPr lang="en-GB" dirty="0"/>
+              <a:t>Download the zipped USB image</a:t>
+            </a:r>
+            <a:endParaRPr lang="en-US" dirty="0"/>
+          </a:p>
+        </p:txBody>
+      </p:sp>
+      <p:sp>
+        <p:nvSpPr>
+          <p:cNvPr id="8" name="TextBox 7">
+            <a:extLst>
+              <a:ext uri="{FF2B5EF4-FFF2-40B4-BE49-F238E27FC236}">
+                <a16:creationId xmlns:a16="http://schemas.microsoft.com/office/drawing/2014/main" id="{58D718E5-8A15-49A4-B6F1-3FD98EDAAF72}"/>
+              </a:ext>
+            </a:extLst>
+          </p:cNvPr>
+          <p:cNvSpPr txBox="1"/>
+          <p:nvPr/>
+        </p:nvSpPr>
+        <p:spPr>
+          <a:xfrm>
+            <a:off x="838200" y="3797978"/>
+            <a:ext cx="1802801" cy="369332"/>
+          </a:xfrm>
+          <a:prstGeom prst="rect">
+            <a:avLst/>
+          </a:prstGeom>
+          <a:solidFill>
+            <a:schemeClr val="accent4"/>
+          </a:solidFill>
+        </p:spPr>
+        <p:txBody>
+          <a:bodyPr wrap="none" rtlCol="0">
+            <a:spAutoFit/>
+          </a:bodyPr>
+          <a:lstStyle/>
+          <a:p>
+            <a:r>
+              <a:rPr lang="en-GB" dirty="0"/>
+              <a:t>Compute hashes </a:t>
+            </a:r>
+            <a:endParaRPr lang="en-US" dirty="0"/>
+          </a:p>
+        </p:txBody>
+      </p:sp>
+    </p:spTree>
+    <p:extLst>
+      <p:ext uri="{BB962C8B-B14F-4D97-AF65-F5344CB8AC3E}">
+        <p14:creationId xmlns:p14="http://schemas.microsoft.com/office/powerpoint/2010/main" val="332893432"/>
+      </p:ext>
+    </p:extLst>
+  </p:cSld>
+  <p:clrMapOvr>
+    <a:masterClrMapping/>
+  </p:clrMapOvr>
+</p:sld>
+</file>
+
+<file path=ppt/slides/slide19.xml><?xml version="1.0" encoding="utf-8"?>
 <p:sld xmlns:a="http://schemas.openxmlformats.org/drawingml/2006/main" xmlns:r="http://schemas.openxmlformats.org/officeDocument/2006/relationships" xmlns:p="http://schemas.openxmlformats.org/presentationml/2006/main">
   <p:cSld>
     <p:spTree>
@@ -14930,82 +15218,6 @@
 </p:sld>
 </file>
 
-<file path=ppt/slides/slide19.xml><?xml version="1.0" encoding="utf-8"?>
-<p:sld xmlns:a="http://schemas.openxmlformats.org/drawingml/2006/main" xmlns:r="http://schemas.openxmlformats.org/officeDocument/2006/relationships" xmlns:p="http://schemas.openxmlformats.org/presentationml/2006/main">
-  <p:cSld>
-    <p:spTree>
-      <p:nvGrpSpPr>
-        <p:cNvPr id="1" name=""/>
-        <p:cNvGrpSpPr/>
-        <p:nvPr/>
-      </p:nvGrpSpPr>
-      <p:grpSpPr>
-        <a:xfrm>
-          <a:off x="0" y="0"/>
-          <a:ext cx="0" cy="0"/>
-          <a:chOff x="0" y="0"/>
-          <a:chExt cx="0" cy="0"/>
-        </a:xfrm>
-      </p:grpSpPr>
-      <p:sp>
-        <p:nvSpPr>
-          <p:cNvPr id="4" name="Title 3"/>
-          <p:cNvSpPr>
-            <a:spLocks noGrp="1"/>
-          </p:cNvSpPr>
-          <p:nvPr>
-            <p:ph type="title"/>
-          </p:nvPr>
-        </p:nvSpPr>
-        <p:spPr/>
-        <p:txBody>
-          <a:bodyPr/>
-          <a:lstStyle/>
-          <a:p>
-            <a:r>
-              <a:rPr lang="en-US" dirty="0"/>
-              <a:t>Create a case with name</a:t>
-            </a:r>
-          </a:p>
-        </p:txBody>
-      </p:sp>
-      <p:pic>
-        <p:nvPicPr>
-          <p:cNvPr id="5" name="Picture 4"/>
-          <p:cNvPicPr>
-            <a:picLocks noChangeAspect="1"/>
-          </p:cNvPicPr>
-          <p:nvPr/>
-        </p:nvPicPr>
-        <p:blipFill>
-          <a:blip r:embed="rId2"/>
-          <a:stretch>
-            <a:fillRect/>
-          </a:stretch>
-        </p:blipFill>
-        <p:spPr>
-          <a:xfrm>
-            <a:off x="838200" y="1570020"/>
-            <a:ext cx="8213531" cy="4853451"/>
-          </a:xfrm>
-          <a:prstGeom prst="rect">
-            <a:avLst/>
-          </a:prstGeom>
-        </p:spPr>
-      </p:pic>
-    </p:spTree>
-    <p:extLst>
-      <p:ext uri="{BB962C8B-B14F-4D97-AF65-F5344CB8AC3E}">
-        <p14:creationId xmlns:p14="http://schemas.microsoft.com/office/powerpoint/2010/main" val="506927129"/>
-      </p:ext>
-    </p:extLst>
-  </p:cSld>
-  <p:clrMapOvr>
-    <a:masterClrMapping/>
-  </p:clrMapOvr>
-</p:sld>
-</file>
-
 <file path=ppt/slides/slide2.xml><?xml version="1.0" encoding="utf-8"?>
 <p:sld xmlns:a="http://schemas.openxmlformats.org/drawingml/2006/main" xmlns:r="http://schemas.openxmlformats.org/officeDocument/2006/relationships" xmlns:p="http://schemas.openxmlformats.org/presentationml/2006/main">
   <p:cSld>
@@ -15123,7 +15335,7 @@
       </p:grpSpPr>
       <p:sp>
         <p:nvSpPr>
-          <p:cNvPr id="2" name="Title 1"/>
+          <p:cNvPr id="4" name="Title 3"/>
           <p:cNvSpPr>
             <a:spLocks noGrp="1"/>
           </p:cNvSpPr>
@@ -15138,14 +15350,14 @@
           <a:p>
             <a:r>
               <a:rPr lang="en-US" dirty="0"/>
-              <a:t>Details of the case</a:t>
+              <a:t>Create a case with name</a:t>
             </a:r>
           </a:p>
         </p:txBody>
       </p:sp>
       <p:pic>
         <p:nvPicPr>
-          <p:cNvPr id="3" name="Picture 2"/>
+          <p:cNvPr id="5" name="Picture 4"/>
           <p:cNvPicPr>
             <a:picLocks noChangeAspect="1"/>
           </p:cNvPicPr>
@@ -15159,8 +15371,8 @@
         </p:blipFill>
         <p:spPr>
           <a:xfrm>
-            <a:off x="838200" y="1690688"/>
-            <a:ext cx="7835591" cy="4604314"/>
+            <a:off x="838200" y="1570020"/>
+            <a:ext cx="8213531" cy="4853451"/>
           </a:xfrm>
           <a:prstGeom prst="rect">
             <a:avLst/>
@@ -15170,7 +15382,7 @@
     </p:spTree>
     <p:extLst>
       <p:ext uri="{BB962C8B-B14F-4D97-AF65-F5344CB8AC3E}">
-        <p14:creationId xmlns:p14="http://schemas.microsoft.com/office/powerpoint/2010/main" val="1039227898"/>
+        <p14:creationId xmlns:p14="http://schemas.microsoft.com/office/powerpoint/2010/main" val="506927129"/>
       </p:ext>
     </p:extLst>
   </p:cSld>
@@ -15214,7 +15426,7 @@
           <a:p>
             <a:r>
               <a:rPr lang="en-US" dirty="0"/>
-              <a:t>Choose Data Format</a:t>
+              <a:t>Details of the case</a:t>
             </a:r>
           </a:p>
         </p:txBody>
@@ -15235,8 +15447,8 @@
         </p:blipFill>
         <p:spPr>
           <a:xfrm>
-            <a:off x="838200" y="1503218"/>
-            <a:ext cx="6124575" cy="5105400"/>
+            <a:off x="838200" y="1690688"/>
+            <a:ext cx="7835591" cy="4604314"/>
           </a:xfrm>
           <a:prstGeom prst="rect">
             <a:avLst/>
@@ -15246,7 +15458,7 @@
     </p:spTree>
     <p:extLst>
       <p:ext uri="{BB962C8B-B14F-4D97-AF65-F5344CB8AC3E}">
-        <p14:creationId xmlns:p14="http://schemas.microsoft.com/office/powerpoint/2010/main" val="3727476988"/>
+        <p14:creationId xmlns:p14="http://schemas.microsoft.com/office/powerpoint/2010/main" val="1039227898"/>
       </p:ext>
     </p:extLst>
   </p:cSld>
@@ -15290,6 +15502,82 @@
           <a:p>
             <a:r>
               <a:rPr lang="en-US" dirty="0"/>
+              <a:t>Choose Data Format</a:t>
+            </a:r>
+          </a:p>
+        </p:txBody>
+      </p:sp>
+      <p:pic>
+        <p:nvPicPr>
+          <p:cNvPr id="3" name="Picture 2"/>
+          <p:cNvPicPr>
+            <a:picLocks noChangeAspect="1"/>
+          </p:cNvPicPr>
+          <p:nvPr/>
+        </p:nvPicPr>
+        <p:blipFill>
+          <a:blip r:embed="rId2"/>
+          <a:stretch>
+            <a:fillRect/>
+          </a:stretch>
+        </p:blipFill>
+        <p:spPr>
+          <a:xfrm>
+            <a:off x="838200" y="1503218"/>
+            <a:ext cx="6124575" cy="5105400"/>
+          </a:xfrm>
+          <a:prstGeom prst="rect">
+            <a:avLst/>
+          </a:prstGeom>
+        </p:spPr>
+      </p:pic>
+    </p:spTree>
+    <p:extLst>
+      <p:ext uri="{BB962C8B-B14F-4D97-AF65-F5344CB8AC3E}">
+        <p14:creationId xmlns:p14="http://schemas.microsoft.com/office/powerpoint/2010/main" val="3727476988"/>
+      </p:ext>
+    </p:extLst>
+  </p:cSld>
+  <p:clrMapOvr>
+    <a:masterClrMapping/>
+  </p:clrMapOvr>
+</p:sld>
+</file>
+
+<file path=ppt/slides/slide23.xml><?xml version="1.0" encoding="utf-8"?>
+<p:sld xmlns:a="http://schemas.openxmlformats.org/drawingml/2006/main" xmlns:r="http://schemas.openxmlformats.org/officeDocument/2006/relationships" xmlns:p="http://schemas.openxmlformats.org/presentationml/2006/main">
+  <p:cSld>
+    <p:spTree>
+      <p:nvGrpSpPr>
+        <p:cNvPr id="1" name=""/>
+        <p:cNvGrpSpPr/>
+        <p:nvPr/>
+      </p:nvGrpSpPr>
+      <p:grpSpPr>
+        <a:xfrm>
+          <a:off x="0" y="0"/>
+          <a:ext cx="0" cy="0"/>
+          <a:chOff x="0" y="0"/>
+          <a:chExt cx="0" cy="0"/>
+        </a:xfrm>
+      </p:grpSpPr>
+      <p:sp>
+        <p:nvSpPr>
+          <p:cNvPr id="2" name="Title 1"/>
+          <p:cNvSpPr>
+            <a:spLocks noGrp="1"/>
+          </p:cNvSpPr>
+          <p:nvPr>
+            <p:ph type="title"/>
+          </p:nvPr>
+        </p:nvSpPr>
+        <p:spPr/>
+        <p:txBody>
+          <a:bodyPr/>
+          <a:lstStyle/>
+          <a:p>
+            <a:r>
+              <a:rPr lang="en-US" dirty="0"/>
               <a:t>Choose the image file</a:t>
             </a:r>
           </a:p>
@@ -15332,7 +15620,7 @@
 </p:sld>
 </file>
 
-<file path=ppt/slides/slide23.xml><?xml version="1.0" encoding="utf-8"?>
+<file path=ppt/slides/slide24.xml><?xml version="1.0" encoding="utf-8"?>
 <p:sld xmlns:a="http://schemas.openxmlformats.org/drawingml/2006/main" xmlns:r="http://schemas.openxmlformats.org/officeDocument/2006/relationships" xmlns:p="http://schemas.openxmlformats.org/presentationml/2006/main">
   <p:cSld>
     <p:spTree>
@@ -15386,7 +15674,7 @@
 </p:sld>
 </file>
 
-<file path=ppt/slides/slide24.xml><?xml version="1.0" encoding="utf-8"?>
+<file path=ppt/slides/slide25.xml><?xml version="1.0" encoding="utf-8"?>
 <p:sld xmlns:a="http://schemas.openxmlformats.org/drawingml/2006/main" xmlns:r="http://schemas.openxmlformats.org/officeDocument/2006/relationships" xmlns:p="http://schemas.openxmlformats.org/presentationml/2006/main">
   <p:cSld>
     <p:spTree>
@@ -15462,7 +15750,7 @@
 </p:sld>
 </file>
 
-<file path=ppt/slides/slide25.xml><?xml version="1.0" encoding="utf-8"?>
+<file path=ppt/slides/slide26.xml><?xml version="1.0" encoding="utf-8"?>
 <p:sld xmlns:a="http://schemas.openxmlformats.org/drawingml/2006/main" xmlns:r="http://schemas.openxmlformats.org/officeDocument/2006/relationships" xmlns:p="http://schemas.openxmlformats.org/presentationml/2006/main">
   <p:cSld>
     <p:spTree>
@@ -15663,7 +15951,7 @@
 </p:sld>
 </file>
 
-<file path=ppt/slides/slide26.xml><?xml version="1.0" encoding="utf-8"?>
+<file path=ppt/slides/slide27.xml><?xml version="1.0" encoding="utf-8"?>
 <p:sld xmlns:a="http://schemas.openxmlformats.org/drawingml/2006/main" xmlns:r="http://schemas.openxmlformats.org/officeDocument/2006/relationships" xmlns:p="http://schemas.openxmlformats.org/presentationml/2006/main">
   <p:cSld>
     <p:spTree>
@@ -15739,7 +16027,7 @@
 </p:sld>
 </file>
 
-<file path=ppt/slides/slide27.xml><?xml version="1.0" encoding="utf-8"?>
+<file path=ppt/slides/slide28.xml><?xml version="1.0" encoding="utf-8"?>
 <p:sld xmlns:a="http://schemas.openxmlformats.org/drawingml/2006/main" xmlns:r="http://schemas.openxmlformats.org/officeDocument/2006/relationships" xmlns:p="http://schemas.openxmlformats.org/presentationml/2006/main">
   <p:cSld>
     <p:spTree>
@@ -15839,7 +16127,7 @@
 </p:sld>
 </file>
 
-<file path=ppt/slides/slide28.xml><?xml version="1.0" encoding="utf-8"?>
+<file path=ppt/slides/slide29.xml><?xml version="1.0" encoding="utf-8"?>
 <p:sld xmlns:a="http://schemas.openxmlformats.org/drawingml/2006/main" xmlns:r="http://schemas.openxmlformats.org/officeDocument/2006/relationships" xmlns:p="http://schemas.openxmlformats.org/presentationml/2006/main">
   <p:cSld>
     <p:spTree>
@@ -15961,82 +16249,6 @@
 </p:sld>
 </file>
 
-<file path=ppt/slides/slide29.xml><?xml version="1.0" encoding="utf-8"?>
-<p:sld xmlns:a="http://schemas.openxmlformats.org/drawingml/2006/main" xmlns:r="http://schemas.openxmlformats.org/officeDocument/2006/relationships" xmlns:p="http://schemas.openxmlformats.org/presentationml/2006/main">
-  <p:cSld>
-    <p:spTree>
-      <p:nvGrpSpPr>
-        <p:cNvPr id="1" name=""/>
-        <p:cNvGrpSpPr/>
-        <p:nvPr/>
-      </p:nvGrpSpPr>
-      <p:grpSpPr>
-        <a:xfrm>
-          <a:off x="0" y="0"/>
-          <a:ext cx="0" cy="0"/>
-          <a:chOff x="0" y="0"/>
-          <a:chExt cx="0" cy="0"/>
-        </a:xfrm>
-      </p:grpSpPr>
-      <p:sp>
-        <p:nvSpPr>
-          <p:cNvPr id="3" name="Title 2"/>
-          <p:cNvSpPr>
-            <a:spLocks noGrp="1"/>
-          </p:cNvSpPr>
-          <p:nvPr>
-            <p:ph type="title"/>
-          </p:nvPr>
-        </p:nvSpPr>
-        <p:spPr/>
-        <p:txBody>
-          <a:bodyPr/>
-          <a:lstStyle/>
-          <a:p>
-            <a:r>
-              <a:rPr lang="en-US" dirty="0"/>
-              <a:t>Search keywords</a:t>
-            </a:r>
-          </a:p>
-        </p:txBody>
-      </p:sp>
-      <p:pic>
-        <p:nvPicPr>
-          <p:cNvPr id="4" name="Picture 3"/>
-          <p:cNvPicPr>
-            <a:picLocks noChangeAspect="1"/>
-          </p:cNvPicPr>
-          <p:nvPr/>
-        </p:nvPicPr>
-        <p:blipFill>
-          <a:blip r:embed="rId2"/>
-          <a:stretch>
-            <a:fillRect/>
-          </a:stretch>
-        </p:blipFill>
-        <p:spPr>
-          <a:xfrm>
-            <a:off x="838200" y="1633183"/>
-            <a:ext cx="8907028" cy="4510678"/>
-          </a:xfrm>
-          <a:prstGeom prst="rect">
-            <a:avLst/>
-          </a:prstGeom>
-        </p:spPr>
-      </p:pic>
-    </p:spTree>
-    <p:extLst>
-      <p:ext uri="{BB962C8B-B14F-4D97-AF65-F5344CB8AC3E}">
-        <p14:creationId xmlns:p14="http://schemas.microsoft.com/office/powerpoint/2010/main" val="2605355845"/>
-      </p:ext>
-    </p:extLst>
-  </p:cSld>
-  <p:clrMapOvr>
-    <a:masterClrMapping/>
-  </p:clrMapOvr>
-</p:sld>
-</file>
-
 <file path=ppt/slides/slide3.xml><?xml version="1.0" encoding="utf-8"?>
 <p:sld xmlns:a="http://schemas.openxmlformats.org/drawingml/2006/main" xmlns:r="http://schemas.openxmlformats.org/officeDocument/2006/relationships" xmlns:p="http://schemas.openxmlformats.org/presentationml/2006/main">
   <p:cSld>
@@ -16139,7 +16351,7 @@
       </p:grpSpPr>
       <p:sp>
         <p:nvSpPr>
-          <p:cNvPr id="2" name="Title 1"/>
+          <p:cNvPr id="3" name="Title 2"/>
           <p:cNvSpPr>
             <a:spLocks noGrp="1"/>
           </p:cNvSpPr>
@@ -16154,14 +16366,14 @@
           <a:p>
             <a:r>
               <a:rPr lang="en-US" dirty="0"/>
-              <a:t>Search results</a:t>
+              <a:t>Search keywords</a:t>
             </a:r>
           </a:p>
         </p:txBody>
       </p:sp>
       <p:pic>
         <p:nvPicPr>
-          <p:cNvPr id="3" name="Picture 2"/>
+          <p:cNvPr id="4" name="Picture 3"/>
           <p:cNvPicPr>
             <a:picLocks noChangeAspect="1"/>
           </p:cNvPicPr>
@@ -16175,8 +16387,8 @@
         </p:blipFill>
         <p:spPr>
           <a:xfrm>
-            <a:off x="838200" y="1570602"/>
-            <a:ext cx="8039100" cy="4648200"/>
+            <a:off x="838200" y="1633183"/>
+            <a:ext cx="8907028" cy="4510678"/>
           </a:xfrm>
           <a:prstGeom prst="rect">
             <a:avLst/>
@@ -16186,7 +16398,7 @@
     </p:spTree>
     <p:extLst>
       <p:ext uri="{BB962C8B-B14F-4D97-AF65-F5344CB8AC3E}">
-        <p14:creationId xmlns:p14="http://schemas.microsoft.com/office/powerpoint/2010/main" val="2355122003"/>
+        <p14:creationId xmlns:p14="http://schemas.microsoft.com/office/powerpoint/2010/main" val="2605355845"/>
       </p:ext>
     </p:extLst>
   </p:cSld>
@@ -16230,6 +16442,82 @@
           <a:p>
             <a:r>
               <a:rPr lang="en-US" dirty="0"/>
+              <a:t>Search results</a:t>
+            </a:r>
+          </a:p>
+        </p:txBody>
+      </p:sp>
+      <p:pic>
+        <p:nvPicPr>
+          <p:cNvPr id="3" name="Picture 2"/>
+          <p:cNvPicPr>
+            <a:picLocks noChangeAspect="1"/>
+          </p:cNvPicPr>
+          <p:nvPr/>
+        </p:nvPicPr>
+        <p:blipFill>
+          <a:blip r:embed="rId2"/>
+          <a:stretch>
+            <a:fillRect/>
+          </a:stretch>
+        </p:blipFill>
+        <p:spPr>
+          <a:xfrm>
+            <a:off x="838200" y="1570602"/>
+            <a:ext cx="8039100" cy="4648200"/>
+          </a:xfrm>
+          <a:prstGeom prst="rect">
+            <a:avLst/>
+          </a:prstGeom>
+        </p:spPr>
+      </p:pic>
+    </p:spTree>
+    <p:extLst>
+      <p:ext uri="{BB962C8B-B14F-4D97-AF65-F5344CB8AC3E}">
+        <p14:creationId xmlns:p14="http://schemas.microsoft.com/office/powerpoint/2010/main" val="2355122003"/>
+      </p:ext>
+    </p:extLst>
+  </p:cSld>
+  <p:clrMapOvr>
+    <a:masterClrMapping/>
+  </p:clrMapOvr>
+</p:sld>
+</file>
+
+<file path=ppt/slides/slide32.xml><?xml version="1.0" encoding="utf-8"?>
+<p:sld xmlns:a="http://schemas.openxmlformats.org/drawingml/2006/main" xmlns:r="http://schemas.openxmlformats.org/officeDocument/2006/relationships" xmlns:p="http://schemas.openxmlformats.org/presentationml/2006/main">
+  <p:cSld>
+    <p:spTree>
+      <p:nvGrpSpPr>
+        <p:cNvPr id="1" name=""/>
+        <p:cNvGrpSpPr/>
+        <p:nvPr/>
+      </p:nvGrpSpPr>
+      <p:grpSpPr>
+        <a:xfrm>
+          <a:off x="0" y="0"/>
+          <a:ext cx="0" cy="0"/>
+          <a:chOff x="0" y="0"/>
+          <a:chExt cx="0" cy="0"/>
+        </a:xfrm>
+      </p:grpSpPr>
+      <p:sp>
+        <p:nvSpPr>
+          <p:cNvPr id="2" name="Title 1"/>
+          <p:cNvSpPr>
+            <a:spLocks noGrp="1"/>
+          </p:cNvSpPr>
+          <p:nvPr>
+            <p:ph type="title"/>
+          </p:nvPr>
+        </p:nvSpPr>
+        <p:spPr/>
+        <p:txBody>
+          <a:bodyPr/>
+          <a:lstStyle/>
+          <a:p>
+            <a:r>
+              <a:rPr lang="en-US" dirty="0"/>
               <a:t>Generate reports</a:t>
             </a:r>
           </a:p>
@@ -16272,7 +16560,7 @@
 </p:sld>
 </file>
 
-<file path=ppt/slides/slide32.xml><?xml version="1.0" encoding="utf-8"?>
+<file path=ppt/slides/slide33.xml><?xml version="1.0" encoding="utf-8"?>
 <p:sld xmlns:a="http://schemas.openxmlformats.org/drawingml/2006/main" xmlns:r="http://schemas.openxmlformats.org/officeDocument/2006/relationships" xmlns:p="http://schemas.openxmlformats.org/presentationml/2006/main">
   <p:cSld>
     <p:spTree>
@@ -16416,7 +16704,7 @@
 </p:sld>
 </file>
 
-<file path=ppt/slides/slide33.xml><?xml version="1.0" encoding="utf-8"?>
+<file path=ppt/slides/slide34.xml><?xml version="1.0" encoding="utf-8"?>
 <p:sld xmlns:a="http://schemas.openxmlformats.org/drawingml/2006/main" xmlns:r="http://schemas.openxmlformats.org/officeDocument/2006/relationships" xmlns:p="http://schemas.openxmlformats.org/presentationml/2006/main">
   <p:cSld>
     <p:spTree>

</xml_diff>